<commit_message>
Game Spec v1 Finish
</commit_message>
<xml_diff>
--- a/Document/View.pptx
+++ b/Document/View.pptx
@@ -6,7 +6,9 @@
   </p:sldMasterIdLst>
   <p:sldIdLst>
     <p:sldId id="256" r:id="rId2"/>
-    <p:sldId id="257" r:id="rId3"/>
+    <p:sldId id="258" r:id="rId3"/>
+    <p:sldId id="257" r:id="rId4"/>
+    <p:sldId id="259" r:id="rId5"/>
   </p:sldIdLst>
   <p:sldSz cx="12192000" cy="6858000"/>
   <p:notesSz cx="6858000" cy="9144000"/>
@@ -105,6 +107,11 @@
       </a:defRPr>
     </a:lvl9pPr>
   </p:defaultTextStyle>
+  <p:extLst>
+    <p:ext uri="{EFAFB233-063F-42B5-8137-9DF3F51BA10A}">
+      <p15:sldGuideLst xmlns:p15="http://schemas.microsoft.com/office/powerpoint/2012/main"/>
+    </p:ext>
+  </p:extLst>
 </p:presentation>
 </file>
 
@@ -239,7 +246,7 @@
           <a:p>
             <a:fld id="{C1AF68DD-3401-4B0B-B3BB-757E2922155C}" type="datetimeFigureOut">
               <a:rPr lang="zh-TW" altLang="en-US" smtClean="0"/>
-              <a:t>2015/12/21</a:t>
+              <a:t>2015/12/22</a:t>
             </a:fld>
             <a:endParaRPr lang="zh-TW" altLang="en-US"/>
           </a:p>
@@ -409,7 +416,7 @@
           <a:p>
             <a:fld id="{C1AF68DD-3401-4B0B-B3BB-757E2922155C}" type="datetimeFigureOut">
               <a:rPr lang="zh-TW" altLang="en-US" smtClean="0"/>
-              <a:t>2015/12/21</a:t>
+              <a:t>2015/12/22</a:t>
             </a:fld>
             <a:endParaRPr lang="zh-TW" altLang="en-US"/>
           </a:p>
@@ -589,7 +596,7 @@
           <a:p>
             <a:fld id="{C1AF68DD-3401-4B0B-B3BB-757E2922155C}" type="datetimeFigureOut">
               <a:rPr lang="zh-TW" altLang="en-US" smtClean="0"/>
-              <a:t>2015/12/21</a:t>
+              <a:t>2015/12/22</a:t>
             </a:fld>
             <a:endParaRPr lang="zh-TW" altLang="en-US"/>
           </a:p>
@@ -759,7 +766,7 @@
           <a:p>
             <a:fld id="{C1AF68DD-3401-4B0B-B3BB-757E2922155C}" type="datetimeFigureOut">
               <a:rPr lang="zh-TW" altLang="en-US" smtClean="0"/>
-              <a:t>2015/12/21</a:t>
+              <a:t>2015/12/22</a:t>
             </a:fld>
             <a:endParaRPr lang="zh-TW" altLang="en-US"/>
           </a:p>
@@ -1005,7 +1012,7 @@
           <a:p>
             <a:fld id="{C1AF68DD-3401-4B0B-B3BB-757E2922155C}" type="datetimeFigureOut">
               <a:rPr lang="zh-TW" altLang="en-US" smtClean="0"/>
-              <a:t>2015/12/21</a:t>
+              <a:t>2015/12/22</a:t>
             </a:fld>
             <a:endParaRPr lang="zh-TW" altLang="en-US"/>
           </a:p>
@@ -1237,7 +1244,7 @@
           <a:p>
             <a:fld id="{C1AF68DD-3401-4B0B-B3BB-757E2922155C}" type="datetimeFigureOut">
               <a:rPr lang="zh-TW" altLang="en-US" smtClean="0"/>
-              <a:t>2015/12/21</a:t>
+              <a:t>2015/12/22</a:t>
             </a:fld>
             <a:endParaRPr lang="zh-TW" altLang="en-US"/>
           </a:p>
@@ -1604,7 +1611,7 @@
           <a:p>
             <a:fld id="{C1AF68DD-3401-4B0B-B3BB-757E2922155C}" type="datetimeFigureOut">
               <a:rPr lang="zh-TW" altLang="en-US" smtClean="0"/>
-              <a:t>2015/12/21</a:t>
+              <a:t>2015/12/22</a:t>
             </a:fld>
             <a:endParaRPr lang="zh-TW" altLang="en-US"/>
           </a:p>
@@ -1722,7 +1729,7 @@
           <a:p>
             <a:fld id="{C1AF68DD-3401-4B0B-B3BB-757E2922155C}" type="datetimeFigureOut">
               <a:rPr lang="zh-TW" altLang="en-US" smtClean="0"/>
-              <a:t>2015/12/21</a:t>
+              <a:t>2015/12/22</a:t>
             </a:fld>
             <a:endParaRPr lang="zh-TW" altLang="en-US"/>
           </a:p>
@@ -1817,7 +1824,7 @@
           <a:p>
             <a:fld id="{C1AF68DD-3401-4B0B-B3BB-757E2922155C}" type="datetimeFigureOut">
               <a:rPr lang="zh-TW" altLang="en-US" smtClean="0"/>
-              <a:t>2015/12/21</a:t>
+              <a:t>2015/12/22</a:t>
             </a:fld>
             <a:endParaRPr lang="zh-TW" altLang="en-US"/>
           </a:p>
@@ -2094,7 +2101,7 @@
           <a:p>
             <a:fld id="{C1AF68DD-3401-4B0B-B3BB-757E2922155C}" type="datetimeFigureOut">
               <a:rPr lang="zh-TW" altLang="en-US" smtClean="0"/>
-              <a:t>2015/12/21</a:t>
+              <a:t>2015/12/22</a:t>
             </a:fld>
             <a:endParaRPr lang="zh-TW" altLang="en-US"/>
           </a:p>
@@ -2347,7 +2354,7 @@
           <a:p>
             <a:fld id="{C1AF68DD-3401-4B0B-B3BB-757E2922155C}" type="datetimeFigureOut">
               <a:rPr lang="zh-TW" altLang="en-US" smtClean="0"/>
-              <a:t>2015/12/21</a:t>
+              <a:t>2015/12/22</a:t>
             </a:fld>
             <a:endParaRPr lang="zh-TW" altLang="en-US"/>
           </a:p>
@@ -2560,7 +2567,7 @@
           <a:p>
             <a:fld id="{C1AF68DD-3401-4B0B-B3BB-757E2922155C}" type="datetimeFigureOut">
               <a:rPr lang="zh-TW" altLang="en-US" smtClean="0"/>
-              <a:t>2015/12/21</a:t>
+              <a:t>2015/12/22</a:t>
             </a:fld>
             <a:endParaRPr lang="zh-TW" altLang="en-US"/>
           </a:p>
@@ -3654,7 +3661,7 @@
 </file>
 
 <file path=ppt/slides/slide2.xml><?xml version="1.0" encoding="utf-8"?>
-<p:sld xmlns:a="http://schemas.openxmlformats.org/drawingml/2006/main" xmlns:r="http://schemas.openxmlformats.org/officeDocument/2006/relationships" xmlns:p="http://schemas.openxmlformats.org/presentationml/2006/main" show="0">
+<p:sld xmlns:a="http://schemas.openxmlformats.org/drawingml/2006/main" xmlns:r="http://schemas.openxmlformats.org/officeDocument/2006/relationships" xmlns:p="http://schemas.openxmlformats.org/presentationml/2006/main">
   <p:cSld>
     <p:spTree>
       <p:nvGrpSpPr>
@@ -3678,8 +3685,8 @@
         </p:nvSpPr>
         <p:spPr>
           <a:xfrm>
-            <a:off x="295276" y="742950"/>
-            <a:ext cx="7762874" cy="4924425"/>
+            <a:off x="321235" y="742950"/>
+            <a:ext cx="7786278" cy="4935039"/>
           </a:xfrm>
           <a:prstGeom prst="rect">
             <a:avLst/>
@@ -3726,8 +3733,8 @@
         </p:nvSpPr>
         <p:spPr>
           <a:xfrm>
-            <a:off x="1180504" y="1042985"/>
-            <a:ext cx="5667375" cy="4267200"/>
+            <a:off x="1180504" y="1042986"/>
+            <a:ext cx="6021485" cy="4168262"/>
           </a:xfrm>
           <a:prstGeom prst="rect">
             <a:avLst/>
@@ -3777,7 +3784,7 @@
         </p:nvCxnSpPr>
         <p:spPr>
           <a:xfrm flipH="1">
-            <a:off x="794250" y="2564974"/>
+            <a:off x="809628" y="1257299"/>
             <a:ext cx="352422" cy="295276"/>
           </a:xfrm>
           <a:prstGeom prst="straightConnector1">
@@ -3816,7 +3823,7 @@
         </p:nvSpPr>
         <p:spPr>
           <a:xfrm>
-            <a:off x="298951" y="2865012"/>
+            <a:off x="314329" y="1557337"/>
             <a:ext cx="804861" cy="361950"/>
           </a:xfrm>
           <a:prstGeom prst="rect">
@@ -3871,19 +3878,89 @@
           </a:p>
         </p:txBody>
       </p:sp>
+      <p:sp>
+        <p:nvSpPr>
+          <p:cNvPr id="18" name="矩形 17"/>
+          <p:cNvSpPr/>
+          <p:nvPr/>
+        </p:nvSpPr>
+        <p:spPr>
+          <a:xfrm>
+            <a:off x="2715814" y="1165742"/>
+            <a:ext cx="2769395" cy="720210"/>
+          </a:xfrm>
+          <a:prstGeom prst="rect">
+            <a:avLst/>
+          </a:prstGeom>
+          <a:noFill/>
+          <a:ln>
+            <a:noFill/>
+          </a:ln>
+        </p:spPr>
+        <p:style>
+          <a:lnRef idx="2">
+            <a:schemeClr val="accent1">
+              <a:shade val="50000"/>
+            </a:schemeClr>
+          </a:lnRef>
+          <a:fillRef idx="1">
+            <a:schemeClr val="accent1"/>
+          </a:fillRef>
+          <a:effectRef idx="0">
+            <a:schemeClr val="accent1"/>
+          </a:effectRef>
+          <a:fontRef idx="minor">
+            <a:schemeClr val="lt1"/>
+          </a:fontRef>
+        </p:style>
+        <p:txBody>
+          <a:bodyPr rtlCol="0" anchor="ctr"/>
+          <a:lstStyle/>
+          <a:p>
+            <a:pPr algn="ctr"/>
+            <a:r>
+              <a:rPr lang="en-US" altLang="zh-TW" sz="2400" dirty="0" smtClean="0">
+                <a:solidFill>
+                  <a:schemeClr val="tx1"/>
+                </a:solidFill>
+                <a:latin typeface="微軟正黑體" panose="020B0604030504040204" pitchFamily="34" charset="-120"/>
+                <a:ea typeface="微軟正黑體" panose="020B0604030504040204" pitchFamily="34" charset="-120"/>
+              </a:rPr>
+              <a:t>Organ-Donation</a:t>
+            </a:r>
+          </a:p>
+          <a:p>
+            <a:pPr algn="ctr"/>
+            <a:r>
+              <a:rPr lang="zh-TW" altLang="en-US" sz="2400" dirty="0" smtClean="0">
+                <a:solidFill>
+                  <a:schemeClr val="tx1"/>
+                </a:solidFill>
+                <a:latin typeface="微軟正黑體" panose="020B0604030504040204" pitchFamily="34" charset="-120"/>
+                <a:ea typeface="微軟正黑體" panose="020B0604030504040204" pitchFamily="34" charset="-120"/>
+              </a:rPr>
+              <a:t>等待玩家連線</a:t>
+            </a:r>
+            <a:endParaRPr lang="zh-TW" altLang="en-US" sz="2400" dirty="0">
+              <a:solidFill>
+                <a:schemeClr val="tx1"/>
+              </a:solidFill>
+              <a:latin typeface="微軟正黑體" panose="020B0604030504040204" pitchFamily="34" charset="-120"/>
+              <a:ea typeface="微軟正黑體" panose="020B0604030504040204" pitchFamily="34" charset="-120"/>
+            </a:endParaRPr>
+          </a:p>
+        </p:txBody>
+      </p:sp>
       <p:cxnSp>
         <p:nvCxnSpPr>
           <p:cNvPr id="21" name="直線單箭頭接點 20"/>
-          <p:cNvCxnSpPr>
-            <a:stCxn id="5" idx="3"/>
-            <a:endCxn id="22" idx="0"/>
-          </p:cNvCxnSpPr>
+          <p:cNvCxnSpPr/>
           <p:nvPr/>
         </p:nvCxnSpPr>
         <p:spPr>
-          <a:xfrm>
-            <a:off x="6847879" y="3176585"/>
-            <a:ext cx="558954" cy="526258"/>
+          <a:xfrm flipH="1">
+            <a:off x="742122" y="2942451"/>
+            <a:ext cx="532496" cy="715149"/>
           </a:xfrm>
           <a:prstGeom prst="straightConnector1">
             <a:avLst/>
@@ -3919,7 +3996,7 @@
         </p:nvSpPr>
         <p:spPr>
           <a:xfrm>
-            <a:off x="7004402" y="3702843"/>
+            <a:off x="313730" y="3657600"/>
             <a:ext cx="804861" cy="361950"/>
           </a:xfrm>
           <a:prstGeom prst="rect">
@@ -3961,7 +4038,7 @@
                   <a:sysClr val="windowText" lastClr="000000"/>
                 </a:solidFill>
               </a:rPr>
-              <a:t>Layer1</a:t>
+              <a:t>Layer</a:t>
             </a:r>
             <a:endParaRPr lang="zh-TW" altLang="en-US" dirty="0">
               <a:solidFill>
@@ -4003,6 +4080,789 @@
                 <a:cs typeface="Times New Roman" panose="02020603050405020304" pitchFamily="18" charset="0"/>
               </a:rPr>
               <a:t>Figure2</a:t>
+            </a:r>
+            <a:endParaRPr lang="zh-TW" altLang="zh-TW" sz="1200" kern="100" dirty="0">
+              <a:latin typeface="Calibri" panose="020F0502020204030204" pitchFamily="34" charset="0"/>
+              <a:cs typeface="Times New Roman" panose="02020603050405020304" pitchFamily="18" charset="0"/>
+            </a:endParaRPr>
+          </a:p>
+        </p:txBody>
+      </p:sp>
+      <p:sp>
+        <p:nvSpPr>
+          <p:cNvPr id="3" name="矩形 2"/>
+          <p:cNvSpPr/>
+          <p:nvPr/>
+        </p:nvSpPr>
+        <p:spPr>
+          <a:xfrm>
+            <a:off x="1486668" y="2185990"/>
+            <a:ext cx="1194792" cy="2018827"/>
+          </a:xfrm>
+          <a:prstGeom prst="rect">
+            <a:avLst/>
+          </a:prstGeom>
+          <a:noFill/>
+          <a:ln w="28575">
+            <a:solidFill>
+              <a:srgbClr val="00B050"/>
+            </a:solidFill>
+          </a:ln>
+        </p:spPr>
+        <p:style>
+          <a:lnRef idx="2">
+            <a:schemeClr val="accent1">
+              <a:shade val="50000"/>
+            </a:schemeClr>
+          </a:lnRef>
+          <a:fillRef idx="1">
+            <a:schemeClr val="accent1"/>
+          </a:fillRef>
+          <a:effectRef idx="0">
+            <a:schemeClr val="accent1"/>
+          </a:effectRef>
+          <a:fontRef idx="minor">
+            <a:schemeClr val="lt1"/>
+          </a:fontRef>
+        </p:style>
+        <p:txBody>
+          <a:bodyPr rtlCol="0" anchor="ctr"/>
+          <a:lstStyle/>
+          <a:p>
+            <a:pPr algn="ctr"/>
+            <a:endParaRPr lang="zh-TW" altLang="en-US" dirty="0"/>
+          </a:p>
+        </p:txBody>
+      </p:sp>
+      <p:sp>
+        <p:nvSpPr>
+          <p:cNvPr id="20" name="矩形 19"/>
+          <p:cNvSpPr/>
+          <p:nvPr/>
+        </p:nvSpPr>
+        <p:spPr>
+          <a:xfrm>
+            <a:off x="2903900" y="2185989"/>
+            <a:ext cx="1194792" cy="2018827"/>
+          </a:xfrm>
+          <a:prstGeom prst="rect">
+            <a:avLst/>
+          </a:prstGeom>
+          <a:noFill/>
+          <a:ln w="28575">
+            <a:solidFill>
+              <a:srgbClr val="00B050"/>
+            </a:solidFill>
+          </a:ln>
+        </p:spPr>
+        <p:style>
+          <a:lnRef idx="2">
+            <a:schemeClr val="accent1">
+              <a:shade val="50000"/>
+            </a:schemeClr>
+          </a:lnRef>
+          <a:fillRef idx="1">
+            <a:schemeClr val="accent1"/>
+          </a:fillRef>
+          <a:effectRef idx="0">
+            <a:schemeClr val="accent1"/>
+          </a:effectRef>
+          <a:fontRef idx="minor">
+            <a:schemeClr val="lt1"/>
+          </a:fontRef>
+        </p:style>
+        <p:txBody>
+          <a:bodyPr rtlCol="0" anchor="ctr"/>
+          <a:lstStyle/>
+          <a:p>
+            <a:pPr algn="ctr"/>
+            <a:endParaRPr lang="zh-TW" altLang="en-US"/>
+          </a:p>
+        </p:txBody>
+      </p:sp>
+      <p:sp>
+        <p:nvSpPr>
+          <p:cNvPr id="23" name="矩形 22"/>
+          <p:cNvSpPr/>
+          <p:nvPr/>
+        </p:nvSpPr>
+        <p:spPr>
+          <a:xfrm>
+            <a:off x="4321132" y="2185988"/>
+            <a:ext cx="1194792" cy="2018827"/>
+          </a:xfrm>
+          <a:prstGeom prst="rect">
+            <a:avLst/>
+          </a:prstGeom>
+          <a:noFill/>
+          <a:ln w="28575">
+            <a:solidFill>
+              <a:srgbClr val="00B050"/>
+            </a:solidFill>
+          </a:ln>
+        </p:spPr>
+        <p:style>
+          <a:lnRef idx="2">
+            <a:schemeClr val="accent1">
+              <a:shade val="50000"/>
+            </a:schemeClr>
+          </a:lnRef>
+          <a:fillRef idx="1">
+            <a:schemeClr val="accent1"/>
+          </a:fillRef>
+          <a:effectRef idx="0">
+            <a:schemeClr val="accent1"/>
+          </a:effectRef>
+          <a:fontRef idx="minor">
+            <a:schemeClr val="lt1"/>
+          </a:fontRef>
+        </p:style>
+        <p:txBody>
+          <a:bodyPr rtlCol="0" anchor="ctr"/>
+          <a:lstStyle/>
+          <a:p>
+            <a:pPr algn="ctr"/>
+            <a:endParaRPr lang="zh-TW" altLang="en-US"/>
+          </a:p>
+        </p:txBody>
+      </p:sp>
+      <p:sp>
+        <p:nvSpPr>
+          <p:cNvPr id="25" name="矩形 24"/>
+          <p:cNvSpPr/>
+          <p:nvPr/>
+        </p:nvSpPr>
+        <p:spPr>
+          <a:xfrm>
+            <a:off x="5738364" y="2185987"/>
+            <a:ext cx="1194792" cy="2018827"/>
+          </a:xfrm>
+          <a:prstGeom prst="rect">
+            <a:avLst/>
+          </a:prstGeom>
+          <a:noFill/>
+          <a:ln w="28575">
+            <a:solidFill>
+              <a:srgbClr val="00B050"/>
+            </a:solidFill>
+          </a:ln>
+        </p:spPr>
+        <p:style>
+          <a:lnRef idx="2">
+            <a:schemeClr val="accent1">
+              <a:shade val="50000"/>
+            </a:schemeClr>
+          </a:lnRef>
+          <a:fillRef idx="1">
+            <a:schemeClr val="accent1"/>
+          </a:fillRef>
+          <a:effectRef idx="0">
+            <a:schemeClr val="accent1"/>
+          </a:effectRef>
+          <a:fontRef idx="minor">
+            <a:schemeClr val="lt1"/>
+          </a:fontRef>
+        </p:style>
+        <p:txBody>
+          <a:bodyPr rtlCol="0" anchor="ctr"/>
+          <a:lstStyle/>
+          <a:p>
+            <a:pPr algn="ctr"/>
+            <a:endParaRPr lang="zh-TW" altLang="en-US"/>
+          </a:p>
+        </p:txBody>
+      </p:sp>
+      <p:sp>
+        <p:nvSpPr>
+          <p:cNvPr id="7" name="文字方塊 6"/>
+          <p:cNvSpPr txBox="1"/>
+          <p:nvPr/>
+        </p:nvSpPr>
+        <p:spPr>
+          <a:xfrm>
+            <a:off x="1621527" y="2942451"/>
+            <a:ext cx="925075" cy="369332"/>
+          </a:xfrm>
+          <a:prstGeom prst="rect">
+            <a:avLst/>
+          </a:prstGeom>
+          <a:noFill/>
+        </p:spPr>
+        <p:txBody>
+          <a:bodyPr wrap="square" rtlCol="0">
+            <a:spAutoFit/>
+          </a:bodyPr>
+          <a:lstStyle/>
+          <a:p>
+            <a:r>
+              <a:rPr lang="zh-TW" altLang="en-US" dirty="0" smtClean="0">
+                <a:latin typeface="微軟正黑體" panose="020B0604030504040204" pitchFamily="34" charset="-120"/>
+                <a:ea typeface="微軟正黑體" panose="020B0604030504040204" pitchFamily="34" charset="-120"/>
+              </a:rPr>
+              <a:t>人物</a:t>
+            </a:r>
+            <a:r>
+              <a:rPr lang="en-US" altLang="zh-TW" dirty="0" smtClean="0">
+                <a:latin typeface="微軟正黑體" panose="020B0604030504040204" pitchFamily="34" charset="-120"/>
+                <a:ea typeface="微軟正黑體" panose="020B0604030504040204" pitchFamily="34" charset="-120"/>
+              </a:rPr>
+              <a:t>A</a:t>
+            </a:r>
+            <a:endParaRPr lang="zh-TW" altLang="en-US" dirty="0">
+              <a:latin typeface="微軟正黑體" panose="020B0604030504040204" pitchFamily="34" charset="-120"/>
+              <a:ea typeface="微軟正黑體" panose="020B0604030504040204" pitchFamily="34" charset="-120"/>
+            </a:endParaRPr>
+          </a:p>
+        </p:txBody>
+      </p:sp>
+      <p:sp>
+        <p:nvSpPr>
+          <p:cNvPr id="27" name="文字方塊 26"/>
+          <p:cNvSpPr txBox="1"/>
+          <p:nvPr/>
+        </p:nvSpPr>
+        <p:spPr>
+          <a:xfrm>
+            <a:off x="3061955" y="2942451"/>
+            <a:ext cx="925075" cy="369332"/>
+          </a:xfrm>
+          <a:prstGeom prst="rect">
+            <a:avLst/>
+          </a:prstGeom>
+          <a:noFill/>
+        </p:spPr>
+        <p:txBody>
+          <a:bodyPr wrap="square" rtlCol="0">
+            <a:spAutoFit/>
+          </a:bodyPr>
+          <a:lstStyle/>
+          <a:p>
+            <a:r>
+              <a:rPr lang="zh-TW" altLang="en-US" dirty="0" smtClean="0">
+                <a:latin typeface="微軟正黑體" panose="020B0604030504040204" pitchFamily="34" charset="-120"/>
+                <a:ea typeface="微軟正黑體" panose="020B0604030504040204" pitchFamily="34" charset="-120"/>
+              </a:rPr>
+              <a:t>人物</a:t>
+            </a:r>
+            <a:r>
+              <a:rPr lang="en-US" altLang="zh-TW" dirty="0" smtClean="0">
+                <a:latin typeface="微軟正黑體" panose="020B0604030504040204" pitchFamily="34" charset="-120"/>
+                <a:ea typeface="微軟正黑體" panose="020B0604030504040204" pitchFamily="34" charset="-120"/>
+              </a:rPr>
+              <a:t>B</a:t>
+            </a:r>
+            <a:endParaRPr lang="zh-TW" altLang="en-US" dirty="0">
+              <a:latin typeface="微軟正黑體" panose="020B0604030504040204" pitchFamily="34" charset="-120"/>
+              <a:ea typeface="微軟正黑體" panose="020B0604030504040204" pitchFamily="34" charset="-120"/>
+            </a:endParaRPr>
+          </a:p>
+        </p:txBody>
+      </p:sp>
+      <p:sp>
+        <p:nvSpPr>
+          <p:cNvPr id="28" name="文字方塊 27"/>
+          <p:cNvSpPr txBox="1"/>
+          <p:nvPr/>
+        </p:nvSpPr>
+        <p:spPr>
+          <a:xfrm>
+            <a:off x="4455990" y="2942451"/>
+            <a:ext cx="925075" cy="369332"/>
+          </a:xfrm>
+          <a:prstGeom prst="rect">
+            <a:avLst/>
+          </a:prstGeom>
+          <a:noFill/>
+        </p:spPr>
+        <p:txBody>
+          <a:bodyPr wrap="square" rtlCol="0">
+            <a:spAutoFit/>
+          </a:bodyPr>
+          <a:lstStyle/>
+          <a:p>
+            <a:r>
+              <a:rPr lang="zh-TW" altLang="en-US" dirty="0" smtClean="0">
+                <a:latin typeface="微軟正黑體" panose="020B0604030504040204" pitchFamily="34" charset="-120"/>
+                <a:ea typeface="微軟正黑體" panose="020B0604030504040204" pitchFamily="34" charset="-120"/>
+              </a:rPr>
+              <a:t>人物</a:t>
+            </a:r>
+            <a:r>
+              <a:rPr lang="en-US" altLang="zh-TW" dirty="0" smtClean="0">
+                <a:latin typeface="微軟正黑體" panose="020B0604030504040204" pitchFamily="34" charset="-120"/>
+                <a:ea typeface="微軟正黑體" panose="020B0604030504040204" pitchFamily="34" charset="-120"/>
+              </a:rPr>
+              <a:t>C</a:t>
+            </a:r>
+            <a:endParaRPr lang="zh-TW" altLang="en-US" dirty="0">
+              <a:latin typeface="微軟正黑體" panose="020B0604030504040204" pitchFamily="34" charset="-120"/>
+              <a:ea typeface="微軟正黑體" panose="020B0604030504040204" pitchFamily="34" charset="-120"/>
+            </a:endParaRPr>
+          </a:p>
+        </p:txBody>
+      </p:sp>
+      <p:sp>
+        <p:nvSpPr>
+          <p:cNvPr id="12" name="矩形 11"/>
+          <p:cNvSpPr/>
+          <p:nvPr/>
+        </p:nvSpPr>
+        <p:spPr>
+          <a:xfrm>
+            <a:off x="1274618" y="1165743"/>
+            <a:ext cx="5855855" cy="3600222"/>
+          </a:xfrm>
+          <a:prstGeom prst="rect">
+            <a:avLst/>
+          </a:prstGeom>
+          <a:noFill/>
+          <a:ln w="28575">
+            <a:solidFill>
+              <a:srgbClr val="0070C0"/>
+            </a:solidFill>
+            <a:prstDash val="dash"/>
+          </a:ln>
+        </p:spPr>
+        <p:style>
+          <a:lnRef idx="2">
+            <a:schemeClr val="accent1">
+              <a:shade val="50000"/>
+            </a:schemeClr>
+          </a:lnRef>
+          <a:fillRef idx="1">
+            <a:schemeClr val="accent1"/>
+          </a:fillRef>
+          <a:effectRef idx="0">
+            <a:schemeClr val="accent1"/>
+          </a:effectRef>
+          <a:fontRef idx="minor">
+            <a:schemeClr val="lt1"/>
+          </a:fontRef>
+        </p:style>
+        <p:txBody>
+          <a:bodyPr rtlCol="0" anchor="ctr"/>
+          <a:lstStyle/>
+          <a:p>
+            <a:pPr algn="ctr"/>
+            <a:endParaRPr lang="zh-TW" altLang="en-US"/>
+          </a:p>
+        </p:txBody>
+      </p:sp>
+      <p:sp>
+        <p:nvSpPr>
+          <p:cNvPr id="29" name="文字方塊 28"/>
+          <p:cNvSpPr txBox="1"/>
+          <p:nvPr/>
+        </p:nvSpPr>
+        <p:spPr>
+          <a:xfrm>
+            <a:off x="6091110" y="1042986"/>
+            <a:ext cx="1133477" cy="369332"/>
+          </a:xfrm>
+          <a:prstGeom prst="rect">
+            <a:avLst/>
+          </a:prstGeom>
+          <a:solidFill>
+            <a:srgbClr val="FFC000">
+              <a:alpha val="58824"/>
+            </a:srgbClr>
+          </a:solidFill>
+          <a:ln>
+            <a:solidFill>
+              <a:srgbClr val="FFC000"/>
+            </a:solidFill>
+          </a:ln>
+        </p:spPr>
+        <p:txBody>
+          <a:bodyPr wrap="square" rtlCol="0">
+            <a:spAutoFit/>
+          </a:bodyPr>
+          <a:lstStyle/>
+          <a:p>
+            <a:r>
+              <a:rPr lang="zh-TW" altLang="en-US" b="1" dirty="0" smtClean="0">
+                <a:latin typeface="微軟正黑體" panose="020B0604030504040204" pitchFamily="34" charset="-120"/>
+                <a:ea typeface="微軟正黑體" panose="020B0604030504040204" pitchFamily="34" charset="-120"/>
+              </a:rPr>
+              <a:t>等待遊戲</a:t>
+            </a:r>
+            <a:endParaRPr lang="zh-TW" altLang="en-US" b="1" dirty="0">
+              <a:latin typeface="微軟正黑體" panose="020B0604030504040204" pitchFamily="34" charset="-120"/>
+              <a:ea typeface="微軟正黑體" panose="020B0604030504040204" pitchFamily="34" charset="-120"/>
+            </a:endParaRPr>
+          </a:p>
+        </p:txBody>
+      </p:sp>
+    </p:spTree>
+    <p:extLst>
+      <p:ext uri="{BB962C8B-B14F-4D97-AF65-F5344CB8AC3E}">
+        <p14:creationId xmlns:p14="http://schemas.microsoft.com/office/powerpoint/2010/main" val="3598672989"/>
+      </p:ext>
+    </p:extLst>
+  </p:cSld>
+  <p:clrMapOvr>
+    <a:masterClrMapping/>
+  </p:clrMapOvr>
+  <p:timing>
+    <p:tnLst>
+      <p:par>
+        <p:cTn id="1" dur="indefinite" restart="never" nodeType="tmRoot"/>
+      </p:par>
+    </p:tnLst>
+  </p:timing>
+</p:sld>
+</file>
+
+<file path=ppt/slides/slide3.xml><?xml version="1.0" encoding="utf-8"?>
+<p:sld xmlns:a="http://schemas.openxmlformats.org/drawingml/2006/main" xmlns:r="http://schemas.openxmlformats.org/officeDocument/2006/relationships" xmlns:p="http://schemas.openxmlformats.org/presentationml/2006/main">
+  <p:cSld>
+    <p:spTree>
+      <p:nvGrpSpPr>
+        <p:cNvPr id="1" name=""/>
+        <p:cNvGrpSpPr/>
+        <p:nvPr/>
+      </p:nvGrpSpPr>
+      <p:grpSpPr>
+        <a:xfrm>
+          <a:off x="0" y="0"/>
+          <a:ext cx="0" cy="0"/>
+          <a:chOff x="0" y="0"/>
+          <a:chExt cx="0" cy="0"/>
+        </a:xfrm>
+      </p:grpSpPr>
+      <p:sp>
+        <p:nvSpPr>
+          <p:cNvPr id="4" name="矩形 3"/>
+          <p:cNvSpPr/>
+          <p:nvPr/>
+        </p:nvSpPr>
+        <p:spPr>
+          <a:xfrm>
+            <a:off x="295276" y="742950"/>
+            <a:ext cx="7762874" cy="4924425"/>
+          </a:xfrm>
+          <a:prstGeom prst="rect">
+            <a:avLst/>
+          </a:prstGeom>
+          <a:solidFill>
+            <a:schemeClr val="bg1">
+              <a:lumMod val="95000"/>
+            </a:schemeClr>
+          </a:solidFill>
+          <a:ln>
+            <a:noFill/>
+          </a:ln>
+        </p:spPr>
+        <p:style>
+          <a:lnRef idx="2">
+            <a:schemeClr val="accent1">
+              <a:shade val="50000"/>
+            </a:schemeClr>
+          </a:lnRef>
+          <a:fillRef idx="1">
+            <a:schemeClr val="accent1"/>
+          </a:fillRef>
+          <a:effectRef idx="0">
+            <a:schemeClr val="accent1"/>
+          </a:effectRef>
+          <a:fontRef idx="minor">
+            <a:schemeClr val="lt1"/>
+          </a:fontRef>
+        </p:style>
+        <p:txBody>
+          <a:bodyPr rtlCol="0" anchor="ctr"/>
+          <a:lstStyle/>
+          <a:p>
+            <a:pPr algn="ctr"/>
+            <a:endParaRPr lang="zh-TW" altLang="en-US"/>
+          </a:p>
+        </p:txBody>
+      </p:sp>
+      <p:sp>
+        <p:nvSpPr>
+          <p:cNvPr id="5" name="矩形 4"/>
+          <p:cNvSpPr/>
+          <p:nvPr/>
+        </p:nvSpPr>
+        <p:spPr>
+          <a:xfrm>
+            <a:off x="1180504" y="1042985"/>
+            <a:ext cx="5667375" cy="4267200"/>
+          </a:xfrm>
+          <a:prstGeom prst="rect">
+            <a:avLst/>
+          </a:prstGeom>
+          <a:solidFill>
+            <a:schemeClr val="bg1"/>
+          </a:solidFill>
+          <a:ln w="28575">
+            <a:solidFill>
+              <a:schemeClr val="tx1">
+                <a:lumMod val="95000"/>
+                <a:lumOff val="5000"/>
+              </a:schemeClr>
+            </a:solidFill>
+          </a:ln>
+        </p:spPr>
+        <p:style>
+          <a:lnRef idx="2">
+            <a:schemeClr val="accent1">
+              <a:shade val="50000"/>
+            </a:schemeClr>
+          </a:lnRef>
+          <a:fillRef idx="1">
+            <a:schemeClr val="accent1"/>
+          </a:fillRef>
+          <a:effectRef idx="0">
+            <a:schemeClr val="accent1"/>
+          </a:effectRef>
+          <a:fontRef idx="minor">
+            <a:schemeClr val="lt1"/>
+          </a:fontRef>
+        </p:style>
+        <p:txBody>
+          <a:bodyPr rtlCol="0" anchor="ctr"/>
+          <a:lstStyle/>
+          <a:p>
+            <a:pPr algn="ctr"/>
+            <a:endParaRPr lang="zh-TW" altLang="en-US"/>
+          </a:p>
+        </p:txBody>
+      </p:sp>
+      <p:cxnSp>
+        <p:nvCxnSpPr>
+          <p:cNvPr id="8" name="直線單箭頭接點 7"/>
+          <p:cNvCxnSpPr/>
+          <p:nvPr/>
+        </p:nvCxnSpPr>
+        <p:spPr>
+          <a:xfrm flipH="1">
+            <a:off x="794250" y="2564974"/>
+            <a:ext cx="352422" cy="295276"/>
+          </a:xfrm>
+          <a:prstGeom prst="straightConnector1">
+            <a:avLst/>
+          </a:prstGeom>
+          <a:ln w="28575">
+            <a:solidFill>
+              <a:schemeClr val="tx1">
+                <a:lumMod val="95000"/>
+                <a:lumOff val="5000"/>
+              </a:schemeClr>
+            </a:solidFill>
+            <a:tailEnd type="triangle"/>
+          </a:ln>
+        </p:spPr>
+        <p:style>
+          <a:lnRef idx="1">
+            <a:schemeClr val="accent1"/>
+          </a:lnRef>
+          <a:fillRef idx="0">
+            <a:schemeClr val="accent1"/>
+          </a:fillRef>
+          <a:effectRef idx="0">
+            <a:schemeClr val="accent1"/>
+          </a:effectRef>
+          <a:fontRef idx="minor">
+            <a:schemeClr val="tx1"/>
+          </a:fontRef>
+        </p:style>
+      </p:cxnSp>
+      <p:sp>
+        <p:nvSpPr>
+          <p:cNvPr id="9" name="矩形 8"/>
+          <p:cNvSpPr/>
+          <p:nvPr/>
+        </p:nvSpPr>
+        <p:spPr>
+          <a:xfrm>
+            <a:off x="298951" y="2865012"/>
+            <a:ext cx="804861" cy="361950"/>
+          </a:xfrm>
+          <a:prstGeom prst="rect">
+            <a:avLst/>
+          </a:prstGeom>
+          <a:solidFill>
+            <a:schemeClr val="bg1"/>
+          </a:solidFill>
+          <a:ln w="28575">
+            <a:solidFill>
+              <a:schemeClr val="tx1">
+                <a:lumMod val="95000"/>
+                <a:lumOff val="5000"/>
+              </a:schemeClr>
+            </a:solidFill>
+          </a:ln>
+        </p:spPr>
+        <p:style>
+          <a:lnRef idx="2">
+            <a:schemeClr val="accent1">
+              <a:shade val="50000"/>
+            </a:schemeClr>
+          </a:lnRef>
+          <a:fillRef idx="1">
+            <a:schemeClr val="accent1"/>
+          </a:fillRef>
+          <a:effectRef idx="0">
+            <a:schemeClr val="accent1"/>
+          </a:effectRef>
+          <a:fontRef idx="minor">
+            <a:schemeClr val="lt1"/>
+          </a:fontRef>
+        </p:style>
+        <p:txBody>
+          <a:bodyPr rtlCol="0" anchor="ctr"/>
+          <a:lstStyle/>
+          <a:p>
+            <a:pPr algn="ctr"/>
+            <a:r>
+              <a:rPr lang="en-US" altLang="zh-TW" dirty="0" smtClean="0">
+                <a:solidFill>
+                  <a:sysClr val="windowText" lastClr="000000"/>
+                </a:solidFill>
+              </a:rPr>
+              <a:t>Scene</a:t>
+            </a:r>
+            <a:endParaRPr lang="zh-TW" altLang="en-US" dirty="0">
+              <a:solidFill>
+                <a:sysClr val="windowText" lastClr="000000"/>
+              </a:solidFill>
+            </a:endParaRPr>
+          </a:p>
+        </p:txBody>
+      </p:sp>
+      <p:cxnSp>
+        <p:nvCxnSpPr>
+          <p:cNvPr id="21" name="直線單箭頭接點 20"/>
+          <p:cNvCxnSpPr>
+            <a:stCxn id="5" idx="3"/>
+            <a:endCxn id="22" idx="0"/>
+          </p:cNvCxnSpPr>
+          <p:nvPr/>
+        </p:nvCxnSpPr>
+        <p:spPr>
+          <a:xfrm>
+            <a:off x="6847879" y="3176585"/>
+            <a:ext cx="558954" cy="526258"/>
+          </a:xfrm>
+          <a:prstGeom prst="straightConnector1">
+            <a:avLst/>
+          </a:prstGeom>
+          <a:ln w="28575">
+            <a:solidFill>
+              <a:srgbClr val="0070C0"/>
+            </a:solidFill>
+            <a:prstDash val="dash"/>
+            <a:tailEnd type="triangle"/>
+          </a:ln>
+        </p:spPr>
+        <p:style>
+          <a:lnRef idx="1">
+            <a:schemeClr val="accent1"/>
+          </a:lnRef>
+          <a:fillRef idx="0">
+            <a:schemeClr val="accent1"/>
+          </a:fillRef>
+          <a:effectRef idx="0">
+            <a:schemeClr val="accent1"/>
+          </a:effectRef>
+          <a:fontRef idx="minor">
+            <a:schemeClr val="tx1"/>
+          </a:fontRef>
+        </p:style>
+      </p:cxnSp>
+      <p:sp>
+        <p:nvSpPr>
+          <p:cNvPr id="22" name="矩形 21"/>
+          <p:cNvSpPr/>
+          <p:nvPr/>
+        </p:nvSpPr>
+        <p:spPr>
+          <a:xfrm>
+            <a:off x="7004402" y="3702843"/>
+            <a:ext cx="804861" cy="361950"/>
+          </a:xfrm>
+          <a:prstGeom prst="rect">
+            <a:avLst/>
+          </a:prstGeom>
+          <a:solidFill>
+            <a:schemeClr val="bg1"/>
+          </a:solidFill>
+          <a:ln w="28575">
+            <a:solidFill>
+              <a:srgbClr val="0070C0"/>
+            </a:solidFill>
+          </a:ln>
+        </p:spPr>
+        <p:style>
+          <a:lnRef idx="2">
+            <a:schemeClr val="accent1">
+              <a:shade val="50000"/>
+            </a:schemeClr>
+          </a:lnRef>
+          <a:fillRef idx="1">
+            <a:schemeClr val="accent1"/>
+          </a:fillRef>
+          <a:effectRef idx="0">
+            <a:schemeClr val="accent1"/>
+          </a:effectRef>
+          <a:fontRef idx="minor">
+            <a:schemeClr val="lt1"/>
+          </a:fontRef>
+        </p:style>
+        <p:txBody>
+          <a:bodyPr rtlCol="0" anchor="ctr"/>
+          <a:lstStyle/>
+          <a:p>
+            <a:pPr algn="ctr"/>
+            <a:r>
+              <a:rPr lang="en-US" altLang="zh-TW" dirty="0" smtClean="0">
+                <a:solidFill>
+                  <a:sysClr val="windowText" lastClr="000000"/>
+                </a:solidFill>
+              </a:rPr>
+              <a:t>Layer1</a:t>
+            </a:r>
+            <a:endParaRPr lang="zh-TW" altLang="en-US" dirty="0">
+              <a:solidFill>
+                <a:sysClr val="windowText" lastClr="000000"/>
+              </a:solidFill>
+            </a:endParaRPr>
+          </a:p>
+        </p:txBody>
+      </p:sp>
+      <p:sp>
+        <p:nvSpPr>
+          <p:cNvPr id="24" name="矩形 23"/>
+          <p:cNvSpPr/>
+          <p:nvPr/>
+        </p:nvSpPr>
+        <p:spPr>
+          <a:xfrm>
+            <a:off x="234823" y="5211247"/>
+            <a:ext cx="883768" cy="369332"/>
+          </a:xfrm>
+          <a:prstGeom prst="rect">
+            <a:avLst/>
+          </a:prstGeom>
+        </p:spPr>
+        <p:txBody>
+          <a:bodyPr wrap="none">
+            <a:spAutoFit/>
+          </a:bodyPr>
+          <a:lstStyle/>
+          <a:p>
+            <a:pPr>
+              <a:spcAft>
+                <a:spcPts val="0"/>
+              </a:spcAft>
+            </a:pPr>
+            <a:r>
+              <a:rPr lang="en-US" altLang="zh-TW" kern="100" dirty="0" smtClean="0">
+                <a:latin typeface="Calibri" panose="020F0502020204030204" pitchFamily="34" charset="0"/>
+                <a:cs typeface="Times New Roman" panose="02020603050405020304" pitchFamily="18" charset="0"/>
+              </a:rPr>
+              <a:t>Figure3</a:t>
             </a:r>
             <a:endParaRPr lang="zh-TW" altLang="zh-TW" sz="1200" kern="100" dirty="0">
               <a:latin typeface="Calibri" panose="020F0502020204030204" pitchFamily="34" charset="0"/>
@@ -5147,6 +6007,1246 @@
       <p:transition spd="slow"/>
     </mc:Fallback>
   </mc:AlternateContent>
+  <p:timing>
+    <p:tnLst>
+      <p:par>
+        <p:cTn id="1" dur="indefinite" restart="never" nodeType="tmRoot"/>
+      </p:par>
+    </p:tnLst>
+  </p:timing>
+</p:sld>
+</file>
+
+<file path=ppt/slides/slide4.xml><?xml version="1.0" encoding="utf-8"?>
+<p:sld xmlns:a="http://schemas.openxmlformats.org/drawingml/2006/main" xmlns:r="http://schemas.openxmlformats.org/officeDocument/2006/relationships" xmlns:p="http://schemas.openxmlformats.org/presentationml/2006/main">
+  <p:cSld>
+    <p:spTree>
+      <p:nvGrpSpPr>
+        <p:cNvPr id="1" name=""/>
+        <p:cNvGrpSpPr/>
+        <p:nvPr/>
+      </p:nvGrpSpPr>
+      <p:grpSpPr>
+        <a:xfrm>
+          <a:off x="0" y="0"/>
+          <a:ext cx="0" cy="0"/>
+          <a:chOff x="0" y="0"/>
+          <a:chExt cx="0" cy="0"/>
+        </a:xfrm>
+      </p:grpSpPr>
+      <p:sp>
+        <p:nvSpPr>
+          <p:cNvPr id="4" name="矩形 3"/>
+          <p:cNvSpPr/>
+          <p:nvPr/>
+        </p:nvSpPr>
+        <p:spPr>
+          <a:xfrm>
+            <a:off x="685800" y="1085850"/>
+            <a:ext cx="8343900" cy="5181600"/>
+          </a:xfrm>
+          <a:prstGeom prst="rect">
+            <a:avLst/>
+          </a:prstGeom>
+          <a:noFill/>
+          <a:ln w="28575">
+            <a:solidFill>
+              <a:schemeClr val="bg2">
+                <a:lumMod val="10000"/>
+              </a:schemeClr>
+            </a:solidFill>
+          </a:ln>
+        </p:spPr>
+        <p:style>
+          <a:lnRef idx="2">
+            <a:schemeClr val="accent1">
+              <a:shade val="50000"/>
+            </a:schemeClr>
+          </a:lnRef>
+          <a:fillRef idx="1">
+            <a:schemeClr val="accent1"/>
+          </a:fillRef>
+          <a:effectRef idx="0">
+            <a:schemeClr val="accent1"/>
+          </a:effectRef>
+          <a:fontRef idx="minor">
+            <a:schemeClr val="lt1"/>
+          </a:fontRef>
+        </p:style>
+        <p:txBody>
+          <a:bodyPr rtlCol="0" anchor="ctr"/>
+          <a:lstStyle/>
+          <a:p>
+            <a:pPr algn="ctr"/>
+            <a:endParaRPr lang="zh-TW" altLang="en-US"/>
+          </a:p>
+        </p:txBody>
+      </p:sp>
+      <p:cxnSp>
+        <p:nvCxnSpPr>
+          <p:cNvPr id="10" name="直線接點 9"/>
+          <p:cNvCxnSpPr/>
+          <p:nvPr/>
+        </p:nvCxnSpPr>
+        <p:spPr>
+          <a:xfrm>
+            <a:off x="4723312" y="1445349"/>
+            <a:ext cx="3240000" cy="0"/>
+          </a:xfrm>
+          <a:prstGeom prst="line">
+            <a:avLst/>
+          </a:prstGeom>
+          <a:ln w="28575">
+            <a:solidFill>
+              <a:srgbClr val="FF0000"/>
+            </a:solidFill>
+          </a:ln>
+        </p:spPr>
+        <p:style>
+          <a:lnRef idx="3">
+            <a:schemeClr val="accent2"/>
+          </a:lnRef>
+          <a:fillRef idx="0">
+            <a:schemeClr val="accent2"/>
+          </a:fillRef>
+          <a:effectRef idx="2">
+            <a:schemeClr val="accent2"/>
+          </a:effectRef>
+          <a:fontRef idx="minor">
+            <a:schemeClr val="tx1"/>
+          </a:fontRef>
+        </p:style>
+      </p:cxnSp>
+      <p:cxnSp>
+        <p:nvCxnSpPr>
+          <p:cNvPr id="12" name="直線接點 11"/>
+          <p:cNvCxnSpPr/>
+          <p:nvPr/>
+        </p:nvCxnSpPr>
+        <p:spPr>
+          <a:xfrm>
+            <a:off x="1469572" y="1445350"/>
+            <a:ext cx="3240000" cy="0"/>
+          </a:xfrm>
+          <a:prstGeom prst="line">
+            <a:avLst/>
+          </a:prstGeom>
+          <a:ln w="28575">
+            <a:solidFill>
+              <a:srgbClr val="00B050"/>
+            </a:solidFill>
+          </a:ln>
+        </p:spPr>
+        <p:style>
+          <a:lnRef idx="1">
+            <a:schemeClr val="accent1"/>
+          </a:lnRef>
+          <a:fillRef idx="0">
+            <a:schemeClr val="accent1"/>
+          </a:fillRef>
+          <a:effectRef idx="0">
+            <a:schemeClr val="accent1"/>
+          </a:effectRef>
+          <a:fontRef idx="minor">
+            <a:schemeClr val="tx1"/>
+          </a:fontRef>
+        </p:style>
+      </p:cxnSp>
+      <p:sp>
+        <p:nvSpPr>
+          <p:cNvPr id="14" name="文字方塊 13"/>
+          <p:cNvSpPr txBox="1"/>
+          <p:nvPr/>
+        </p:nvSpPr>
+        <p:spPr>
+          <a:xfrm>
+            <a:off x="3932671" y="1069503"/>
+            <a:ext cx="925079" cy="369332"/>
+          </a:xfrm>
+          <a:prstGeom prst="rect">
+            <a:avLst/>
+          </a:prstGeom>
+          <a:noFill/>
+        </p:spPr>
+        <p:txBody>
+          <a:bodyPr wrap="square" rtlCol="0">
+            <a:spAutoFit/>
+          </a:bodyPr>
+          <a:lstStyle/>
+          <a:p>
+            <a:r>
+              <a:rPr lang="en-US" altLang="zh-TW" dirty="0" smtClean="0">
+                <a:solidFill>
+                  <a:srgbClr val="00B050"/>
+                </a:solidFill>
+              </a:rPr>
+              <a:t>Health</a:t>
+            </a:r>
+            <a:endParaRPr lang="zh-TW" altLang="en-US" dirty="0">
+              <a:solidFill>
+                <a:srgbClr val="00B050"/>
+              </a:solidFill>
+            </a:endParaRPr>
+          </a:p>
+        </p:txBody>
+      </p:sp>
+      <p:sp>
+        <p:nvSpPr>
+          <p:cNvPr id="15" name="文字方塊 14"/>
+          <p:cNvSpPr txBox="1"/>
+          <p:nvPr/>
+        </p:nvSpPr>
+        <p:spPr>
+          <a:xfrm>
+            <a:off x="4665618" y="1066186"/>
+            <a:ext cx="481148" cy="369332"/>
+          </a:xfrm>
+          <a:prstGeom prst="rect">
+            <a:avLst/>
+          </a:prstGeom>
+          <a:noFill/>
+        </p:spPr>
+        <p:txBody>
+          <a:bodyPr wrap="square" rtlCol="0">
+            <a:spAutoFit/>
+          </a:bodyPr>
+          <a:lstStyle/>
+          <a:p>
+            <a:r>
+              <a:rPr lang="en-US" altLang="zh-TW" dirty="0" smtClean="0">
+                <a:solidFill>
+                  <a:srgbClr val="FF0000"/>
+                </a:solidFill>
+              </a:rPr>
+              <a:t>HP</a:t>
+            </a:r>
+            <a:endParaRPr lang="zh-TW" altLang="en-US" dirty="0">
+              <a:solidFill>
+                <a:srgbClr val="FF0000"/>
+              </a:solidFill>
+            </a:endParaRPr>
+          </a:p>
+        </p:txBody>
+      </p:sp>
+      <p:sp>
+        <p:nvSpPr>
+          <p:cNvPr id="17" name="橢圓 16"/>
+          <p:cNvSpPr/>
+          <p:nvPr/>
+        </p:nvSpPr>
+        <p:spPr>
+          <a:xfrm>
+            <a:off x="1628435" y="3242037"/>
+            <a:ext cx="319390" cy="295276"/>
+          </a:xfrm>
+          <a:prstGeom prst="ellipse">
+            <a:avLst/>
+          </a:prstGeom>
+        </p:spPr>
+        <p:style>
+          <a:lnRef idx="2">
+            <a:schemeClr val="accent1">
+              <a:shade val="50000"/>
+            </a:schemeClr>
+          </a:lnRef>
+          <a:fillRef idx="1">
+            <a:schemeClr val="accent1"/>
+          </a:fillRef>
+          <a:effectRef idx="0">
+            <a:schemeClr val="accent1"/>
+          </a:effectRef>
+          <a:fontRef idx="minor">
+            <a:schemeClr val="lt1"/>
+          </a:fontRef>
+        </p:style>
+        <p:txBody>
+          <a:bodyPr rtlCol="0" anchor="ctr"/>
+          <a:lstStyle/>
+          <a:p>
+            <a:pPr algn="ctr"/>
+            <a:endParaRPr lang="zh-TW" altLang="en-US"/>
+          </a:p>
+        </p:txBody>
+      </p:sp>
+      <p:cxnSp>
+        <p:nvCxnSpPr>
+          <p:cNvPr id="18" name="直線接點 17"/>
+          <p:cNvCxnSpPr>
+            <a:stCxn id="17" idx="4"/>
+          </p:cNvCxnSpPr>
+          <p:nvPr/>
+        </p:nvCxnSpPr>
+        <p:spPr>
+          <a:xfrm>
+            <a:off x="1788130" y="3537313"/>
+            <a:ext cx="2228" cy="495299"/>
+          </a:xfrm>
+          <a:prstGeom prst="line">
+            <a:avLst/>
+          </a:prstGeom>
+        </p:spPr>
+        <p:style>
+          <a:lnRef idx="1">
+            <a:schemeClr val="accent1"/>
+          </a:lnRef>
+          <a:fillRef idx="0">
+            <a:schemeClr val="accent1"/>
+          </a:fillRef>
+          <a:effectRef idx="0">
+            <a:schemeClr val="accent1"/>
+          </a:effectRef>
+          <a:fontRef idx="minor">
+            <a:schemeClr val="tx1"/>
+          </a:fontRef>
+        </p:style>
+      </p:cxnSp>
+      <p:cxnSp>
+        <p:nvCxnSpPr>
+          <p:cNvPr id="19" name="直線接點 18"/>
+          <p:cNvCxnSpPr/>
+          <p:nvPr/>
+        </p:nvCxnSpPr>
+        <p:spPr>
+          <a:xfrm flipV="1">
+            <a:off x="1565923" y="3708762"/>
+            <a:ext cx="205385" cy="195262"/>
+          </a:xfrm>
+          <a:prstGeom prst="line">
+            <a:avLst/>
+          </a:prstGeom>
+        </p:spPr>
+        <p:style>
+          <a:lnRef idx="1">
+            <a:schemeClr val="accent1"/>
+          </a:lnRef>
+          <a:fillRef idx="0">
+            <a:schemeClr val="accent1"/>
+          </a:fillRef>
+          <a:effectRef idx="0">
+            <a:schemeClr val="accent1"/>
+          </a:effectRef>
+          <a:fontRef idx="minor">
+            <a:schemeClr val="tx1"/>
+          </a:fontRef>
+        </p:style>
+      </p:cxnSp>
+      <p:cxnSp>
+        <p:nvCxnSpPr>
+          <p:cNvPr id="20" name="直線接點 19"/>
+          <p:cNvCxnSpPr/>
+          <p:nvPr/>
+        </p:nvCxnSpPr>
+        <p:spPr>
+          <a:xfrm flipH="1">
+            <a:off x="1628435" y="4032612"/>
+            <a:ext cx="159695" cy="142875"/>
+          </a:xfrm>
+          <a:prstGeom prst="line">
+            <a:avLst/>
+          </a:prstGeom>
+        </p:spPr>
+        <p:style>
+          <a:lnRef idx="1">
+            <a:schemeClr val="accent1"/>
+          </a:lnRef>
+          <a:fillRef idx="0">
+            <a:schemeClr val="accent1"/>
+          </a:fillRef>
+          <a:effectRef idx="0">
+            <a:schemeClr val="accent1"/>
+          </a:effectRef>
+          <a:fontRef idx="minor">
+            <a:schemeClr val="tx1"/>
+          </a:fontRef>
+        </p:style>
+      </p:cxnSp>
+      <p:cxnSp>
+        <p:nvCxnSpPr>
+          <p:cNvPr id="21" name="直線接點 20"/>
+          <p:cNvCxnSpPr/>
+          <p:nvPr/>
+        </p:nvCxnSpPr>
+        <p:spPr>
+          <a:xfrm>
+            <a:off x="1791931" y="3706380"/>
+            <a:ext cx="205385" cy="195262"/>
+          </a:xfrm>
+          <a:prstGeom prst="line">
+            <a:avLst/>
+          </a:prstGeom>
+        </p:spPr>
+        <p:style>
+          <a:lnRef idx="1">
+            <a:schemeClr val="accent1"/>
+          </a:lnRef>
+          <a:fillRef idx="0">
+            <a:schemeClr val="accent1"/>
+          </a:fillRef>
+          <a:effectRef idx="0">
+            <a:schemeClr val="accent1"/>
+          </a:effectRef>
+          <a:fontRef idx="minor">
+            <a:schemeClr val="tx1"/>
+          </a:fontRef>
+        </p:style>
+      </p:cxnSp>
+      <p:cxnSp>
+        <p:nvCxnSpPr>
+          <p:cNvPr id="22" name="直線接點 21"/>
+          <p:cNvCxnSpPr/>
+          <p:nvPr/>
+        </p:nvCxnSpPr>
+        <p:spPr>
+          <a:xfrm flipH="1" flipV="1">
+            <a:off x="1854443" y="4030230"/>
+            <a:ext cx="159695" cy="142875"/>
+          </a:xfrm>
+          <a:prstGeom prst="line">
+            <a:avLst/>
+          </a:prstGeom>
+        </p:spPr>
+        <p:style>
+          <a:lnRef idx="1">
+            <a:schemeClr val="accent1"/>
+          </a:lnRef>
+          <a:fillRef idx="0">
+            <a:schemeClr val="accent1"/>
+          </a:fillRef>
+          <a:effectRef idx="0">
+            <a:schemeClr val="accent1"/>
+          </a:effectRef>
+          <a:fontRef idx="minor">
+            <a:schemeClr val="tx1"/>
+          </a:fontRef>
+        </p:style>
+      </p:cxnSp>
+      <p:sp>
+        <p:nvSpPr>
+          <p:cNvPr id="23" name="橢圓 22"/>
+          <p:cNvSpPr/>
+          <p:nvPr/>
+        </p:nvSpPr>
+        <p:spPr>
+          <a:xfrm>
+            <a:off x="4246178" y="4024243"/>
+            <a:ext cx="319390" cy="295276"/>
+          </a:xfrm>
+          <a:prstGeom prst="ellipse">
+            <a:avLst/>
+          </a:prstGeom>
+        </p:spPr>
+        <p:style>
+          <a:lnRef idx="2">
+            <a:schemeClr val="accent1">
+              <a:shade val="50000"/>
+            </a:schemeClr>
+          </a:lnRef>
+          <a:fillRef idx="1">
+            <a:schemeClr val="accent1"/>
+          </a:fillRef>
+          <a:effectRef idx="0">
+            <a:schemeClr val="accent1"/>
+          </a:effectRef>
+          <a:fontRef idx="minor">
+            <a:schemeClr val="lt1"/>
+          </a:fontRef>
+        </p:style>
+        <p:txBody>
+          <a:bodyPr rtlCol="0" anchor="ctr"/>
+          <a:lstStyle/>
+          <a:p>
+            <a:pPr algn="ctr"/>
+            <a:endParaRPr lang="zh-TW" altLang="en-US"/>
+          </a:p>
+        </p:txBody>
+      </p:sp>
+      <p:cxnSp>
+        <p:nvCxnSpPr>
+          <p:cNvPr id="24" name="直線接點 23"/>
+          <p:cNvCxnSpPr>
+            <a:stCxn id="23" idx="4"/>
+          </p:cNvCxnSpPr>
+          <p:nvPr/>
+        </p:nvCxnSpPr>
+        <p:spPr>
+          <a:xfrm>
+            <a:off x="4405873" y="4319519"/>
+            <a:ext cx="2228" cy="495299"/>
+          </a:xfrm>
+          <a:prstGeom prst="line">
+            <a:avLst/>
+          </a:prstGeom>
+        </p:spPr>
+        <p:style>
+          <a:lnRef idx="1">
+            <a:schemeClr val="accent1"/>
+          </a:lnRef>
+          <a:fillRef idx="0">
+            <a:schemeClr val="accent1"/>
+          </a:fillRef>
+          <a:effectRef idx="0">
+            <a:schemeClr val="accent1"/>
+          </a:effectRef>
+          <a:fontRef idx="minor">
+            <a:schemeClr val="tx1"/>
+          </a:fontRef>
+        </p:style>
+      </p:cxnSp>
+      <p:cxnSp>
+        <p:nvCxnSpPr>
+          <p:cNvPr id="25" name="直線接點 24"/>
+          <p:cNvCxnSpPr/>
+          <p:nvPr/>
+        </p:nvCxnSpPr>
+        <p:spPr>
+          <a:xfrm flipV="1">
+            <a:off x="4183666" y="4490968"/>
+            <a:ext cx="205385" cy="195262"/>
+          </a:xfrm>
+          <a:prstGeom prst="line">
+            <a:avLst/>
+          </a:prstGeom>
+        </p:spPr>
+        <p:style>
+          <a:lnRef idx="1">
+            <a:schemeClr val="accent1"/>
+          </a:lnRef>
+          <a:fillRef idx="0">
+            <a:schemeClr val="accent1"/>
+          </a:fillRef>
+          <a:effectRef idx="0">
+            <a:schemeClr val="accent1"/>
+          </a:effectRef>
+          <a:fontRef idx="minor">
+            <a:schemeClr val="tx1"/>
+          </a:fontRef>
+        </p:style>
+      </p:cxnSp>
+      <p:cxnSp>
+        <p:nvCxnSpPr>
+          <p:cNvPr id="26" name="直線接點 25"/>
+          <p:cNvCxnSpPr/>
+          <p:nvPr/>
+        </p:nvCxnSpPr>
+        <p:spPr>
+          <a:xfrm flipH="1">
+            <a:off x="4246178" y="4814818"/>
+            <a:ext cx="159695" cy="142875"/>
+          </a:xfrm>
+          <a:prstGeom prst="line">
+            <a:avLst/>
+          </a:prstGeom>
+        </p:spPr>
+        <p:style>
+          <a:lnRef idx="1">
+            <a:schemeClr val="accent1"/>
+          </a:lnRef>
+          <a:fillRef idx="0">
+            <a:schemeClr val="accent1"/>
+          </a:fillRef>
+          <a:effectRef idx="0">
+            <a:schemeClr val="accent1"/>
+          </a:effectRef>
+          <a:fontRef idx="minor">
+            <a:schemeClr val="tx1"/>
+          </a:fontRef>
+        </p:style>
+      </p:cxnSp>
+      <p:cxnSp>
+        <p:nvCxnSpPr>
+          <p:cNvPr id="27" name="直線接點 26"/>
+          <p:cNvCxnSpPr/>
+          <p:nvPr/>
+        </p:nvCxnSpPr>
+        <p:spPr>
+          <a:xfrm>
+            <a:off x="4409674" y="4488586"/>
+            <a:ext cx="205385" cy="195262"/>
+          </a:xfrm>
+          <a:prstGeom prst="line">
+            <a:avLst/>
+          </a:prstGeom>
+        </p:spPr>
+        <p:style>
+          <a:lnRef idx="1">
+            <a:schemeClr val="accent1"/>
+          </a:lnRef>
+          <a:fillRef idx="0">
+            <a:schemeClr val="accent1"/>
+          </a:fillRef>
+          <a:effectRef idx="0">
+            <a:schemeClr val="accent1"/>
+          </a:effectRef>
+          <a:fontRef idx="minor">
+            <a:schemeClr val="tx1"/>
+          </a:fontRef>
+        </p:style>
+      </p:cxnSp>
+      <p:cxnSp>
+        <p:nvCxnSpPr>
+          <p:cNvPr id="28" name="直線接點 27"/>
+          <p:cNvCxnSpPr/>
+          <p:nvPr/>
+        </p:nvCxnSpPr>
+        <p:spPr>
+          <a:xfrm flipH="1" flipV="1">
+            <a:off x="4472186" y="4812436"/>
+            <a:ext cx="159695" cy="142875"/>
+          </a:xfrm>
+          <a:prstGeom prst="line">
+            <a:avLst/>
+          </a:prstGeom>
+        </p:spPr>
+        <p:style>
+          <a:lnRef idx="1">
+            <a:schemeClr val="accent1"/>
+          </a:lnRef>
+          <a:fillRef idx="0">
+            <a:schemeClr val="accent1"/>
+          </a:fillRef>
+          <a:effectRef idx="0">
+            <a:schemeClr val="accent1"/>
+          </a:effectRef>
+          <a:fontRef idx="minor">
+            <a:schemeClr val="tx1"/>
+          </a:fontRef>
+        </p:style>
+      </p:cxnSp>
+      <p:sp>
+        <p:nvSpPr>
+          <p:cNvPr id="29" name="橢圓 28"/>
+          <p:cNvSpPr/>
+          <p:nvPr/>
+        </p:nvSpPr>
+        <p:spPr>
+          <a:xfrm>
+            <a:off x="6546148" y="3386069"/>
+            <a:ext cx="319390" cy="295276"/>
+          </a:xfrm>
+          <a:prstGeom prst="ellipse">
+            <a:avLst/>
+          </a:prstGeom>
+        </p:spPr>
+        <p:style>
+          <a:lnRef idx="2">
+            <a:schemeClr val="accent1">
+              <a:shade val="50000"/>
+            </a:schemeClr>
+          </a:lnRef>
+          <a:fillRef idx="1">
+            <a:schemeClr val="accent1"/>
+          </a:fillRef>
+          <a:effectRef idx="0">
+            <a:schemeClr val="accent1"/>
+          </a:effectRef>
+          <a:fontRef idx="minor">
+            <a:schemeClr val="lt1"/>
+          </a:fontRef>
+        </p:style>
+        <p:txBody>
+          <a:bodyPr rtlCol="0" anchor="ctr"/>
+          <a:lstStyle/>
+          <a:p>
+            <a:pPr algn="ctr"/>
+            <a:endParaRPr lang="zh-TW" altLang="en-US"/>
+          </a:p>
+        </p:txBody>
+      </p:sp>
+      <p:cxnSp>
+        <p:nvCxnSpPr>
+          <p:cNvPr id="30" name="直線接點 29"/>
+          <p:cNvCxnSpPr>
+            <a:stCxn id="29" idx="4"/>
+          </p:cNvCxnSpPr>
+          <p:nvPr/>
+        </p:nvCxnSpPr>
+        <p:spPr>
+          <a:xfrm>
+            <a:off x="6705843" y="3681345"/>
+            <a:ext cx="2228" cy="495299"/>
+          </a:xfrm>
+          <a:prstGeom prst="line">
+            <a:avLst/>
+          </a:prstGeom>
+        </p:spPr>
+        <p:style>
+          <a:lnRef idx="1">
+            <a:schemeClr val="accent1"/>
+          </a:lnRef>
+          <a:fillRef idx="0">
+            <a:schemeClr val="accent1"/>
+          </a:fillRef>
+          <a:effectRef idx="0">
+            <a:schemeClr val="accent1"/>
+          </a:effectRef>
+          <a:fontRef idx="minor">
+            <a:schemeClr val="tx1"/>
+          </a:fontRef>
+        </p:style>
+      </p:cxnSp>
+      <p:cxnSp>
+        <p:nvCxnSpPr>
+          <p:cNvPr id="31" name="直線接點 30"/>
+          <p:cNvCxnSpPr/>
+          <p:nvPr/>
+        </p:nvCxnSpPr>
+        <p:spPr>
+          <a:xfrm flipV="1">
+            <a:off x="6483636" y="3852794"/>
+            <a:ext cx="205385" cy="195262"/>
+          </a:xfrm>
+          <a:prstGeom prst="line">
+            <a:avLst/>
+          </a:prstGeom>
+        </p:spPr>
+        <p:style>
+          <a:lnRef idx="1">
+            <a:schemeClr val="accent1"/>
+          </a:lnRef>
+          <a:fillRef idx="0">
+            <a:schemeClr val="accent1"/>
+          </a:fillRef>
+          <a:effectRef idx="0">
+            <a:schemeClr val="accent1"/>
+          </a:effectRef>
+          <a:fontRef idx="minor">
+            <a:schemeClr val="tx1"/>
+          </a:fontRef>
+        </p:style>
+      </p:cxnSp>
+      <p:cxnSp>
+        <p:nvCxnSpPr>
+          <p:cNvPr id="32" name="直線接點 31"/>
+          <p:cNvCxnSpPr/>
+          <p:nvPr/>
+        </p:nvCxnSpPr>
+        <p:spPr>
+          <a:xfrm flipH="1">
+            <a:off x="6546148" y="4176644"/>
+            <a:ext cx="159695" cy="142875"/>
+          </a:xfrm>
+          <a:prstGeom prst="line">
+            <a:avLst/>
+          </a:prstGeom>
+        </p:spPr>
+        <p:style>
+          <a:lnRef idx="1">
+            <a:schemeClr val="accent1"/>
+          </a:lnRef>
+          <a:fillRef idx="0">
+            <a:schemeClr val="accent1"/>
+          </a:fillRef>
+          <a:effectRef idx="0">
+            <a:schemeClr val="accent1"/>
+          </a:effectRef>
+          <a:fontRef idx="minor">
+            <a:schemeClr val="tx1"/>
+          </a:fontRef>
+        </p:style>
+      </p:cxnSp>
+      <p:cxnSp>
+        <p:nvCxnSpPr>
+          <p:cNvPr id="33" name="直線接點 32"/>
+          <p:cNvCxnSpPr/>
+          <p:nvPr/>
+        </p:nvCxnSpPr>
+        <p:spPr>
+          <a:xfrm>
+            <a:off x="6709644" y="3850412"/>
+            <a:ext cx="205385" cy="195262"/>
+          </a:xfrm>
+          <a:prstGeom prst="line">
+            <a:avLst/>
+          </a:prstGeom>
+        </p:spPr>
+        <p:style>
+          <a:lnRef idx="1">
+            <a:schemeClr val="accent1"/>
+          </a:lnRef>
+          <a:fillRef idx="0">
+            <a:schemeClr val="accent1"/>
+          </a:fillRef>
+          <a:effectRef idx="0">
+            <a:schemeClr val="accent1"/>
+          </a:effectRef>
+          <a:fontRef idx="minor">
+            <a:schemeClr val="tx1"/>
+          </a:fontRef>
+        </p:style>
+      </p:cxnSp>
+      <p:cxnSp>
+        <p:nvCxnSpPr>
+          <p:cNvPr id="34" name="直線接點 33"/>
+          <p:cNvCxnSpPr/>
+          <p:nvPr/>
+        </p:nvCxnSpPr>
+        <p:spPr>
+          <a:xfrm flipH="1" flipV="1">
+            <a:off x="6772156" y="4174262"/>
+            <a:ext cx="159695" cy="142875"/>
+          </a:xfrm>
+          <a:prstGeom prst="line">
+            <a:avLst/>
+          </a:prstGeom>
+        </p:spPr>
+        <p:style>
+          <a:lnRef idx="1">
+            <a:schemeClr val="accent1"/>
+          </a:lnRef>
+          <a:fillRef idx="0">
+            <a:schemeClr val="accent1"/>
+          </a:fillRef>
+          <a:effectRef idx="0">
+            <a:schemeClr val="accent1"/>
+          </a:effectRef>
+          <a:fontRef idx="minor">
+            <a:schemeClr val="tx1"/>
+          </a:fontRef>
+        </p:style>
+      </p:cxnSp>
+      <p:sp>
+        <p:nvSpPr>
+          <p:cNvPr id="35" name="橢圓 34"/>
+          <p:cNvSpPr/>
+          <p:nvPr/>
+        </p:nvSpPr>
+        <p:spPr>
+          <a:xfrm>
+            <a:off x="2321457" y="4899316"/>
+            <a:ext cx="319390" cy="295276"/>
+          </a:xfrm>
+          <a:prstGeom prst="ellipse">
+            <a:avLst/>
+          </a:prstGeom>
+        </p:spPr>
+        <p:style>
+          <a:lnRef idx="2">
+            <a:schemeClr val="accent1">
+              <a:shade val="50000"/>
+            </a:schemeClr>
+          </a:lnRef>
+          <a:fillRef idx="1">
+            <a:schemeClr val="accent1"/>
+          </a:fillRef>
+          <a:effectRef idx="0">
+            <a:schemeClr val="accent1"/>
+          </a:effectRef>
+          <a:fontRef idx="minor">
+            <a:schemeClr val="lt1"/>
+          </a:fontRef>
+        </p:style>
+        <p:txBody>
+          <a:bodyPr rtlCol="0" anchor="ctr"/>
+          <a:lstStyle/>
+          <a:p>
+            <a:pPr algn="ctr"/>
+            <a:endParaRPr lang="zh-TW" altLang="en-US"/>
+          </a:p>
+        </p:txBody>
+      </p:sp>
+      <p:cxnSp>
+        <p:nvCxnSpPr>
+          <p:cNvPr id="36" name="直線接點 35"/>
+          <p:cNvCxnSpPr>
+            <a:stCxn id="35" idx="4"/>
+          </p:cNvCxnSpPr>
+          <p:nvPr/>
+        </p:nvCxnSpPr>
+        <p:spPr>
+          <a:xfrm>
+            <a:off x="2481152" y="5194592"/>
+            <a:ext cx="2228" cy="495299"/>
+          </a:xfrm>
+          <a:prstGeom prst="line">
+            <a:avLst/>
+          </a:prstGeom>
+        </p:spPr>
+        <p:style>
+          <a:lnRef idx="1">
+            <a:schemeClr val="accent1"/>
+          </a:lnRef>
+          <a:fillRef idx="0">
+            <a:schemeClr val="accent1"/>
+          </a:fillRef>
+          <a:effectRef idx="0">
+            <a:schemeClr val="accent1"/>
+          </a:effectRef>
+          <a:fontRef idx="minor">
+            <a:schemeClr val="tx1"/>
+          </a:fontRef>
+        </p:style>
+      </p:cxnSp>
+      <p:cxnSp>
+        <p:nvCxnSpPr>
+          <p:cNvPr id="37" name="直線接點 36"/>
+          <p:cNvCxnSpPr/>
+          <p:nvPr/>
+        </p:nvCxnSpPr>
+        <p:spPr>
+          <a:xfrm flipV="1">
+            <a:off x="2258945" y="5366041"/>
+            <a:ext cx="205385" cy="195262"/>
+          </a:xfrm>
+          <a:prstGeom prst="line">
+            <a:avLst/>
+          </a:prstGeom>
+        </p:spPr>
+        <p:style>
+          <a:lnRef idx="1">
+            <a:schemeClr val="accent1"/>
+          </a:lnRef>
+          <a:fillRef idx="0">
+            <a:schemeClr val="accent1"/>
+          </a:fillRef>
+          <a:effectRef idx="0">
+            <a:schemeClr val="accent1"/>
+          </a:effectRef>
+          <a:fontRef idx="minor">
+            <a:schemeClr val="tx1"/>
+          </a:fontRef>
+        </p:style>
+      </p:cxnSp>
+      <p:cxnSp>
+        <p:nvCxnSpPr>
+          <p:cNvPr id="38" name="直線接點 37"/>
+          <p:cNvCxnSpPr/>
+          <p:nvPr/>
+        </p:nvCxnSpPr>
+        <p:spPr>
+          <a:xfrm flipH="1">
+            <a:off x="2321457" y="5689891"/>
+            <a:ext cx="159695" cy="142875"/>
+          </a:xfrm>
+          <a:prstGeom prst="line">
+            <a:avLst/>
+          </a:prstGeom>
+        </p:spPr>
+        <p:style>
+          <a:lnRef idx="1">
+            <a:schemeClr val="accent1"/>
+          </a:lnRef>
+          <a:fillRef idx="0">
+            <a:schemeClr val="accent1"/>
+          </a:fillRef>
+          <a:effectRef idx="0">
+            <a:schemeClr val="accent1"/>
+          </a:effectRef>
+          <a:fontRef idx="minor">
+            <a:schemeClr val="tx1"/>
+          </a:fontRef>
+        </p:style>
+      </p:cxnSp>
+      <p:cxnSp>
+        <p:nvCxnSpPr>
+          <p:cNvPr id="39" name="直線接點 38"/>
+          <p:cNvCxnSpPr/>
+          <p:nvPr/>
+        </p:nvCxnSpPr>
+        <p:spPr>
+          <a:xfrm>
+            <a:off x="2484953" y="5363659"/>
+            <a:ext cx="205385" cy="195262"/>
+          </a:xfrm>
+          <a:prstGeom prst="line">
+            <a:avLst/>
+          </a:prstGeom>
+        </p:spPr>
+        <p:style>
+          <a:lnRef idx="1">
+            <a:schemeClr val="accent1"/>
+          </a:lnRef>
+          <a:fillRef idx="0">
+            <a:schemeClr val="accent1"/>
+          </a:fillRef>
+          <a:effectRef idx="0">
+            <a:schemeClr val="accent1"/>
+          </a:effectRef>
+          <a:fontRef idx="minor">
+            <a:schemeClr val="tx1"/>
+          </a:fontRef>
+        </p:style>
+      </p:cxnSp>
+      <p:cxnSp>
+        <p:nvCxnSpPr>
+          <p:cNvPr id="40" name="直線接點 39"/>
+          <p:cNvCxnSpPr/>
+          <p:nvPr/>
+        </p:nvCxnSpPr>
+        <p:spPr>
+          <a:xfrm flipH="1" flipV="1">
+            <a:off x="2547465" y="5687509"/>
+            <a:ext cx="159695" cy="142875"/>
+          </a:xfrm>
+          <a:prstGeom prst="line">
+            <a:avLst/>
+          </a:prstGeom>
+        </p:spPr>
+        <p:style>
+          <a:lnRef idx="1">
+            <a:schemeClr val="accent1"/>
+          </a:lnRef>
+          <a:fillRef idx="0">
+            <a:schemeClr val="accent1"/>
+          </a:fillRef>
+          <a:effectRef idx="0">
+            <a:schemeClr val="accent1"/>
+          </a:effectRef>
+          <a:fontRef idx="minor">
+            <a:schemeClr val="tx1"/>
+          </a:fontRef>
+        </p:style>
+      </p:cxnSp>
+      <p:cxnSp>
+        <p:nvCxnSpPr>
+          <p:cNvPr id="42" name="直線接點 41"/>
+          <p:cNvCxnSpPr/>
+          <p:nvPr/>
+        </p:nvCxnSpPr>
+        <p:spPr>
+          <a:xfrm>
+            <a:off x="1534169" y="4317137"/>
+            <a:ext cx="551806" cy="0"/>
+          </a:xfrm>
+          <a:prstGeom prst="line">
+            <a:avLst/>
+          </a:prstGeom>
+          <a:ln w="19050">
+            <a:solidFill>
+              <a:srgbClr val="FF0000"/>
+            </a:solidFill>
+          </a:ln>
+        </p:spPr>
+        <p:style>
+          <a:lnRef idx="1">
+            <a:schemeClr val="accent1"/>
+          </a:lnRef>
+          <a:fillRef idx="0">
+            <a:schemeClr val="accent1"/>
+          </a:fillRef>
+          <a:effectRef idx="0">
+            <a:schemeClr val="accent1"/>
+          </a:effectRef>
+          <a:fontRef idx="minor">
+            <a:schemeClr val="tx1"/>
+          </a:fontRef>
+        </p:style>
+      </p:cxnSp>
+      <p:cxnSp>
+        <p:nvCxnSpPr>
+          <p:cNvPr id="45" name="直線接點 44"/>
+          <p:cNvCxnSpPr/>
+          <p:nvPr/>
+        </p:nvCxnSpPr>
+        <p:spPr>
+          <a:xfrm>
+            <a:off x="2258945" y="5938698"/>
+            <a:ext cx="507922" cy="0"/>
+          </a:xfrm>
+          <a:prstGeom prst="line">
+            <a:avLst/>
+          </a:prstGeom>
+          <a:ln w="19050">
+            <a:solidFill>
+              <a:srgbClr val="FF0000"/>
+            </a:solidFill>
+          </a:ln>
+        </p:spPr>
+        <p:style>
+          <a:lnRef idx="1">
+            <a:schemeClr val="accent1"/>
+          </a:lnRef>
+          <a:fillRef idx="0">
+            <a:schemeClr val="accent1"/>
+          </a:fillRef>
+          <a:effectRef idx="0">
+            <a:schemeClr val="accent1"/>
+          </a:effectRef>
+          <a:fontRef idx="minor">
+            <a:schemeClr val="tx1"/>
+          </a:fontRef>
+        </p:style>
+      </p:cxnSp>
+      <p:cxnSp>
+        <p:nvCxnSpPr>
+          <p:cNvPr id="47" name="直線接點 46"/>
+          <p:cNvCxnSpPr/>
+          <p:nvPr/>
+        </p:nvCxnSpPr>
+        <p:spPr>
+          <a:xfrm>
+            <a:off x="4218225" y="5062398"/>
+            <a:ext cx="507922" cy="0"/>
+          </a:xfrm>
+          <a:prstGeom prst="line">
+            <a:avLst/>
+          </a:prstGeom>
+          <a:ln w="19050">
+            <a:solidFill>
+              <a:srgbClr val="FF0000"/>
+            </a:solidFill>
+          </a:ln>
+        </p:spPr>
+        <p:style>
+          <a:lnRef idx="1">
+            <a:schemeClr val="accent1"/>
+          </a:lnRef>
+          <a:fillRef idx="0">
+            <a:schemeClr val="accent1"/>
+          </a:fillRef>
+          <a:effectRef idx="0">
+            <a:schemeClr val="accent1"/>
+          </a:effectRef>
+          <a:fontRef idx="minor">
+            <a:schemeClr val="tx1"/>
+          </a:fontRef>
+        </p:style>
+      </p:cxnSp>
+      <p:cxnSp>
+        <p:nvCxnSpPr>
+          <p:cNvPr id="48" name="直線接點 47"/>
+          <p:cNvCxnSpPr/>
+          <p:nvPr/>
+        </p:nvCxnSpPr>
+        <p:spPr>
+          <a:xfrm>
+            <a:off x="6546148" y="4488586"/>
+            <a:ext cx="507922" cy="0"/>
+          </a:xfrm>
+          <a:prstGeom prst="line">
+            <a:avLst/>
+          </a:prstGeom>
+          <a:ln w="19050">
+            <a:solidFill>
+              <a:srgbClr val="FF0000"/>
+            </a:solidFill>
+          </a:ln>
+        </p:spPr>
+        <p:style>
+          <a:lnRef idx="1">
+            <a:schemeClr val="accent1"/>
+          </a:lnRef>
+          <a:fillRef idx="0">
+            <a:schemeClr val="accent1"/>
+          </a:fillRef>
+          <a:effectRef idx="0">
+            <a:schemeClr val="accent1"/>
+          </a:effectRef>
+          <a:fontRef idx="minor">
+            <a:schemeClr val="tx1"/>
+          </a:fontRef>
+        </p:style>
+      </p:cxnSp>
+      <p:cxnSp>
+        <p:nvCxnSpPr>
+          <p:cNvPr id="51" name="直線接點 50"/>
+          <p:cNvCxnSpPr/>
+          <p:nvPr/>
+        </p:nvCxnSpPr>
+        <p:spPr>
+          <a:xfrm>
+            <a:off x="1534169" y="4417150"/>
+            <a:ext cx="551806" cy="0"/>
+          </a:xfrm>
+          <a:prstGeom prst="line">
+            <a:avLst/>
+          </a:prstGeom>
+          <a:ln w="28575">
+            <a:solidFill>
+              <a:srgbClr val="00B050"/>
+            </a:solidFill>
+          </a:ln>
+        </p:spPr>
+        <p:style>
+          <a:lnRef idx="1">
+            <a:schemeClr val="accent1"/>
+          </a:lnRef>
+          <a:fillRef idx="0">
+            <a:schemeClr val="accent1"/>
+          </a:fillRef>
+          <a:effectRef idx="0">
+            <a:schemeClr val="accent1"/>
+          </a:effectRef>
+          <a:fontRef idx="minor">
+            <a:schemeClr val="tx1"/>
+          </a:fontRef>
+        </p:style>
+      </p:cxnSp>
+      <p:cxnSp>
+        <p:nvCxnSpPr>
+          <p:cNvPr id="54" name="直線單箭頭接點 53"/>
+          <p:cNvCxnSpPr/>
+          <p:nvPr/>
+        </p:nvCxnSpPr>
+        <p:spPr>
+          <a:xfrm>
+            <a:off x="1788130" y="2847975"/>
+            <a:ext cx="0" cy="279762"/>
+          </a:xfrm>
+          <a:prstGeom prst="straightConnector1">
+            <a:avLst/>
+          </a:prstGeom>
+          <a:ln w="57150">
+            <a:solidFill>
+              <a:srgbClr val="FFC000"/>
+            </a:solidFill>
+            <a:tailEnd type="triangle"/>
+          </a:ln>
+        </p:spPr>
+        <p:style>
+          <a:lnRef idx="1">
+            <a:schemeClr val="accent1"/>
+          </a:lnRef>
+          <a:fillRef idx="0">
+            <a:schemeClr val="accent1"/>
+          </a:fillRef>
+          <a:effectRef idx="0">
+            <a:schemeClr val="accent1"/>
+          </a:effectRef>
+          <a:fontRef idx="minor">
+            <a:schemeClr val="tx1"/>
+          </a:fontRef>
+        </p:style>
+      </p:cxnSp>
+      <p:sp>
+        <p:nvSpPr>
+          <p:cNvPr id="56" name="文字方塊 55"/>
+          <p:cNvSpPr txBox="1"/>
+          <p:nvPr/>
+        </p:nvSpPr>
+        <p:spPr>
+          <a:xfrm>
+            <a:off x="1590311" y="4009956"/>
+            <a:ext cx="1100027" cy="369332"/>
+          </a:xfrm>
+          <a:prstGeom prst="rect">
+            <a:avLst/>
+          </a:prstGeom>
+          <a:noFill/>
+        </p:spPr>
+        <p:txBody>
+          <a:bodyPr wrap="square" rtlCol="0">
+            <a:spAutoFit/>
+          </a:bodyPr>
+          <a:lstStyle/>
+          <a:p>
+            <a:r>
+              <a:rPr lang="en-US" altLang="zh-TW" dirty="0" smtClean="0"/>
+              <a:t>Me</a:t>
+            </a:r>
+            <a:endParaRPr lang="zh-TW" altLang="en-US" dirty="0"/>
+          </a:p>
+        </p:txBody>
+      </p:sp>
+    </p:spTree>
+    <p:extLst>
+      <p:ext uri="{BB962C8B-B14F-4D97-AF65-F5344CB8AC3E}">
+        <p14:creationId xmlns:p14="http://schemas.microsoft.com/office/powerpoint/2010/main" val="3495098673"/>
+      </p:ext>
+    </p:extLst>
+  </p:cSld>
+  <p:clrMapOvr>
+    <a:masterClrMapping/>
+  </p:clrMapOvr>
   <p:timing>
     <p:tnLst>
       <p:par>

</xml_diff>

<commit_message>
Add rob example image
</commit_message>
<xml_diff>
--- a/Document/View.pptx
+++ b/Document/View.pptx
@@ -9,6 +9,8 @@
     <p:sldId id="258" r:id="rId3"/>
     <p:sldId id="257" r:id="rId4"/>
     <p:sldId id="259" r:id="rId5"/>
+    <p:sldId id="260" r:id="rId6"/>
+    <p:sldId id="261" r:id="rId7"/>
   </p:sldIdLst>
   <p:sldSz cx="12192000" cy="6858000"/>
   <p:notesSz cx="6858000" cy="9144000"/>
@@ -246,7 +248,7 @@
           <a:p>
             <a:fld id="{C1AF68DD-3401-4B0B-B3BB-757E2922155C}" type="datetimeFigureOut">
               <a:rPr lang="zh-TW" altLang="en-US" smtClean="0"/>
-              <a:t>2015/12/22</a:t>
+              <a:t>2015/12/23</a:t>
             </a:fld>
             <a:endParaRPr lang="zh-TW" altLang="en-US"/>
           </a:p>
@@ -416,7 +418,7 @@
           <a:p>
             <a:fld id="{C1AF68DD-3401-4B0B-B3BB-757E2922155C}" type="datetimeFigureOut">
               <a:rPr lang="zh-TW" altLang="en-US" smtClean="0"/>
-              <a:t>2015/12/22</a:t>
+              <a:t>2015/12/23</a:t>
             </a:fld>
             <a:endParaRPr lang="zh-TW" altLang="en-US"/>
           </a:p>
@@ -596,7 +598,7 @@
           <a:p>
             <a:fld id="{C1AF68DD-3401-4B0B-B3BB-757E2922155C}" type="datetimeFigureOut">
               <a:rPr lang="zh-TW" altLang="en-US" smtClean="0"/>
-              <a:t>2015/12/22</a:t>
+              <a:t>2015/12/23</a:t>
             </a:fld>
             <a:endParaRPr lang="zh-TW" altLang="en-US"/>
           </a:p>
@@ -766,7 +768,7 @@
           <a:p>
             <a:fld id="{C1AF68DD-3401-4B0B-B3BB-757E2922155C}" type="datetimeFigureOut">
               <a:rPr lang="zh-TW" altLang="en-US" smtClean="0"/>
-              <a:t>2015/12/22</a:t>
+              <a:t>2015/12/23</a:t>
             </a:fld>
             <a:endParaRPr lang="zh-TW" altLang="en-US"/>
           </a:p>
@@ -1012,7 +1014,7 @@
           <a:p>
             <a:fld id="{C1AF68DD-3401-4B0B-B3BB-757E2922155C}" type="datetimeFigureOut">
               <a:rPr lang="zh-TW" altLang="en-US" smtClean="0"/>
-              <a:t>2015/12/22</a:t>
+              <a:t>2015/12/23</a:t>
             </a:fld>
             <a:endParaRPr lang="zh-TW" altLang="en-US"/>
           </a:p>
@@ -1244,7 +1246,7 @@
           <a:p>
             <a:fld id="{C1AF68DD-3401-4B0B-B3BB-757E2922155C}" type="datetimeFigureOut">
               <a:rPr lang="zh-TW" altLang="en-US" smtClean="0"/>
-              <a:t>2015/12/22</a:t>
+              <a:t>2015/12/23</a:t>
             </a:fld>
             <a:endParaRPr lang="zh-TW" altLang="en-US"/>
           </a:p>
@@ -1611,7 +1613,7 @@
           <a:p>
             <a:fld id="{C1AF68DD-3401-4B0B-B3BB-757E2922155C}" type="datetimeFigureOut">
               <a:rPr lang="zh-TW" altLang="en-US" smtClean="0"/>
-              <a:t>2015/12/22</a:t>
+              <a:t>2015/12/23</a:t>
             </a:fld>
             <a:endParaRPr lang="zh-TW" altLang="en-US"/>
           </a:p>
@@ -1729,7 +1731,7 @@
           <a:p>
             <a:fld id="{C1AF68DD-3401-4B0B-B3BB-757E2922155C}" type="datetimeFigureOut">
               <a:rPr lang="zh-TW" altLang="en-US" smtClean="0"/>
-              <a:t>2015/12/22</a:t>
+              <a:t>2015/12/23</a:t>
             </a:fld>
             <a:endParaRPr lang="zh-TW" altLang="en-US"/>
           </a:p>
@@ -1824,7 +1826,7 @@
           <a:p>
             <a:fld id="{C1AF68DD-3401-4B0B-B3BB-757E2922155C}" type="datetimeFigureOut">
               <a:rPr lang="zh-TW" altLang="en-US" smtClean="0"/>
-              <a:t>2015/12/22</a:t>
+              <a:t>2015/12/23</a:t>
             </a:fld>
             <a:endParaRPr lang="zh-TW" altLang="en-US"/>
           </a:p>
@@ -2101,7 +2103,7 @@
           <a:p>
             <a:fld id="{C1AF68DD-3401-4B0B-B3BB-757E2922155C}" type="datetimeFigureOut">
               <a:rPr lang="zh-TW" altLang="en-US" smtClean="0"/>
-              <a:t>2015/12/22</a:t>
+              <a:t>2015/12/23</a:t>
             </a:fld>
             <a:endParaRPr lang="zh-TW" altLang="en-US"/>
           </a:p>
@@ -2354,7 +2356,7 @@
           <a:p>
             <a:fld id="{C1AF68DD-3401-4B0B-B3BB-757E2922155C}" type="datetimeFigureOut">
               <a:rPr lang="zh-TW" altLang="en-US" smtClean="0"/>
-              <a:t>2015/12/22</a:t>
+              <a:t>2015/12/23</a:t>
             </a:fld>
             <a:endParaRPr lang="zh-TW" altLang="en-US"/>
           </a:p>
@@ -2567,7 +2569,7 @@
           <a:p>
             <a:fld id="{C1AF68DD-3401-4B0B-B3BB-757E2922155C}" type="datetimeFigureOut">
               <a:rPr lang="zh-TW" altLang="en-US" smtClean="0"/>
-              <a:t>2015/12/22</a:t>
+              <a:t>2015/12/23</a:t>
             </a:fld>
             <a:endParaRPr lang="zh-TW" altLang="en-US"/>
           </a:p>
@@ -5999,11 +6001,11 @@
   <p:clrMapOvr>
     <a:masterClrMapping/>
   </p:clrMapOvr>
-  <mc:AlternateContent xmlns:mc="http://schemas.openxmlformats.org/markup-compatibility/2006">
-    <mc:Choice xmlns:p14="http://schemas.microsoft.com/office/powerpoint/2010/main" Requires="p14">
+  <mc:AlternateContent xmlns:mc="http://schemas.openxmlformats.org/markup-compatibility/2006" xmlns:p14="http://schemas.microsoft.com/office/powerpoint/2010/main">
+    <mc:Choice Requires="p14">
       <p:transition spd="slow" p14:dur="2000"/>
     </mc:Choice>
-    <mc:Fallback>
+    <mc:Fallback xmlns="">
       <p:transition spd="slow"/>
     </mc:Fallback>
   </mc:AlternateContent>
@@ -6090,7 +6092,7 @@
         </p:nvCxnSpPr>
         <p:spPr>
           <a:xfrm>
-            <a:off x="4723312" y="1445349"/>
+            <a:off x="861152" y="1453784"/>
             <a:ext cx="3240000" cy="0"/>
           </a:xfrm>
           <a:prstGeom prst="line">
@@ -6125,7 +6127,7 @@
         </p:nvCxnSpPr>
         <p:spPr>
           <a:xfrm>
-            <a:off x="1469572" y="1445350"/>
+            <a:off x="844330" y="1906904"/>
             <a:ext cx="3240000" cy="0"/>
           </a:xfrm>
           <a:prstGeom prst="line">
@@ -6160,7 +6162,7 @@
         </p:nvSpPr>
         <p:spPr>
           <a:xfrm>
-            <a:off x="3932671" y="1069503"/>
+            <a:off x="762694" y="1555803"/>
             <a:ext cx="925079" cy="369332"/>
           </a:xfrm>
           <a:prstGeom prst="rect">
@@ -6198,7 +6200,7 @@
         </p:nvSpPr>
         <p:spPr>
           <a:xfrm>
-            <a:off x="4665618" y="1066186"/>
+            <a:off x="837112" y="1076017"/>
             <a:ext cx="481148" cy="369332"/>
           </a:xfrm>
           <a:prstGeom prst="rect">
@@ -6998,14 +7000,14 @@
       </p:cxnSp>
       <p:cxnSp>
         <p:nvCxnSpPr>
-          <p:cNvPr id="42" name="直線接點 41"/>
+          <p:cNvPr id="45" name="直線接點 44"/>
           <p:cNvCxnSpPr/>
           <p:nvPr/>
         </p:nvCxnSpPr>
         <p:spPr>
           <a:xfrm>
-            <a:off x="1534169" y="4317137"/>
-            <a:ext cx="551806" cy="0"/>
+            <a:off x="2258945" y="5938698"/>
+            <a:ext cx="507922" cy="0"/>
           </a:xfrm>
           <a:prstGeom prst="line">
             <a:avLst/>
@@ -7033,13 +7035,13 @@
       </p:cxnSp>
       <p:cxnSp>
         <p:nvCxnSpPr>
-          <p:cNvPr id="45" name="直線接點 44"/>
+          <p:cNvPr id="47" name="直線接點 46"/>
           <p:cNvCxnSpPr/>
           <p:nvPr/>
         </p:nvCxnSpPr>
         <p:spPr>
           <a:xfrm>
-            <a:off x="2258945" y="5938698"/>
+            <a:off x="4218225" y="5062398"/>
             <a:ext cx="507922" cy="0"/>
           </a:xfrm>
           <a:prstGeom prst="line">
@@ -7068,13 +7070,13 @@
       </p:cxnSp>
       <p:cxnSp>
         <p:nvCxnSpPr>
-          <p:cNvPr id="47" name="直線接點 46"/>
+          <p:cNvPr id="48" name="直線接點 47"/>
           <p:cNvCxnSpPr/>
           <p:nvPr/>
         </p:nvCxnSpPr>
         <p:spPr>
           <a:xfrm>
-            <a:off x="4218225" y="5062398"/>
+            <a:off x="6546148" y="4488586"/>
             <a:ext cx="507922" cy="0"/>
           </a:xfrm>
           <a:prstGeom prst="line">
@@ -7083,76 +7085,6 @@
           <a:ln w="19050">
             <a:solidFill>
               <a:srgbClr val="FF0000"/>
-            </a:solidFill>
-          </a:ln>
-        </p:spPr>
-        <p:style>
-          <a:lnRef idx="1">
-            <a:schemeClr val="accent1"/>
-          </a:lnRef>
-          <a:fillRef idx="0">
-            <a:schemeClr val="accent1"/>
-          </a:fillRef>
-          <a:effectRef idx="0">
-            <a:schemeClr val="accent1"/>
-          </a:effectRef>
-          <a:fontRef idx="minor">
-            <a:schemeClr val="tx1"/>
-          </a:fontRef>
-        </p:style>
-      </p:cxnSp>
-      <p:cxnSp>
-        <p:nvCxnSpPr>
-          <p:cNvPr id="48" name="直線接點 47"/>
-          <p:cNvCxnSpPr/>
-          <p:nvPr/>
-        </p:nvCxnSpPr>
-        <p:spPr>
-          <a:xfrm>
-            <a:off x="6546148" y="4488586"/>
-            <a:ext cx="507922" cy="0"/>
-          </a:xfrm>
-          <a:prstGeom prst="line">
-            <a:avLst/>
-          </a:prstGeom>
-          <a:ln w="19050">
-            <a:solidFill>
-              <a:srgbClr val="FF0000"/>
-            </a:solidFill>
-          </a:ln>
-        </p:spPr>
-        <p:style>
-          <a:lnRef idx="1">
-            <a:schemeClr val="accent1"/>
-          </a:lnRef>
-          <a:fillRef idx="0">
-            <a:schemeClr val="accent1"/>
-          </a:fillRef>
-          <a:effectRef idx="0">
-            <a:schemeClr val="accent1"/>
-          </a:effectRef>
-          <a:fontRef idx="minor">
-            <a:schemeClr val="tx1"/>
-          </a:fontRef>
-        </p:style>
-      </p:cxnSp>
-      <p:cxnSp>
-        <p:nvCxnSpPr>
-          <p:cNvPr id="51" name="直線接點 50"/>
-          <p:cNvCxnSpPr/>
-          <p:nvPr/>
-        </p:nvCxnSpPr>
-        <p:spPr>
-          <a:xfrm>
-            <a:off x="1534169" y="4417150"/>
-            <a:ext cx="551806" cy="0"/>
-          </a:xfrm>
-          <a:prstGeom prst="line">
-            <a:avLst/>
-          </a:prstGeom>
-          <a:ln w="28575">
-            <a:solidFill>
-              <a:srgbClr val="00B050"/>
             </a:solidFill>
           </a:ln>
         </p:spPr>
@@ -7215,7 +7147,7 @@
         </p:nvSpPr>
         <p:spPr>
           <a:xfrm>
-            <a:off x="1590311" y="4009956"/>
+            <a:off x="1541807" y="2491860"/>
             <a:ext cx="1100027" cy="369332"/>
           </a:xfrm>
           <a:prstGeom prst="rect">
@@ -7231,7 +7163,7 @@
           <a:p>
             <a:r>
               <a:rPr lang="en-US" altLang="zh-TW" dirty="0" smtClean="0"/>
-              <a:t>Me</a:t>
+              <a:t>(Me)</a:t>
             </a:r>
             <a:endParaRPr lang="zh-TW" altLang="en-US" dirty="0"/>
           </a:p>
@@ -7241,6 +7173,2533 @@
     <p:extLst>
       <p:ext uri="{BB962C8B-B14F-4D97-AF65-F5344CB8AC3E}">
         <p14:creationId xmlns:p14="http://schemas.microsoft.com/office/powerpoint/2010/main" val="3495098673"/>
+      </p:ext>
+    </p:extLst>
+  </p:cSld>
+  <p:clrMapOvr>
+    <a:masterClrMapping/>
+  </p:clrMapOvr>
+  <p:timing>
+    <p:tnLst>
+      <p:par>
+        <p:cTn id="1" dur="indefinite" restart="never" nodeType="tmRoot"/>
+      </p:par>
+    </p:tnLst>
+  </p:timing>
+</p:sld>
+</file>
+
+<file path=ppt/slides/slide5.xml><?xml version="1.0" encoding="utf-8"?>
+<p:sld xmlns:a="http://schemas.openxmlformats.org/drawingml/2006/main" xmlns:r="http://schemas.openxmlformats.org/officeDocument/2006/relationships" xmlns:p="http://schemas.openxmlformats.org/presentationml/2006/main">
+  <p:cSld>
+    <p:spTree>
+      <p:nvGrpSpPr>
+        <p:cNvPr id="1" name=""/>
+        <p:cNvGrpSpPr/>
+        <p:nvPr/>
+      </p:nvGrpSpPr>
+      <p:grpSpPr>
+        <a:xfrm>
+          <a:off x="0" y="0"/>
+          <a:ext cx="0" cy="0"/>
+          <a:chOff x="0" y="0"/>
+          <a:chExt cx="0" cy="0"/>
+        </a:xfrm>
+      </p:grpSpPr>
+      <p:sp>
+        <p:nvSpPr>
+          <p:cNvPr id="4" name="矩形 3"/>
+          <p:cNvSpPr/>
+          <p:nvPr/>
+        </p:nvSpPr>
+        <p:spPr>
+          <a:xfrm>
+            <a:off x="685800" y="1085850"/>
+            <a:ext cx="8343900" cy="5181600"/>
+          </a:xfrm>
+          <a:prstGeom prst="rect">
+            <a:avLst/>
+          </a:prstGeom>
+          <a:noFill/>
+          <a:ln w="28575">
+            <a:solidFill>
+              <a:schemeClr val="bg2">
+                <a:lumMod val="10000"/>
+              </a:schemeClr>
+            </a:solidFill>
+          </a:ln>
+        </p:spPr>
+        <p:style>
+          <a:lnRef idx="2">
+            <a:schemeClr val="accent1">
+              <a:shade val="50000"/>
+            </a:schemeClr>
+          </a:lnRef>
+          <a:fillRef idx="1">
+            <a:schemeClr val="accent1"/>
+          </a:fillRef>
+          <a:effectRef idx="0">
+            <a:schemeClr val="accent1"/>
+          </a:effectRef>
+          <a:fontRef idx="minor">
+            <a:schemeClr val="lt1"/>
+          </a:fontRef>
+        </p:style>
+        <p:txBody>
+          <a:bodyPr rtlCol="0" anchor="ctr"/>
+          <a:lstStyle/>
+          <a:p>
+            <a:pPr algn="ctr"/>
+            <a:endParaRPr lang="zh-TW" altLang="en-US"/>
+          </a:p>
+        </p:txBody>
+      </p:sp>
+      <p:cxnSp>
+        <p:nvCxnSpPr>
+          <p:cNvPr id="5" name="直線接點 4"/>
+          <p:cNvCxnSpPr/>
+          <p:nvPr/>
+        </p:nvCxnSpPr>
+        <p:spPr>
+          <a:xfrm>
+            <a:off x="861152" y="1453784"/>
+            <a:ext cx="3240000" cy="0"/>
+          </a:xfrm>
+          <a:prstGeom prst="line">
+            <a:avLst/>
+          </a:prstGeom>
+          <a:ln w="28575">
+            <a:solidFill>
+              <a:srgbClr val="FF0000"/>
+            </a:solidFill>
+          </a:ln>
+        </p:spPr>
+        <p:style>
+          <a:lnRef idx="3">
+            <a:schemeClr val="accent2"/>
+          </a:lnRef>
+          <a:fillRef idx="0">
+            <a:schemeClr val="accent2"/>
+          </a:fillRef>
+          <a:effectRef idx="2">
+            <a:schemeClr val="accent2"/>
+          </a:effectRef>
+          <a:fontRef idx="minor">
+            <a:schemeClr val="tx1"/>
+          </a:fontRef>
+        </p:style>
+      </p:cxnSp>
+      <p:cxnSp>
+        <p:nvCxnSpPr>
+          <p:cNvPr id="6" name="直線接點 5"/>
+          <p:cNvCxnSpPr/>
+          <p:nvPr/>
+        </p:nvCxnSpPr>
+        <p:spPr>
+          <a:xfrm>
+            <a:off x="844330" y="1906904"/>
+            <a:ext cx="3240000" cy="0"/>
+          </a:xfrm>
+          <a:prstGeom prst="line">
+            <a:avLst/>
+          </a:prstGeom>
+          <a:ln w="28575">
+            <a:solidFill>
+              <a:srgbClr val="00B050"/>
+            </a:solidFill>
+          </a:ln>
+        </p:spPr>
+        <p:style>
+          <a:lnRef idx="1">
+            <a:schemeClr val="accent1"/>
+          </a:lnRef>
+          <a:fillRef idx="0">
+            <a:schemeClr val="accent1"/>
+          </a:fillRef>
+          <a:effectRef idx="0">
+            <a:schemeClr val="accent1"/>
+          </a:effectRef>
+          <a:fontRef idx="minor">
+            <a:schemeClr val="tx1"/>
+          </a:fontRef>
+        </p:style>
+      </p:cxnSp>
+      <p:sp>
+        <p:nvSpPr>
+          <p:cNvPr id="7" name="文字方塊 6"/>
+          <p:cNvSpPr txBox="1"/>
+          <p:nvPr/>
+        </p:nvSpPr>
+        <p:spPr>
+          <a:xfrm>
+            <a:off x="762694" y="1555803"/>
+            <a:ext cx="925079" cy="369332"/>
+          </a:xfrm>
+          <a:prstGeom prst="rect">
+            <a:avLst/>
+          </a:prstGeom>
+          <a:noFill/>
+        </p:spPr>
+        <p:txBody>
+          <a:bodyPr wrap="square" rtlCol="0">
+            <a:spAutoFit/>
+          </a:bodyPr>
+          <a:lstStyle/>
+          <a:p>
+            <a:r>
+              <a:rPr lang="en-US" altLang="zh-TW" dirty="0" smtClean="0">
+                <a:solidFill>
+                  <a:srgbClr val="00B050"/>
+                </a:solidFill>
+              </a:rPr>
+              <a:t>Health</a:t>
+            </a:r>
+            <a:endParaRPr lang="zh-TW" altLang="en-US" dirty="0">
+              <a:solidFill>
+                <a:srgbClr val="00B050"/>
+              </a:solidFill>
+            </a:endParaRPr>
+          </a:p>
+        </p:txBody>
+      </p:sp>
+      <p:sp>
+        <p:nvSpPr>
+          <p:cNvPr id="8" name="文字方塊 7"/>
+          <p:cNvSpPr txBox="1"/>
+          <p:nvPr/>
+        </p:nvSpPr>
+        <p:spPr>
+          <a:xfrm>
+            <a:off x="837112" y="1076017"/>
+            <a:ext cx="481148" cy="369332"/>
+          </a:xfrm>
+          <a:prstGeom prst="rect">
+            <a:avLst/>
+          </a:prstGeom>
+          <a:noFill/>
+        </p:spPr>
+        <p:txBody>
+          <a:bodyPr wrap="square" rtlCol="0">
+            <a:spAutoFit/>
+          </a:bodyPr>
+          <a:lstStyle/>
+          <a:p>
+            <a:r>
+              <a:rPr lang="en-US" altLang="zh-TW" dirty="0" smtClean="0">
+                <a:solidFill>
+                  <a:srgbClr val="FF0000"/>
+                </a:solidFill>
+              </a:rPr>
+              <a:t>HP</a:t>
+            </a:r>
+            <a:endParaRPr lang="zh-TW" altLang="en-US" dirty="0">
+              <a:solidFill>
+                <a:srgbClr val="FF0000"/>
+              </a:solidFill>
+            </a:endParaRPr>
+          </a:p>
+        </p:txBody>
+      </p:sp>
+      <p:sp>
+        <p:nvSpPr>
+          <p:cNvPr id="9" name="橢圓 8"/>
+          <p:cNvSpPr/>
+          <p:nvPr/>
+        </p:nvSpPr>
+        <p:spPr>
+          <a:xfrm>
+            <a:off x="1628435" y="3242037"/>
+            <a:ext cx="319390" cy="295276"/>
+          </a:xfrm>
+          <a:prstGeom prst="ellipse">
+            <a:avLst/>
+          </a:prstGeom>
+        </p:spPr>
+        <p:style>
+          <a:lnRef idx="2">
+            <a:schemeClr val="accent1">
+              <a:shade val="50000"/>
+            </a:schemeClr>
+          </a:lnRef>
+          <a:fillRef idx="1">
+            <a:schemeClr val="accent1"/>
+          </a:fillRef>
+          <a:effectRef idx="0">
+            <a:schemeClr val="accent1"/>
+          </a:effectRef>
+          <a:fontRef idx="minor">
+            <a:schemeClr val="lt1"/>
+          </a:fontRef>
+        </p:style>
+        <p:txBody>
+          <a:bodyPr rtlCol="0" anchor="ctr"/>
+          <a:lstStyle/>
+          <a:p>
+            <a:pPr algn="ctr"/>
+            <a:endParaRPr lang="zh-TW" altLang="en-US"/>
+          </a:p>
+        </p:txBody>
+      </p:sp>
+      <p:cxnSp>
+        <p:nvCxnSpPr>
+          <p:cNvPr id="10" name="直線接點 9"/>
+          <p:cNvCxnSpPr>
+            <a:stCxn id="9" idx="4"/>
+          </p:cNvCxnSpPr>
+          <p:nvPr/>
+        </p:nvCxnSpPr>
+        <p:spPr>
+          <a:xfrm>
+            <a:off x="1788130" y="3537313"/>
+            <a:ext cx="2228" cy="495299"/>
+          </a:xfrm>
+          <a:prstGeom prst="line">
+            <a:avLst/>
+          </a:prstGeom>
+        </p:spPr>
+        <p:style>
+          <a:lnRef idx="1">
+            <a:schemeClr val="accent1"/>
+          </a:lnRef>
+          <a:fillRef idx="0">
+            <a:schemeClr val="accent1"/>
+          </a:fillRef>
+          <a:effectRef idx="0">
+            <a:schemeClr val="accent1"/>
+          </a:effectRef>
+          <a:fontRef idx="minor">
+            <a:schemeClr val="tx1"/>
+          </a:fontRef>
+        </p:style>
+      </p:cxnSp>
+      <p:cxnSp>
+        <p:nvCxnSpPr>
+          <p:cNvPr id="11" name="直線接點 10"/>
+          <p:cNvCxnSpPr/>
+          <p:nvPr/>
+        </p:nvCxnSpPr>
+        <p:spPr>
+          <a:xfrm flipV="1">
+            <a:off x="1565923" y="3708762"/>
+            <a:ext cx="205385" cy="195262"/>
+          </a:xfrm>
+          <a:prstGeom prst="line">
+            <a:avLst/>
+          </a:prstGeom>
+        </p:spPr>
+        <p:style>
+          <a:lnRef idx="1">
+            <a:schemeClr val="accent1"/>
+          </a:lnRef>
+          <a:fillRef idx="0">
+            <a:schemeClr val="accent1"/>
+          </a:fillRef>
+          <a:effectRef idx="0">
+            <a:schemeClr val="accent1"/>
+          </a:effectRef>
+          <a:fontRef idx="minor">
+            <a:schemeClr val="tx1"/>
+          </a:fontRef>
+        </p:style>
+      </p:cxnSp>
+      <p:cxnSp>
+        <p:nvCxnSpPr>
+          <p:cNvPr id="12" name="直線接點 11"/>
+          <p:cNvCxnSpPr/>
+          <p:nvPr/>
+        </p:nvCxnSpPr>
+        <p:spPr>
+          <a:xfrm flipH="1">
+            <a:off x="1628435" y="4032612"/>
+            <a:ext cx="159695" cy="142875"/>
+          </a:xfrm>
+          <a:prstGeom prst="line">
+            <a:avLst/>
+          </a:prstGeom>
+        </p:spPr>
+        <p:style>
+          <a:lnRef idx="1">
+            <a:schemeClr val="accent1"/>
+          </a:lnRef>
+          <a:fillRef idx="0">
+            <a:schemeClr val="accent1"/>
+          </a:fillRef>
+          <a:effectRef idx="0">
+            <a:schemeClr val="accent1"/>
+          </a:effectRef>
+          <a:fontRef idx="minor">
+            <a:schemeClr val="tx1"/>
+          </a:fontRef>
+        </p:style>
+      </p:cxnSp>
+      <p:cxnSp>
+        <p:nvCxnSpPr>
+          <p:cNvPr id="13" name="直線接點 12"/>
+          <p:cNvCxnSpPr/>
+          <p:nvPr/>
+        </p:nvCxnSpPr>
+        <p:spPr>
+          <a:xfrm>
+            <a:off x="1791931" y="3706380"/>
+            <a:ext cx="205385" cy="195262"/>
+          </a:xfrm>
+          <a:prstGeom prst="line">
+            <a:avLst/>
+          </a:prstGeom>
+        </p:spPr>
+        <p:style>
+          <a:lnRef idx="1">
+            <a:schemeClr val="accent1"/>
+          </a:lnRef>
+          <a:fillRef idx="0">
+            <a:schemeClr val="accent1"/>
+          </a:fillRef>
+          <a:effectRef idx="0">
+            <a:schemeClr val="accent1"/>
+          </a:effectRef>
+          <a:fontRef idx="minor">
+            <a:schemeClr val="tx1"/>
+          </a:fontRef>
+        </p:style>
+      </p:cxnSp>
+      <p:cxnSp>
+        <p:nvCxnSpPr>
+          <p:cNvPr id="14" name="直線接點 13"/>
+          <p:cNvCxnSpPr/>
+          <p:nvPr/>
+        </p:nvCxnSpPr>
+        <p:spPr>
+          <a:xfrm flipH="1" flipV="1">
+            <a:off x="1854443" y="4030230"/>
+            <a:ext cx="159695" cy="142875"/>
+          </a:xfrm>
+          <a:prstGeom prst="line">
+            <a:avLst/>
+          </a:prstGeom>
+        </p:spPr>
+        <p:style>
+          <a:lnRef idx="1">
+            <a:schemeClr val="accent1"/>
+          </a:lnRef>
+          <a:fillRef idx="0">
+            <a:schemeClr val="accent1"/>
+          </a:fillRef>
+          <a:effectRef idx="0">
+            <a:schemeClr val="accent1"/>
+          </a:effectRef>
+          <a:fontRef idx="minor">
+            <a:schemeClr val="tx1"/>
+          </a:fontRef>
+        </p:style>
+      </p:cxnSp>
+      <p:sp>
+        <p:nvSpPr>
+          <p:cNvPr id="15" name="橢圓 14"/>
+          <p:cNvSpPr/>
+          <p:nvPr/>
+        </p:nvSpPr>
+        <p:spPr>
+          <a:xfrm>
+            <a:off x="4246178" y="4024243"/>
+            <a:ext cx="319390" cy="295276"/>
+          </a:xfrm>
+          <a:prstGeom prst="ellipse">
+            <a:avLst/>
+          </a:prstGeom>
+        </p:spPr>
+        <p:style>
+          <a:lnRef idx="2">
+            <a:schemeClr val="accent1">
+              <a:shade val="50000"/>
+            </a:schemeClr>
+          </a:lnRef>
+          <a:fillRef idx="1">
+            <a:schemeClr val="accent1"/>
+          </a:fillRef>
+          <a:effectRef idx="0">
+            <a:schemeClr val="accent1"/>
+          </a:effectRef>
+          <a:fontRef idx="minor">
+            <a:schemeClr val="lt1"/>
+          </a:fontRef>
+        </p:style>
+        <p:txBody>
+          <a:bodyPr rtlCol="0" anchor="ctr"/>
+          <a:lstStyle/>
+          <a:p>
+            <a:pPr algn="ctr"/>
+            <a:endParaRPr lang="zh-TW" altLang="en-US"/>
+          </a:p>
+        </p:txBody>
+      </p:sp>
+      <p:cxnSp>
+        <p:nvCxnSpPr>
+          <p:cNvPr id="16" name="直線接點 15"/>
+          <p:cNvCxnSpPr>
+            <a:stCxn id="15" idx="4"/>
+          </p:cNvCxnSpPr>
+          <p:nvPr/>
+        </p:nvCxnSpPr>
+        <p:spPr>
+          <a:xfrm>
+            <a:off x="4405873" y="4319519"/>
+            <a:ext cx="2228" cy="495299"/>
+          </a:xfrm>
+          <a:prstGeom prst="line">
+            <a:avLst/>
+          </a:prstGeom>
+        </p:spPr>
+        <p:style>
+          <a:lnRef idx="1">
+            <a:schemeClr val="accent1"/>
+          </a:lnRef>
+          <a:fillRef idx="0">
+            <a:schemeClr val="accent1"/>
+          </a:fillRef>
+          <a:effectRef idx="0">
+            <a:schemeClr val="accent1"/>
+          </a:effectRef>
+          <a:fontRef idx="minor">
+            <a:schemeClr val="tx1"/>
+          </a:fontRef>
+        </p:style>
+      </p:cxnSp>
+      <p:cxnSp>
+        <p:nvCxnSpPr>
+          <p:cNvPr id="17" name="直線接點 16"/>
+          <p:cNvCxnSpPr/>
+          <p:nvPr/>
+        </p:nvCxnSpPr>
+        <p:spPr>
+          <a:xfrm flipV="1">
+            <a:off x="4183666" y="4490968"/>
+            <a:ext cx="205385" cy="195262"/>
+          </a:xfrm>
+          <a:prstGeom prst="line">
+            <a:avLst/>
+          </a:prstGeom>
+        </p:spPr>
+        <p:style>
+          <a:lnRef idx="1">
+            <a:schemeClr val="accent1"/>
+          </a:lnRef>
+          <a:fillRef idx="0">
+            <a:schemeClr val="accent1"/>
+          </a:fillRef>
+          <a:effectRef idx="0">
+            <a:schemeClr val="accent1"/>
+          </a:effectRef>
+          <a:fontRef idx="minor">
+            <a:schemeClr val="tx1"/>
+          </a:fontRef>
+        </p:style>
+      </p:cxnSp>
+      <p:cxnSp>
+        <p:nvCxnSpPr>
+          <p:cNvPr id="18" name="直線接點 17"/>
+          <p:cNvCxnSpPr/>
+          <p:nvPr/>
+        </p:nvCxnSpPr>
+        <p:spPr>
+          <a:xfrm flipH="1">
+            <a:off x="4246178" y="4814818"/>
+            <a:ext cx="159695" cy="142875"/>
+          </a:xfrm>
+          <a:prstGeom prst="line">
+            <a:avLst/>
+          </a:prstGeom>
+        </p:spPr>
+        <p:style>
+          <a:lnRef idx="1">
+            <a:schemeClr val="accent1"/>
+          </a:lnRef>
+          <a:fillRef idx="0">
+            <a:schemeClr val="accent1"/>
+          </a:fillRef>
+          <a:effectRef idx="0">
+            <a:schemeClr val="accent1"/>
+          </a:effectRef>
+          <a:fontRef idx="minor">
+            <a:schemeClr val="tx1"/>
+          </a:fontRef>
+        </p:style>
+      </p:cxnSp>
+      <p:cxnSp>
+        <p:nvCxnSpPr>
+          <p:cNvPr id="19" name="直線接點 18"/>
+          <p:cNvCxnSpPr/>
+          <p:nvPr/>
+        </p:nvCxnSpPr>
+        <p:spPr>
+          <a:xfrm>
+            <a:off x="4409674" y="4488586"/>
+            <a:ext cx="205385" cy="195262"/>
+          </a:xfrm>
+          <a:prstGeom prst="line">
+            <a:avLst/>
+          </a:prstGeom>
+        </p:spPr>
+        <p:style>
+          <a:lnRef idx="1">
+            <a:schemeClr val="accent1"/>
+          </a:lnRef>
+          <a:fillRef idx="0">
+            <a:schemeClr val="accent1"/>
+          </a:fillRef>
+          <a:effectRef idx="0">
+            <a:schemeClr val="accent1"/>
+          </a:effectRef>
+          <a:fontRef idx="minor">
+            <a:schemeClr val="tx1"/>
+          </a:fontRef>
+        </p:style>
+      </p:cxnSp>
+      <p:cxnSp>
+        <p:nvCxnSpPr>
+          <p:cNvPr id="20" name="直線接點 19"/>
+          <p:cNvCxnSpPr/>
+          <p:nvPr/>
+        </p:nvCxnSpPr>
+        <p:spPr>
+          <a:xfrm flipH="1" flipV="1">
+            <a:off x="4472186" y="4812436"/>
+            <a:ext cx="159695" cy="142875"/>
+          </a:xfrm>
+          <a:prstGeom prst="line">
+            <a:avLst/>
+          </a:prstGeom>
+        </p:spPr>
+        <p:style>
+          <a:lnRef idx="1">
+            <a:schemeClr val="accent1"/>
+          </a:lnRef>
+          <a:fillRef idx="0">
+            <a:schemeClr val="accent1"/>
+          </a:fillRef>
+          <a:effectRef idx="0">
+            <a:schemeClr val="accent1"/>
+          </a:effectRef>
+          <a:fontRef idx="minor">
+            <a:schemeClr val="tx1"/>
+          </a:fontRef>
+        </p:style>
+      </p:cxnSp>
+      <p:sp>
+        <p:nvSpPr>
+          <p:cNvPr id="21" name="橢圓 20"/>
+          <p:cNvSpPr/>
+          <p:nvPr/>
+        </p:nvSpPr>
+        <p:spPr>
+          <a:xfrm>
+            <a:off x="6546148" y="3386069"/>
+            <a:ext cx="319390" cy="295276"/>
+          </a:xfrm>
+          <a:prstGeom prst="ellipse">
+            <a:avLst/>
+          </a:prstGeom>
+        </p:spPr>
+        <p:style>
+          <a:lnRef idx="2">
+            <a:schemeClr val="accent1">
+              <a:shade val="50000"/>
+            </a:schemeClr>
+          </a:lnRef>
+          <a:fillRef idx="1">
+            <a:schemeClr val="accent1"/>
+          </a:fillRef>
+          <a:effectRef idx="0">
+            <a:schemeClr val="accent1"/>
+          </a:effectRef>
+          <a:fontRef idx="minor">
+            <a:schemeClr val="lt1"/>
+          </a:fontRef>
+        </p:style>
+        <p:txBody>
+          <a:bodyPr rtlCol="0" anchor="ctr"/>
+          <a:lstStyle/>
+          <a:p>
+            <a:pPr algn="ctr"/>
+            <a:endParaRPr lang="zh-TW" altLang="en-US"/>
+          </a:p>
+        </p:txBody>
+      </p:sp>
+      <p:cxnSp>
+        <p:nvCxnSpPr>
+          <p:cNvPr id="22" name="直線接點 21"/>
+          <p:cNvCxnSpPr>
+            <a:stCxn id="21" idx="4"/>
+          </p:cNvCxnSpPr>
+          <p:nvPr/>
+        </p:nvCxnSpPr>
+        <p:spPr>
+          <a:xfrm>
+            <a:off x="6705843" y="3681345"/>
+            <a:ext cx="2228" cy="495299"/>
+          </a:xfrm>
+          <a:prstGeom prst="line">
+            <a:avLst/>
+          </a:prstGeom>
+        </p:spPr>
+        <p:style>
+          <a:lnRef idx="1">
+            <a:schemeClr val="accent1"/>
+          </a:lnRef>
+          <a:fillRef idx="0">
+            <a:schemeClr val="accent1"/>
+          </a:fillRef>
+          <a:effectRef idx="0">
+            <a:schemeClr val="accent1"/>
+          </a:effectRef>
+          <a:fontRef idx="minor">
+            <a:schemeClr val="tx1"/>
+          </a:fontRef>
+        </p:style>
+      </p:cxnSp>
+      <p:cxnSp>
+        <p:nvCxnSpPr>
+          <p:cNvPr id="23" name="直線接點 22"/>
+          <p:cNvCxnSpPr/>
+          <p:nvPr/>
+        </p:nvCxnSpPr>
+        <p:spPr>
+          <a:xfrm flipV="1">
+            <a:off x="6483636" y="3852794"/>
+            <a:ext cx="205385" cy="195262"/>
+          </a:xfrm>
+          <a:prstGeom prst="line">
+            <a:avLst/>
+          </a:prstGeom>
+        </p:spPr>
+        <p:style>
+          <a:lnRef idx="1">
+            <a:schemeClr val="accent1"/>
+          </a:lnRef>
+          <a:fillRef idx="0">
+            <a:schemeClr val="accent1"/>
+          </a:fillRef>
+          <a:effectRef idx="0">
+            <a:schemeClr val="accent1"/>
+          </a:effectRef>
+          <a:fontRef idx="minor">
+            <a:schemeClr val="tx1"/>
+          </a:fontRef>
+        </p:style>
+      </p:cxnSp>
+      <p:cxnSp>
+        <p:nvCxnSpPr>
+          <p:cNvPr id="24" name="直線接點 23"/>
+          <p:cNvCxnSpPr/>
+          <p:nvPr/>
+        </p:nvCxnSpPr>
+        <p:spPr>
+          <a:xfrm flipH="1">
+            <a:off x="6546148" y="4176644"/>
+            <a:ext cx="159695" cy="142875"/>
+          </a:xfrm>
+          <a:prstGeom prst="line">
+            <a:avLst/>
+          </a:prstGeom>
+        </p:spPr>
+        <p:style>
+          <a:lnRef idx="1">
+            <a:schemeClr val="accent1"/>
+          </a:lnRef>
+          <a:fillRef idx="0">
+            <a:schemeClr val="accent1"/>
+          </a:fillRef>
+          <a:effectRef idx="0">
+            <a:schemeClr val="accent1"/>
+          </a:effectRef>
+          <a:fontRef idx="minor">
+            <a:schemeClr val="tx1"/>
+          </a:fontRef>
+        </p:style>
+      </p:cxnSp>
+      <p:cxnSp>
+        <p:nvCxnSpPr>
+          <p:cNvPr id="25" name="直線接點 24"/>
+          <p:cNvCxnSpPr/>
+          <p:nvPr/>
+        </p:nvCxnSpPr>
+        <p:spPr>
+          <a:xfrm>
+            <a:off x="6709644" y="3850412"/>
+            <a:ext cx="205385" cy="195262"/>
+          </a:xfrm>
+          <a:prstGeom prst="line">
+            <a:avLst/>
+          </a:prstGeom>
+        </p:spPr>
+        <p:style>
+          <a:lnRef idx="1">
+            <a:schemeClr val="accent1"/>
+          </a:lnRef>
+          <a:fillRef idx="0">
+            <a:schemeClr val="accent1"/>
+          </a:fillRef>
+          <a:effectRef idx="0">
+            <a:schemeClr val="accent1"/>
+          </a:effectRef>
+          <a:fontRef idx="minor">
+            <a:schemeClr val="tx1"/>
+          </a:fontRef>
+        </p:style>
+      </p:cxnSp>
+      <p:cxnSp>
+        <p:nvCxnSpPr>
+          <p:cNvPr id="26" name="直線接點 25"/>
+          <p:cNvCxnSpPr/>
+          <p:nvPr/>
+        </p:nvCxnSpPr>
+        <p:spPr>
+          <a:xfrm flipH="1" flipV="1">
+            <a:off x="6772156" y="4174262"/>
+            <a:ext cx="159695" cy="142875"/>
+          </a:xfrm>
+          <a:prstGeom prst="line">
+            <a:avLst/>
+          </a:prstGeom>
+        </p:spPr>
+        <p:style>
+          <a:lnRef idx="1">
+            <a:schemeClr val="accent1"/>
+          </a:lnRef>
+          <a:fillRef idx="0">
+            <a:schemeClr val="accent1"/>
+          </a:fillRef>
+          <a:effectRef idx="0">
+            <a:schemeClr val="accent1"/>
+          </a:effectRef>
+          <a:fontRef idx="minor">
+            <a:schemeClr val="tx1"/>
+          </a:fontRef>
+        </p:style>
+      </p:cxnSp>
+      <p:sp>
+        <p:nvSpPr>
+          <p:cNvPr id="27" name="橢圓 26"/>
+          <p:cNvSpPr/>
+          <p:nvPr/>
+        </p:nvSpPr>
+        <p:spPr>
+          <a:xfrm>
+            <a:off x="2163284" y="3238431"/>
+            <a:ext cx="319390" cy="295276"/>
+          </a:xfrm>
+          <a:prstGeom prst="ellipse">
+            <a:avLst/>
+          </a:prstGeom>
+          <a:solidFill>
+            <a:srgbClr val="7030A0"/>
+          </a:solidFill>
+        </p:spPr>
+        <p:style>
+          <a:lnRef idx="2">
+            <a:schemeClr val="accent1">
+              <a:shade val="50000"/>
+            </a:schemeClr>
+          </a:lnRef>
+          <a:fillRef idx="1">
+            <a:schemeClr val="accent1"/>
+          </a:fillRef>
+          <a:effectRef idx="0">
+            <a:schemeClr val="accent1"/>
+          </a:effectRef>
+          <a:fontRef idx="minor">
+            <a:schemeClr val="lt1"/>
+          </a:fontRef>
+        </p:style>
+        <p:txBody>
+          <a:bodyPr rtlCol="0" anchor="ctr"/>
+          <a:lstStyle/>
+          <a:p>
+            <a:pPr algn="ctr"/>
+            <a:endParaRPr lang="zh-TW" altLang="en-US"/>
+          </a:p>
+        </p:txBody>
+      </p:sp>
+      <p:cxnSp>
+        <p:nvCxnSpPr>
+          <p:cNvPr id="28" name="直線接點 27"/>
+          <p:cNvCxnSpPr>
+            <a:stCxn id="27" idx="4"/>
+          </p:cNvCxnSpPr>
+          <p:nvPr/>
+        </p:nvCxnSpPr>
+        <p:spPr>
+          <a:xfrm>
+            <a:off x="2322979" y="3533707"/>
+            <a:ext cx="2228" cy="495299"/>
+          </a:xfrm>
+          <a:prstGeom prst="line">
+            <a:avLst/>
+          </a:prstGeom>
+        </p:spPr>
+        <p:style>
+          <a:lnRef idx="1">
+            <a:schemeClr val="accent1"/>
+          </a:lnRef>
+          <a:fillRef idx="0">
+            <a:schemeClr val="accent1"/>
+          </a:fillRef>
+          <a:effectRef idx="0">
+            <a:schemeClr val="accent1"/>
+          </a:effectRef>
+          <a:fontRef idx="minor">
+            <a:schemeClr val="tx1"/>
+          </a:fontRef>
+        </p:style>
+      </p:cxnSp>
+      <p:cxnSp>
+        <p:nvCxnSpPr>
+          <p:cNvPr id="29" name="直線接點 28"/>
+          <p:cNvCxnSpPr/>
+          <p:nvPr/>
+        </p:nvCxnSpPr>
+        <p:spPr>
+          <a:xfrm flipV="1">
+            <a:off x="2100772" y="3705156"/>
+            <a:ext cx="205385" cy="195262"/>
+          </a:xfrm>
+          <a:prstGeom prst="line">
+            <a:avLst/>
+          </a:prstGeom>
+        </p:spPr>
+        <p:style>
+          <a:lnRef idx="1">
+            <a:schemeClr val="accent1"/>
+          </a:lnRef>
+          <a:fillRef idx="0">
+            <a:schemeClr val="accent1"/>
+          </a:fillRef>
+          <a:effectRef idx="0">
+            <a:schemeClr val="accent1"/>
+          </a:effectRef>
+          <a:fontRef idx="minor">
+            <a:schemeClr val="tx1"/>
+          </a:fontRef>
+        </p:style>
+      </p:cxnSp>
+      <p:cxnSp>
+        <p:nvCxnSpPr>
+          <p:cNvPr id="30" name="直線接點 29"/>
+          <p:cNvCxnSpPr/>
+          <p:nvPr/>
+        </p:nvCxnSpPr>
+        <p:spPr>
+          <a:xfrm flipH="1">
+            <a:off x="2163284" y="4029006"/>
+            <a:ext cx="159695" cy="142875"/>
+          </a:xfrm>
+          <a:prstGeom prst="line">
+            <a:avLst/>
+          </a:prstGeom>
+        </p:spPr>
+        <p:style>
+          <a:lnRef idx="1">
+            <a:schemeClr val="accent1"/>
+          </a:lnRef>
+          <a:fillRef idx="0">
+            <a:schemeClr val="accent1"/>
+          </a:fillRef>
+          <a:effectRef idx="0">
+            <a:schemeClr val="accent1"/>
+          </a:effectRef>
+          <a:fontRef idx="minor">
+            <a:schemeClr val="tx1"/>
+          </a:fontRef>
+        </p:style>
+      </p:cxnSp>
+      <p:cxnSp>
+        <p:nvCxnSpPr>
+          <p:cNvPr id="31" name="直線接點 30"/>
+          <p:cNvCxnSpPr/>
+          <p:nvPr/>
+        </p:nvCxnSpPr>
+        <p:spPr>
+          <a:xfrm>
+            <a:off x="2326780" y="3702774"/>
+            <a:ext cx="205385" cy="195262"/>
+          </a:xfrm>
+          <a:prstGeom prst="line">
+            <a:avLst/>
+          </a:prstGeom>
+        </p:spPr>
+        <p:style>
+          <a:lnRef idx="1">
+            <a:schemeClr val="accent1"/>
+          </a:lnRef>
+          <a:fillRef idx="0">
+            <a:schemeClr val="accent1"/>
+          </a:fillRef>
+          <a:effectRef idx="0">
+            <a:schemeClr val="accent1"/>
+          </a:effectRef>
+          <a:fontRef idx="minor">
+            <a:schemeClr val="tx1"/>
+          </a:fontRef>
+        </p:style>
+      </p:cxnSp>
+      <p:cxnSp>
+        <p:nvCxnSpPr>
+          <p:cNvPr id="32" name="直線接點 31"/>
+          <p:cNvCxnSpPr/>
+          <p:nvPr/>
+        </p:nvCxnSpPr>
+        <p:spPr>
+          <a:xfrm flipH="1" flipV="1">
+            <a:off x="2320751" y="4017878"/>
+            <a:ext cx="159695" cy="142875"/>
+          </a:xfrm>
+          <a:prstGeom prst="line">
+            <a:avLst/>
+          </a:prstGeom>
+        </p:spPr>
+        <p:style>
+          <a:lnRef idx="1">
+            <a:schemeClr val="accent1"/>
+          </a:lnRef>
+          <a:fillRef idx="0">
+            <a:schemeClr val="accent1"/>
+          </a:fillRef>
+          <a:effectRef idx="0">
+            <a:schemeClr val="accent1"/>
+          </a:effectRef>
+          <a:fontRef idx="minor">
+            <a:schemeClr val="tx1"/>
+          </a:fontRef>
+        </p:style>
+      </p:cxnSp>
+      <p:cxnSp>
+        <p:nvCxnSpPr>
+          <p:cNvPr id="33" name="直線接點 32"/>
+          <p:cNvCxnSpPr/>
+          <p:nvPr/>
+        </p:nvCxnSpPr>
+        <p:spPr>
+          <a:xfrm>
+            <a:off x="2100772" y="4277813"/>
+            <a:ext cx="507922" cy="0"/>
+          </a:xfrm>
+          <a:prstGeom prst="line">
+            <a:avLst/>
+          </a:prstGeom>
+          <a:ln w="19050">
+            <a:solidFill>
+              <a:srgbClr val="FF0000"/>
+            </a:solidFill>
+          </a:ln>
+        </p:spPr>
+        <p:style>
+          <a:lnRef idx="1">
+            <a:schemeClr val="accent1"/>
+          </a:lnRef>
+          <a:fillRef idx="0">
+            <a:schemeClr val="accent1"/>
+          </a:fillRef>
+          <a:effectRef idx="0">
+            <a:schemeClr val="accent1"/>
+          </a:effectRef>
+          <a:fontRef idx="minor">
+            <a:schemeClr val="tx1"/>
+          </a:fontRef>
+        </p:style>
+      </p:cxnSp>
+      <p:cxnSp>
+        <p:nvCxnSpPr>
+          <p:cNvPr id="34" name="直線接點 33"/>
+          <p:cNvCxnSpPr/>
+          <p:nvPr/>
+        </p:nvCxnSpPr>
+        <p:spPr>
+          <a:xfrm>
+            <a:off x="4218225" y="5062398"/>
+            <a:ext cx="507922" cy="0"/>
+          </a:xfrm>
+          <a:prstGeom prst="line">
+            <a:avLst/>
+          </a:prstGeom>
+          <a:ln w="19050">
+            <a:solidFill>
+              <a:srgbClr val="FF0000"/>
+            </a:solidFill>
+          </a:ln>
+        </p:spPr>
+        <p:style>
+          <a:lnRef idx="1">
+            <a:schemeClr val="accent1"/>
+          </a:lnRef>
+          <a:fillRef idx="0">
+            <a:schemeClr val="accent1"/>
+          </a:fillRef>
+          <a:effectRef idx="0">
+            <a:schemeClr val="accent1"/>
+          </a:effectRef>
+          <a:fontRef idx="minor">
+            <a:schemeClr val="tx1"/>
+          </a:fontRef>
+        </p:style>
+      </p:cxnSp>
+      <p:cxnSp>
+        <p:nvCxnSpPr>
+          <p:cNvPr id="35" name="直線接點 34"/>
+          <p:cNvCxnSpPr/>
+          <p:nvPr/>
+        </p:nvCxnSpPr>
+        <p:spPr>
+          <a:xfrm>
+            <a:off x="6546148" y="4488586"/>
+            <a:ext cx="507922" cy="0"/>
+          </a:xfrm>
+          <a:prstGeom prst="line">
+            <a:avLst/>
+          </a:prstGeom>
+          <a:ln w="19050">
+            <a:solidFill>
+              <a:srgbClr val="FF0000"/>
+            </a:solidFill>
+          </a:ln>
+        </p:spPr>
+        <p:style>
+          <a:lnRef idx="1">
+            <a:schemeClr val="accent1"/>
+          </a:lnRef>
+          <a:fillRef idx="0">
+            <a:schemeClr val="accent1"/>
+          </a:fillRef>
+          <a:effectRef idx="0">
+            <a:schemeClr val="accent1"/>
+          </a:effectRef>
+          <a:fontRef idx="minor">
+            <a:schemeClr val="tx1"/>
+          </a:fontRef>
+        </p:style>
+      </p:cxnSp>
+      <p:cxnSp>
+        <p:nvCxnSpPr>
+          <p:cNvPr id="36" name="直線單箭頭接點 35"/>
+          <p:cNvCxnSpPr/>
+          <p:nvPr/>
+        </p:nvCxnSpPr>
+        <p:spPr>
+          <a:xfrm>
+            <a:off x="1788130" y="2847975"/>
+            <a:ext cx="0" cy="279762"/>
+          </a:xfrm>
+          <a:prstGeom prst="straightConnector1">
+            <a:avLst/>
+          </a:prstGeom>
+          <a:ln w="57150">
+            <a:solidFill>
+              <a:srgbClr val="FFC000"/>
+            </a:solidFill>
+            <a:tailEnd type="triangle"/>
+          </a:ln>
+        </p:spPr>
+        <p:style>
+          <a:lnRef idx="1">
+            <a:schemeClr val="accent1"/>
+          </a:lnRef>
+          <a:fillRef idx="0">
+            <a:schemeClr val="accent1"/>
+          </a:fillRef>
+          <a:effectRef idx="0">
+            <a:schemeClr val="accent1"/>
+          </a:effectRef>
+          <a:fontRef idx="minor">
+            <a:schemeClr val="tx1"/>
+          </a:fontRef>
+        </p:style>
+      </p:cxnSp>
+      <p:sp>
+        <p:nvSpPr>
+          <p:cNvPr id="37" name="文字方塊 36"/>
+          <p:cNvSpPr txBox="1"/>
+          <p:nvPr/>
+        </p:nvSpPr>
+        <p:spPr>
+          <a:xfrm>
+            <a:off x="1541807" y="2491860"/>
+            <a:ext cx="1100027" cy="369332"/>
+          </a:xfrm>
+          <a:prstGeom prst="rect">
+            <a:avLst/>
+          </a:prstGeom>
+          <a:noFill/>
+        </p:spPr>
+        <p:txBody>
+          <a:bodyPr wrap="square" rtlCol="0">
+            <a:spAutoFit/>
+          </a:bodyPr>
+          <a:lstStyle/>
+          <a:p>
+            <a:r>
+              <a:rPr lang="en-US" altLang="zh-TW" dirty="0" smtClean="0"/>
+              <a:t>(Me)</a:t>
+            </a:r>
+            <a:endParaRPr lang="zh-TW" altLang="en-US" dirty="0"/>
+          </a:p>
+        </p:txBody>
+      </p:sp>
+      <p:sp>
+        <p:nvSpPr>
+          <p:cNvPr id="39" name="文字方塊 38"/>
+          <p:cNvSpPr txBox="1"/>
+          <p:nvPr/>
+        </p:nvSpPr>
+        <p:spPr>
+          <a:xfrm>
+            <a:off x="1995823" y="4245699"/>
+            <a:ext cx="1100027" cy="369332"/>
+          </a:xfrm>
+          <a:prstGeom prst="rect">
+            <a:avLst/>
+          </a:prstGeom>
+          <a:noFill/>
+        </p:spPr>
+        <p:txBody>
+          <a:bodyPr wrap="square" rtlCol="0">
+            <a:spAutoFit/>
+          </a:bodyPr>
+          <a:lstStyle/>
+          <a:p>
+            <a:r>
+              <a:rPr lang="en-US" altLang="zh-TW" dirty="0" smtClean="0"/>
+              <a:t>(</a:t>
+            </a:r>
+            <a:r>
+              <a:rPr lang="zh-TW" altLang="en-US" dirty="0"/>
+              <a:t>昏迷</a:t>
+            </a:r>
+            <a:r>
+              <a:rPr lang="en-US" altLang="zh-TW" dirty="0" smtClean="0"/>
+              <a:t>)</a:t>
+            </a:r>
+            <a:endParaRPr lang="zh-TW" altLang="en-US" dirty="0"/>
+          </a:p>
+        </p:txBody>
+      </p:sp>
+    </p:spTree>
+    <p:extLst>
+      <p:ext uri="{BB962C8B-B14F-4D97-AF65-F5344CB8AC3E}">
+        <p14:creationId xmlns:p14="http://schemas.microsoft.com/office/powerpoint/2010/main" val="3866055168"/>
+      </p:ext>
+    </p:extLst>
+  </p:cSld>
+  <p:clrMapOvr>
+    <a:masterClrMapping/>
+  </p:clrMapOvr>
+  <p:timing>
+    <p:tnLst>
+      <p:par>
+        <p:cTn id="1" dur="indefinite" restart="never" nodeType="tmRoot"/>
+      </p:par>
+    </p:tnLst>
+  </p:timing>
+</p:sld>
+</file>
+
+<file path=ppt/slides/slide6.xml><?xml version="1.0" encoding="utf-8"?>
+<p:sld xmlns:a="http://schemas.openxmlformats.org/drawingml/2006/main" xmlns:r="http://schemas.openxmlformats.org/officeDocument/2006/relationships" xmlns:p="http://schemas.openxmlformats.org/presentationml/2006/main">
+  <p:cSld>
+    <p:spTree>
+      <p:nvGrpSpPr>
+        <p:cNvPr id="1" name=""/>
+        <p:cNvGrpSpPr/>
+        <p:nvPr/>
+      </p:nvGrpSpPr>
+      <p:grpSpPr>
+        <a:xfrm>
+          <a:off x="0" y="0"/>
+          <a:ext cx="0" cy="0"/>
+          <a:chOff x="0" y="0"/>
+          <a:chExt cx="0" cy="0"/>
+        </a:xfrm>
+      </p:grpSpPr>
+      <p:sp>
+        <p:nvSpPr>
+          <p:cNvPr id="4" name="矩形 3"/>
+          <p:cNvSpPr/>
+          <p:nvPr/>
+        </p:nvSpPr>
+        <p:spPr>
+          <a:xfrm>
+            <a:off x="685800" y="1085850"/>
+            <a:ext cx="8343900" cy="5181600"/>
+          </a:xfrm>
+          <a:prstGeom prst="rect">
+            <a:avLst/>
+          </a:prstGeom>
+          <a:noFill/>
+          <a:ln w="28575">
+            <a:solidFill>
+              <a:schemeClr val="bg2">
+                <a:lumMod val="10000"/>
+              </a:schemeClr>
+            </a:solidFill>
+          </a:ln>
+        </p:spPr>
+        <p:style>
+          <a:lnRef idx="2">
+            <a:schemeClr val="accent1">
+              <a:shade val="50000"/>
+            </a:schemeClr>
+          </a:lnRef>
+          <a:fillRef idx="1">
+            <a:schemeClr val="accent1"/>
+          </a:fillRef>
+          <a:effectRef idx="0">
+            <a:schemeClr val="accent1"/>
+          </a:effectRef>
+          <a:fontRef idx="minor">
+            <a:schemeClr val="lt1"/>
+          </a:fontRef>
+        </p:style>
+        <p:txBody>
+          <a:bodyPr rtlCol="0" anchor="ctr"/>
+          <a:lstStyle/>
+          <a:p>
+            <a:pPr algn="ctr"/>
+            <a:endParaRPr lang="zh-TW" altLang="en-US"/>
+          </a:p>
+        </p:txBody>
+      </p:sp>
+      <p:cxnSp>
+        <p:nvCxnSpPr>
+          <p:cNvPr id="5" name="直線接點 4"/>
+          <p:cNvCxnSpPr/>
+          <p:nvPr/>
+        </p:nvCxnSpPr>
+        <p:spPr>
+          <a:xfrm>
+            <a:off x="861152" y="1453784"/>
+            <a:ext cx="3240000" cy="0"/>
+          </a:xfrm>
+          <a:prstGeom prst="line">
+            <a:avLst/>
+          </a:prstGeom>
+          <a:ln w="28575">
+            <a:solidFill>
+              <a:srgbClr val="FF0000"/>
+            </a:solidFill>
+          </a:ln>
+        </p:spPr>
+        <p:style>
+          <a:lnRef idx="3">
+            <a:schemeClr val="accent2"/>
+          </a:lnRef>
+          <a:fillRef idx="0">
+            <a:schemeClr val="accent2"/>
+          </a:fillRef>
+          <a:effectRef idx="2">
+            <a:schemeClr val="accent2"/>
+          </a:effectRef>
+          <a:fontRef idx="minor">
+            <a:schemeClr val="tx1"/>
+          </a:fontRef>
+        </p:style>
+      </p:cxnSp>
+      <p:cxnSp>
+        <p:nvCxnSpPr>
+          <p:cNvPr id="6" name="直線接點 5"/>
+          <p:cNvCxnSpPr/>
+          <p:nvPr/>
+        </p:nvCxnSpPr>
+        <p:spPr>
+          <a:xfrm>
+            <a:off x="844330" y="1906904"/>
+            <a:ext cx="3240000" cy="0"/>
+          </a:xfrm>
+          <a:prstGeom prst="line">
+            <a:avLst/>
+          </a:prstGeom>
+          <a:ln w="28575">
+            <a:solidFill>
+              <a:srgbClr val="00B050"/>
+            </a:solidFill>
+          </a:ln>
+        </p:spPr>
+        <p:style>
+          <a:lnRef idx="1">
+            <a:schemeClr val="accent1"/>
+          </a:lnRef>
+          <a:fillRef idx="0">
+            <a:schemeClr val="accent1"/>
+          </a:fillRef>
+          <a:effectRef idx="0">
+            <a:schemeClr val="accent1"/>
+          </a:effectRef>
+          <a:fontRef idx="minor">
+            <a:schemeClr val="tx1"/>
+          </a:fontRef>
+        </p:style>
+      </p:cxnSp>
+      <p:sp>
+        <p:nvSpPr>
+          <p:cNvPr id="7" name="文字方塊 6"/>
+          <p:cNvSpPr txBox="1"/>
+          <p:nvPr/>
+        </p:nvSpPr>
+        <p:spPr>
+          <a:xfrm>
+            <a:off x="762694" y="1555803"/>
+            <a:ext cx="925079" cy="369332"/>
+          </a:xfrm>
+          <a:prstGeom prst="rect">
+            <a:avLst/>
+          </a:prstGeom>
+          <a:noFill/>
+        </p:spPr>
+        <p:txBody>
+          <a:bodyPr wrap="square" rtlCol="0">
+            <a:spAutoFit/>
+          </a:bodyPr>
+          <a:lstStyle/>
+          <a:p>
+            <a:r>
+              <a:rPr lang="en-US" altLang="zh-TW" dirty="0" smtClean="0">
+                <a:solidFill>
+                  <a:srgbClr val="00B050"/>
+                </a:solidFill>
+              </a:rPr>
+              <a:t>Health</a:t>
+            </a:r>
+            <a:endParaRPr lang="zh-TW" altLang="en-US" dirty="0">
+              <a:solidFill>
+                <a:srgbClr val="00B050"/>
+              </a:solidFill>
+            </a:endParaRPr>
+          </a:p>
+        </p:txBody>
+      </p:sp>
+      <p:sp>
+        <p:nvSpPr>
+          <p:cNvPr id="8" name="文字方塊 7"/>
+          <p:cNvSpPr txBox="1"/>
+          <p:nvPr/>
+        </p:nvSpPr>
+        <p:spPr>
+          <a:xfrm>
+            <a:off x="837112" y="1076017"/>
+            <a:ext cx="481148" cy="369332"/>
+          </a:xfrm>
+          <a:prstGeom prst="rect">
+            <a:avLst/>
+          </a:prstGeom>
+          <a:noFill/>
+        </p:spPr>
+        <p:txBody>
+          <a:bodyPr wrap="square" rtlCol="0">
+            <a:spAutoFit/>
+          </a:bodyPr>
+          <a:lstStyle/>
+          <a:p>
+            <a:r>
+              <a:rPr lang="en-US" altLang="zh-TW" dirty="0" smtClean="0">
+                <a:solidFill>
+                  <a:srgbClr val="FF0000"/>
+                </a:solidFill>
+              </a:rPr>
+              <a:t>HP</a:t>
+            </a:r>
+            <a:endParaRPr lang="zh-TW" altLang="en-US" dirty="0">
+              <a:solidFill>
+                <a:srgbClr val="FF0000"/>
+              </a:solidFill>
+            </a:endParaRPr>
+          </a:p>
+        </p:txBody>
+      </p:sp>
+      <p:sp>
+        <p:nvSpPr>
+          <p:cNvPr id="9" name="橢圓 8"/>
+          <p:cNvSpPr/>
+          <p:nvPr/>
+        </p:nvSpPr>
+        <p:spPr>
+          <a:xfrm>
+            <a:off x="1628435" y="3242037"/>
+            <a:ext cx="319390" cy="295276"/>
+          </a:xfrm>
+          <a:prstGeom prst="ellipse">
+            <a:avLst/>
+          </a:prstGeom>
+        </p:spPr>
+        <p:style>
+          <a:lnRef idx="2">
+            <a:schemeClr val="accent1">
+              <a:shade val="50000"/>
+            </a:schemeClr>
+          </a:lnRef>
+          <a:fillRef idx="1">
+            <a:schemeClr val="accent1"/>
+          </a:fillRef>
+          <a:effectRef idx="0">
+            <a:schemeClr val="accent1"/>
+          </a:effectRef>
+          <a:fontRef idx="minor">
+            <a:schemeClr val="lt1"/>
+          </a:fontRef>
+        </p:style>
+        <p:txBody>
+          <a:bodyPr rtlCol="0" anchor="ctr"/>
+          <a:lstStyle/>
+          <a:p>
+            <a:pPr algn="ctr"/>
+            <a:endParaRPr lang="zh-TW" altLang="en-US"/>
+          </a:p>
+        </p:txBody>
+      </p:sp>
+      <p:cxnSp>
+        <p:nvCxnSpPr>
+          <p:cNvPr id="10" name="直線接點 9"/>
+          <p:cNvCxnSpPr>
+            <a:stCxn id="9" idx="4"/>
+          </p:cNvCxnSpPr>
+          <p:nvPr/>
+        </p:nvCxnSpPr>
+        <p:spPr>
+          <a:xfrm>
+            <a:off x="1788130" y="3537313"/>
+            <a:ext cx="2228" cy="495299"/>
+          </a:xfrm>
+          <a:prstGeom prst="line">
+            <a:avLst/>
+          </a:prstGeom>
+        </p:spPr>
+        <p:style>
+          <a:lnRef idx="1">
+            <a:schemeClr val="accent1"/>
+          </a:lnRef>
+          <a:fillRef idx="0">
+            <a:schemeClr val="accent1"/>
+          </a:fillRef>
+          <a:effectRef idx="0">
+            <a:schemeClr val="accent1"/>
+          </a:effectRef>
+          <a:fontRef idx="minor">
+            <a:schemeClr val="tx1"/>
+          </a:fontRef>
+        </p:style>
+      </p:cxnSp>
+      <p:cxnSp>
+        <p:nvCxnSpPr>
+          <p:cNvPr id="11" name="直線接點 10"/>
+          <p:cNvCxnSpPr/>
+          <p:nvPr/>
+        </p:nvCxnSpPr>
+        <p:spPr>
+          <a:xfrm flipV="1">
+            <a:off x="1565923" y="3708762"/>
+            <a:ext cx="205385" cy="195262"/>
+          </a:xfrm>
+          <a:prstGeom prst="line">
+            <a:avLst/>
+          </a:prstGeom>
+        </p:spPr>
+        <p:style>
+          <a:lnRef idx="1">
+            <a:schemeClr val="accent1"/>
+          </a:lnRef>
+          <a:fillRef idx="0">
+            <a:schemeClr val="accent1"/>
+          </a:fillRef>
+          <a:effectRef idx="0">
+            <a:schemeClr val="accent1"/>
+          </a:effectRef>
+          <a:fontRef idx="minor">
+            <a:schemeClr val="tx1"/>
+          </a:fontRef>
+        </p:style>
+      </p:cxnSp>
+      <p:cxnSp>
+        <p:nvCxnSpPr>
+          <p:cNvPr id="12" name="直線接點 11"/>
+          <p:cNvCxnSpPr/>
+          <p:nvPr/>
+        </p:nvCxnSpPr>
+        <p:spPr>
+          <a:xfrm flipH="1">
+            <a:off x="1690753" y="4093843"/>
+            <a:ext cx="159695" cy="142875"/>
+          </a:xfrm>
+          <a:prstGeom prst="line">
+            <a:avLst/>
+          </a:prstGeom>
+        </p:spPr>
+        <p:style>
+          <a:lnRef idx="1">
+            <a:schemeClr val="accent1"/>
+          </a:lnRef>
+          <a:fillRef idx="0">
+            <a:schemeClr val="accent1"/>
+          </a:fillRef>
+          <a:effectRef idx="0">
+            <a:schemeClr val="accent1"/>
+          </a:effectRef>
+          <a:fontRef idx="minor">
+            <a:schemeClr val="tx1"/>
+          </a:fontRef>
+        </p:style>
+      </p:cxnSp>
+      <p:cxnSp>
+        <p:nvCxnSpPr>
+          <p:cNvPr id="13" name="直線接點 12"/>
+          <p:cNvCxnSpPr/>
+          <p:nvPr/>
+        </p:nvCxnSpPr>
+        <p:spPr>
+          <a:xfrm>
+            <a:off x="1791931" y="3706380"/>
+            <a:ext cx="205385" cy="195262"/>
+          </a:xfrm>
+          <a:prstGeom prst="line">
+            <a:avLst/>
+          </a:prstGeom>
+        </p:spPr>
+        <p:style>
+          <a:lnRef idx="1">
+            <a:schemeClr val="accent1"/>
+          </a:lnRef>
+          <a:fillRef idx="0">
+            <a:schemeClr val="accent1"/>
+          </a:fillRef>
+          <a:effectRef idx="0">
+            <a:schemeClr val="accent1"/>
+          </a:effectRef>
+          <a:fontRef idx="minor">
+            <a:schemeClr val="tx1"/>
+          </a:fontRef>
+        </p:style>
+      </p:cxnSp>
+      <p:cxnSp>
+        <p:nvCxnSpPr>
+          <p:cNvPr id="14" name="直線接點 13"/>
+          <p:cNvCxnSpPr/>
+          <p:nvPr/>
+        </p:nvCxnSpPr>
+        <p:spPr>
+          <a:xfrm flipH="1" flipV="1">
+            <a:off x="1854443" y="4030230"/>
+            <a:ext cx="159695" cy="142875"/>
+          </a:xfrm>
+          <a:prstGeom prst="line">
+            <a:avLst/>
+          </a:prstGeom>
+        </p:spPr>
+        <p:style>
+          <a:lnRef idx="1">
+            <a:schemeClr val="accent1"/>
+          </a:lnRef>
+          <a:fillRef idx="0">
+            <a:schemeClr val="accent1"/>
+          </a:fillRef>
+          <a:effectRef idx="0">
+            <a:schemeClr val="accent1"/>
+          </a:effectRef>
+          <a:fontRef idx="minor">
+            <a:schemeClr val="tx1"/>
+          </a:fontRef>
+        </p:style>
+      </p:cxnSp>
+      <p:sp>
+        <p:nvSpPr>
+          <p:cNvPr id="15" name="橢圓 14"/>
+          <p:cNvSpPr/>
+          <p:nvPr/>
+        </p:nvSpPr>
+        <p:spPr>
+          <a:xfrm>
+            <a:off x="4246178" y="4024243"/>
+            <a:ext cx="319390" cy="295276"/>
+          </a:xfrm>
+          <a:prstGeom prst="ellipse">
+            <a:avLst/>
+          </a:prstGeom>
+        </p:spPr>
+        <p:style>
+          <a:lnRef idx="2">
+            <a:schemeClr val="accent1">
+              <a:shade val="50000"/>
+            </a:schemeClr>
+          </a:lnRef>
+          <a:fillRef idx="1">
+            <a:schemeClr val="accent1"/>
+          </a:fillRef>
+          <a:effectRef idx="0">
+            <a:schemeClr val="accent1"/>
+          </a:effectRef>
+          <a:fontRef idx="minor">
+            <a:schemeClr val="lt1"/>
+          </a:fontRef>
+        </p:style>
+        <p:txBody>
+          <a:bodyPr rtlCol="0" anchor="ctr"/>
+          <a:lstStyle/>
+          <a:p>
+            <a:pPr algn="ctr"/>
+            <a:endParaRPr lang="zh-TW" altLang="en-US"/>
+          </a:p>
+        </p:txBody>
+      </p:sp>
+      <p:cxnSp>
+        <p:nvCxnSpPr>
+          <p:cNvPr id="16" name="直線接點 15"/>
+          <p:cNvCxnSpPr>
+            <a:stCxn id="15" idx="4"/>
+          </p:cNvCxnSpPr>
+          <p:nvPr/>
+        </p:nvCxnSpPr>
+        <p:spPr>
+          <a:xfrm>
+            <a:off x="4405873" y="4319519"/>
+            <a:ext cx="2228" cy="495299"/>
+          </a:xfrm>
+          <a:prstGeom prst="line">
+            <a:avLst/>
+          </a:prstGeom>
+        </p:spPr>
+        <p:style>
+          <a:lnRef idx="1">
+            <a:schemeClr val="accent1"/>
+          </a:lnRef>
+          <a:fillRef idx="0">
+            <a:schemeClr val="accent1"/>
+          </a:fillRef>
+          <a:effectRef idx="0">
+            <a:schemeClr val="accent1"/>
+          </a:effectRef>
+          <a:fontRef idx="minor">
+            <a:schemeClr val="tx1"/>
+          </a:fontRef>
+        </p:style>
+      </p:cxnSp>
+      <p:cxnSp>
+        <p:nvCxnSpPr>
+          <p:cNvPr id="17" name="直線接點 16"/>
+          <p:cNvCxnSpPr/>
+          <p:nvPr/>
+        </p:nvCxnSpPr>
+        <p:spPr>
+          <a:xfrm flipV="1">
+            <a:off x="4183666" y="4490968"/>
+            <a:ext cx="205385" cy="195262"/>
+          </a:xfrm>
+          <a:prstGeom prst="line">
+            <a:avLst/>
+          </a:prstGeom>
+        </p:spPr>
+        <p:style>
+          <a:lnRef idx="1">
+            <a:schemeClr val="accent1"/>
+          </a:lnRef>
+          <a:fillRef idx="0">
+            <a:schemeClr val="accent1"/>
+          </a:fillRef>
+          <a:effectRef idx="0">
+            <a:schemeClr val="accent1"/>
+          </a:effectRef>
+          <a:fontRef idx="minor">
+            <a:schemeClr val="tx1"/>
+          </a:fontRef>
+        </p:style>
+      </p:cxnSp>
+      <p:cxnSp>
+        <p:nvCxnSpPr>
+          <p:cNvPr id="18" name="直線接點 17"/>
+          <p:cNvCxnSpPr/>
+          <p:nvPr/>
+        </p:nvCxnSpPr>
+        <p:spPr>
+          <a:xfrm flipH="1">
+            <a:off x="4246178" y="4814818"/>
+            <a:ext cx="159695" cy="142875"/>
+          </a:xfrm>
+          <a:prstGeom prst="line">
+            <a:avLst/>
+          </a:prstGeom>
+        </p:spPr>
+        <p:style>
+          <a:lnRef idx="1">
+            <a:schemeClr val="accent1"/>
+          </a:lnRef>
+          <a:fillRef idx="0">
+            <a:schemeClr val="accent1"/>
+          </a:fillRef>
+          <a:effectRef idx="0">
+            <a:schemeClr val="accent1"/>
+          </a:effectRef>
+          <a:fontRef idx="minor">
+            <a:schemeClr val="tx1"/>
+          </a:fontRef>
+        </p:style>
+      </p:cxnSp>
+      <p:cxnSp>
+        <p:nvCxnSpPr>
+          <p:cNvPr id="19" name="直線接點 18"/>
+          <p:cNvCxnSpPr/>
+          <p:nvPr/>
+        </p:nvCxnSpPr>
+        <p:spPr>
+          <a:xfrm>
+            <a:off x="4409674" y="4488586"/>
+            <a:ext cx="205385" cy="195262"/>
+          </a:xfrm>
+          <a:prstGeom prst="line">
+            <a:avLst/>
+          </a:prstGeom>
+        </p:spPr>
+        <p:style>
+          <a:lnRef idx="1">
+            <a:schemeClr val="accent1"/>
+          </a:lnRef>
+          <a:fillRef idx="0">
+            <a:schemeClr val="accent1"/>
+          </a:fillRef>
+          <a:effectRef idx="0">
+            <a:schemeClr val="accent1"/>
+          </a:effectRef>
+          <a:fontRef idx="minor">
+            <a:schemeClr val="tx1"/>
+          </a:fontRef>
+        </p:style>
+      </p:cxnSp>
+      <p:cxnSp>
+        <p:nvCxnSpPr>
+          <p:cNvPr id="20" name="直線接點 19"/>
+          <p:cNvCxnSpPr/>
+          <p:nvPr/>
+        </p:nvCxnSpPr>
+        <p:spPr>
+          <a:xfrm flipH="1" flipV="1">
+            <a:off x="4472186" y="4812436"/>
+            <a:ext cx="159695" cy="142875"/>
+          </a:xfrm>
+          <a:prstGeom prst="line">
+            <a:avLst/>
+          </a:prstGeom>
+        </p:spPr>
+        <p:style>
+          <a:lnRef idx="1">
+            <a:schemeClr val="accent1"/>
+          </a:lnRef>
+          <a:fillRef idx="0">
+            <a:schemeClr val="accent1"/>
+          </a:fillRef>
+          <a:effectRef idx="0">
+            <a:schemeClr val="accent1"/>
+          </a:effectRef>
+          <a:fontRef idx="minor">
+            <a:schemeClr val="tx1"/>
+          </a:fontRef>
+        </p:style>
+      </p:cxnSp>
+      <p:sp>
+        <p:nvSpPr>
+          <p:cNvPr id="21" name="橢圓 20"/>
+          <p:cNvSpPr/>
+          <p:nvPr/>
+        </p:nvSpPr>
+        <p:spPr>
+          <a:xfrm>
+            <a:off x="6546148" y="3386069"/>
+            <a:ext cx="319390" cy="295276"/>
+          </a:xfrm>
+          <a:prstGeom prst="ellipse">
+            <a:avLst/>
+          </a:prstGeom>
+        </p:spPr>
+        <p:style>
+          <a:lnRef idx="2">
+            <a:schemeClr val="accent1">
+              <a:shade val="50000"/>
+            </a:schemeClr>
+          </a:lnRef>
+          <a:fillRef idx="1">
+            <a:schemeClr val="accent1"/>
+          </a:fillRef>
+          <a:effectRef idx="0">
+            <a:schemeClr val="accent1"/>
+          </a:effectRef>
+          <a:fontRef idx="minor">
+            <a:schemeClr val="lt1"/>
+          </a:fontRef>
+        </p:style>
+        <p:txBody>
+          <a:bodyPr rtlCol="0" anchor="ctr"/>
+          <a:lstStyle/>
+          <a:p>
+            <a:pPr algn="ctr"/>
+            <a:endParaRPr lang="zh-TW" altLang="en-US"/>
+          </a:p>
+        </p:txBody>
+      </p:sp>
+      <p:cxnSp>
+        <p:nvCxnSpPr>
+          <p:cNvPr id="22" name="直線接點 21"/>
+          <p:cNvCxnSpPr>
+            <a:stCxn id="21" idx="4"/>
+          </p:cNvCxnSpPr>
+          <p:nvPr/>
+        </p:nvCxnSpPr>
+        <p:spPr>
+          <a:xfrm>
+            <a:off x="6705843" y="3681345"/>
+            <a:ext cx="2228" cy="495299"/>
+          </a:xfrm>
+          <a:prstGeom prst="line">
+            <a:avLst/>
+          </a:prstGeom>
+        </p:spPr>
+        <p:style>
+          <a:lnRef idx="1">
+            <a:schemeClr val="accent1"/>
+          </a:lnRef>
+          <a:fillRef idx="0">
+            <a:schemeClr val="accent1"/>
+          </a:fillRef>
+          <a:effectRef idx="0">
+            <a:schemeClr val="accent1"/>
+          </a:effectRef>
+          <a:fontRef idx="minor">
+            <a:schemeClr val="tx1"/>
+          </a:fontRef>
+        </p:style>
+      </p:cxnSp>
+      <p:cxnSp>
+        <p:nvCxnSpPr>
+          <p:cNvPr id="23" name="直線接點 22"/>
+          <p:cNvCxnSpPr/>
+          <p:nvPr/>
+        </p:nvCxnSpPr>
+        <p:spPr>
+          <a:xfrm flipV="1">
+            <a:off x="6483636" y="3852794"/>
+            <a:ext cx="205385" cy="195262"/>
+          </a:xfrm>
+          <a:prstGeom prst="line">
+            <a:avLst/>
+          </a:prstGeom>
+        </p:spPr>
+        <p:style>
+          <a:lnRef idx="1">
+            <a:schemeClr val="accent1"/>
+          </a:lnRef>
+          <a:fillRef idx="0">
+            <a:schemeClr val="accent1"/>
+          </a:fillRef>
+          <a:effectRef idx="0">
+            <a:schemeClr val="accent1"/>
+          </a:effectRef>
+          <a:fontRef idx="minor">
+            <a:schemeClr val="tx1"/>
+          </a:fontRef>
+        </p:style>
+      </p:cxnSp>
+      <p:cxnSp>
+        <p:nvCxnSpPr>
+          <p:cNvPr id="24" name="直線接點 23"/>
+          <p:cNvCxnSpPr/>
+          <p:nvPr/>
+        </p:nvCxnSpPr>
+        <p:spPr>
+          <a:xfrm flipH="1">
+            <a:off x="6546148" y="4176644"/>
+            <a:ext cx="159695" cy="142875"/>
+          </a:xfrm>
+          <a:prstGeom prst="line">
+            <a:avLst/>
+          </a:prstGeom>
+        </p:spPr>
+        <p:style>
+          <a:lnRef idx="1">
+            <a:schemeClr val="accent1"/>
+          </a:lnRef>
+          <a:fillRef idx="0">
+            <a:schemeClr val="accent1"/>
+          </a:fillRef>
+          <a:effectRef idx="0">
+            <a:schemeClr val="accent1"/>
+          </a:effectRef>
+          <a:fontRef idx="minor">
+            <a:schemeClr val="tx1"/>
+          </a:fontRef>
+        </p:style>
+      </p:cxnSp>
+      <p:cxnSp>
+        <p:nvCxnSpPr>
+          <p:cNvPr id="25" name="直線接點 24"/>
+          <p:cNvCxnSpPr/>
+          <p:nvPr/>
+        </p:nvCxnSpPr>
+        <p:spPr>
+          <a:xfrm>
+            <a:off x="6709644" y="3850412"/>
+            <a:ext cx="205385" cy="195262"/>
+          </a:xfrm>
+          <a:prstGeom prst="line">
+            <a:avLst/>
+          </a:prstGeom>
+        </p:spPr>
+        <p:style>
+          <a:lnRef idx="1">
+            <a:schemeClr val="accent1"/>
+          </a:lnRef>
+          <a:fillRef idx="0">
+            <a:schemeClr val="accent1"/>
+          </a:fillRef>
+          <a:effectRef idx="0">
+            <a:schemeClr val="accent1"/>
+          </a:effectRef>
+          <a:fontRef idx="minor">
+            <a:schemeClr val="tx1"/>
+          </a:fontRef>
+        </p:style>
+      </p:cxnSp>
+      <p:cxnSp>
+        <p:nvCxnSpPr>
+          <p:cNvPr id="26" name="直線接點 25"/>
+          <p:cNvCxnSpPr/>
+          <p:nvPr/>
+        </p:nvCxnSpPr>
+        <p:spPr>
+          <a:xfrm flipH="1" flipV="1">
+            <a:off x="6772156" y="4174262"/>
+            <a:ext cx="159695" cy="142875"/>
+          </a:xfrm>
+          <a:prstGeom prst="line">
+            <a:avLst/>
+          </a:prstGeom>
+        </p:spPr>
+        <p:style>
+          <a:lnRef idx="1">
+            <a:schemeClr val="accent1"/>
+          </a:lnRef>
+          <a:fillRef idx="0">
+            <a:schemeClr val="accent1"/>
+          </a:fillRef>
+          <a:effectRef idx="0">
+            <a:schemeClr val="accent1"/>
+          </a:effectRef>
+          <a:fontRef idx="minor">
+            <a:schemeClr val="tx1"/>
+          </a:fontRef>
+        </p:style>
+      </p:cxnSp>
+      <p:sp>
+        <p:nvSpPr>
+          <p:cNvPr id="27" name="橢圓 26"/>
+          <p:cNvSpPr/>
+          <p:nvPr/>
+        </p:nvSpPr>
+        <p:spPr>
+          <a:xfrm>
+            <a:off x="2163284" y="3238431"/>
+            <a:ext cx="319390" cy="295276"/>
+          </a:xfrm>
+          <a:prstGeom prst="ellipse">
+            <a:avLst/>
+          </a:prstGeom>
+          <a:solidFill>
+            <a:srgbClr val="7030A0"/>
+          </a:solidFill>
+        </p:spPr>
+        <p:style>
+          <a:lnRef idx="2">
+            <a:schemeClr val="accent1">
+              <a:shade val="50000"/>
+            </a:schemeClr>
+          </a:lnRef>
+          <a:fillRef idx="1">
+            <a:schemeClr val="accent1"/>
+          </a:fillRef>
+          <a:effectRef idx="0">
+            <a:schemeClr val="accent1"/>
+          </a:effectRef>
+          <a:fontRef idx="minor">
+            <a:schemeClr val="lt1"/>
+          </a:fontRef>
+        </p:style>
+        <p:txBody>
+          <a:bodyPr rtlCol="0" anchor="ctr"/>
+          <a:lstStyle/>
+          <a:p>
+            <a:pPr algn="ctr"/>
+            <a:endParaRPr lang="zh-TW" altLang="en-US"/>
+          </a:p>
+        </p:txBody>
+      </p:sp>
+      <p:cxnSp>
+        <p:nvCxnSpPr>
+          <p:cNvPr id="28" name="直線接點 27"/>
+          <p:cNvCxnSpPr>
+            <a:stCxn id="27" idx="4"/>
+          </p:cNvCxnSpPr>
+          <p:nvPr/>
+        </p:nvCxnSpPr>
+        <p:spPr>
+          <a:xfrm>
+            <a:off x="2322979" y="3533707"/>
+            <a:ext cx="2228" cy="495299"/>
+          </a:xfrm>
+          <a:prstGeom prst="line">
+            <a:avLst/>
+          </a:prstGeom>
+        </p:spPr>
+        <p:style>
+          <a:lnRef idx="1">
+            <a:schemeClr val="accent1"/>
+          </a:lnRef>
+          <a:fillRef idx="0">
+            <a:schemeClr val="accent1"/>
+          </a:fillRef>
+          <a:effectRef idx="0">
+            <a:schemeClr val="accent1"/>
+          </a:effectRef>
+          <a:fontRef idx="minor">
+            <a:schemeClr val="tx1"/>
+          </a:fontRef>
+        </p:style>
+      </p:cxnSp>
+      <p:cxnSp>
+        <p:nvCxnSpPr>
+          <p:cNvPr id="29" name="直線接點 28"/>
+          <p:cNvCxnSpPr/>
+          <p:nvPr/>
+        </p:nvCxnSpPr>
+        <p:spPr>
+          <a:xfrm flipV="1">
+            <a:off x="2100772" y="3705156"/>
+            <a:ext cx="205385" cy="195262"/>
+          </a:xfrm>
+          <a:prstGeom prst="line">
+            <a:avLst/>
+          </a:prstGeom>
+        </p:spPr>
+        <p:style>
+          <a:lnRef idx="1">
+            <a:schemeClr val="accent1"/>
+          </a:lnRef>
+          <a:fillRef idx="0">
+            <a:schemeClr val="accent1"/>
+          </a:fillRef>
+          <a:effectRef idx="0">
+            <a:schemeClr val="accent1"/>
+          </a:effectRef>
+          <a:fontRef idx="minor">
+            <a:schemeClr val="tx1"/>
+          </a:fontRef>
+        </p:style>
+      </p:cxnSp>
+      <p:cxnSp>
+        <p:nvCxnSpPr>
+          <p:cNvPr id="30" name="直線接點 29"/>
+          <p:cNvCxnSpPr/>
+          <p:nvPr/>
+        </p:nvCxnSpPr>
+        <p:spPr>
+          <a:xfrm flipH="1">
+            <a:off x="2163284" y="4029006"/>
+            <a:ext cx="159695" cy="142875"/>
+          </a:xfrm>
+          <a:prstGeom prst="line">
+            <a:avLst/>
+          </a:prstGeom>
+        </p:spPr>
+        <p:style>
+          <a:lnRef idx="1">
+            <a:schemeClr val="accent1"/>
+          </a:lnRef>
+          <a:fillRef idx="0">
+            <a:schemeClr val="accent1"/>
+          </a:fillRef>
+          <a:effectRef idx="0">
+            <a:schemeClr val="accent1"/>
+          </a:effectRef>
+          <a:fontRef idx="minor">
+            <a:schemeClr val="tx1"/>
+          </a:fontRef>
+        </p:style>
+      </p:cxnSp>
+      <p:cxnSp>
+        <p:nvCxnSpPr>
+          <p:cNvPr id="31" name="直線接點 30"/>
+          <p:cNvCxnSpPr/>
+          <p:nvPr/>
+        </p:nvCxnSpPr>
+        <p:spPr>
+          <a:xfrm>
+            <a:off x="2326780" y="3702774"/>
+            <a:ext cx="205385" cy="195262"/>
+          </a:xfrm>
+          <a:prstGeom prst="line">
+            <a:avLst/>
+          </a:prstGeom>
+        </p:spPr>
+        <p:style>
+          <a:lnRef idx="1">
+            <a:schemeClr val="accent1"/>
+          </a:lnRef>
+          <a:fillRef idx="0">
+            <a:schemeClr val="accent1"/>
+          </a:fillRef>
+          <a:effectRef idx="0">
+            <a:schemeClr val="accent1"/>
+          </a:effectRef>
+          <a:fontRef idx="minor">
+            <a:schemeClr val="tx1"/>
+          </a:fontRef>
+        </p:style>
+      </p:cxnSp>
+      <p:cxnSp>
+        <p:nvCxnSpPr>
+          <p:cNvPr id="32" name="直線接點 31"/>
+          <p:cNvCxnSpPr/>
+          <p:nvPr/>
+        </p:nvCxnSpPr>
+        <p:spPr>
+          <a:xfrm flipH="1" flipV="1">
+            <a:off x="2320751" y="4017878"/>
+            <a:ext cx="159695" cy="142875"/>
+          </a:xfrm>
+          <a:prstGeom prst="line">
+            <a:avLst/>
+          </a:prstGeom>
+        </p:spPr>
+        <p:style>
+          <a:lnRef idx="1">
+            <a:schemeClr val="accent1"/>
+          </a:lnRef>
+          <a:fillRef idx="0">
+            <a:schemeClr val="accent1"/>
+          </a:fillRef>
+          <a:effectRef idx="0">
+            <a:schemeClr val="accent1"/>
+          </a:effectRef>
+          <a:fontRef idx="minor">
+            <a:schemeClr val="tx1"/>
+          </a:fontRef>
+        </p:style>
+      </p:cxnSp>
+      <p:cxnSp>
+        <p:nvCxnSpPr>
+          <p:cNvPr id="33" name="直線接點 32"/>
+          <p:cNvCxnSpPr/>
+          <p:nvPr/>
+        </p:nvCxnSpPr>
+        <p:spPr>
+          <a:xfrm>
+            <a:off x="2100772" y="4277813"/>
+            <a:ext cx="507922" cy="0"/>
+          </a:xfrm>
+          <a:prstGeom prst="line">
+            <a:avLst/>
+          </a:prstGeom>
+          <a:ln w="19050">
+            <a:solidFill>
+              <a:srgbClr val="FF0000"/>
+            </a:solidFill>
+          </a:ln>
+        </p:spPr>
+        <p:style>
+          <a:lnRef idx="1">
+            <a:schemeClr val="accent1"/>
+          </a:lnRef>
+          <a:fillRef idx="0">
+            <a:schemeClr val="accent1"/>
+          </a:fillRef>
+          <a:effectRef idx="0">
+            <a:schemeClr val="accent1"/>
+          </a:effectRef>
+          <a:fontRef idx="minor">
+            <a:schemeClr val="tx1"/>
+          </a:fontRef>
+        </p:style>
+      </p:cxnSp>
+      <p:cxnSp>
+        <p:nvCxnSpPr>
+          <p:cNvPr id="34" name="直線接點 33"/>
+          <p:cNvCxnSpPr/>
+          <p:nvPr/>
+        </p:nvCxnSpPr>
+        <p:spPr>
+          <a:xfrm>
+            <a:off x="4218225" y="5062398"/>
+            <a:ext cx="507922" cy="0"/>
+          </a:xfrm>
+          <a:prstGeom prst="line">
+            <a:avLst/>
+          </a:prstGeom>
+          <a:ln w="19050">
+            <a:solidFill>
+              <a:srgbClr val="FF0000"/>
+            </a:solidFill>
+          </a:ln>
+        </p:spPr>
+        <p:style>
+          <a:lnRef idx="1">
+            <a:schemeClr val="accent1"/>
+          </a:lnRef>
+          <a:fillRef idx="0">
+            <a:schemeClr val="accent1"/>
+          </a:fillRef>
+          <a:effectRef idx="0">
+            <a:schemeClr val="accent1"/>
+          </a:effectRef>
+          <a:fontRef idx="minor">
+            <a:schemeClr val="tx1"/>
+          </a:fontRef>
+        </p:style>
+      </p:cxnSp>
+      <p:cxnSp>
+        <p:nvCxnSpPr>
+          <p:cNvPr id="35" name="直線接點 34"/>
+          <p:cNvCxnSpPr/>
+          <p:nvPr/>
+        </p:nvCxnSpPr>
+        <p:spPr>
+          <a:xfrm>
+            <a:off x="6546148" y="4488586"/>
+            <a:ext cx="507922" cy="0"/>
+          </a:xfrm>
+          <a:prstGeom prst="line">
+            <a:avLst/>
+          </a:prstGeom>
+          <a:ln w="19050">
+            <a:solidFill>
+              <a:srgbClr val="FF0000"/>
+            </a:solidFill>
+          </a:ln>
+        </p:spPr>
+        <p:style>
+          <a:lnRef idx="1">
+            <a:schemeClr val="accent1"/>
+          </a:lnRef>
+          <a:fillRef idx="0">
+            <a:schemeClr val="accent1"/>
+          </a:fillRef>
+          <a:effectRef idx="0">
+            <a:schemeClr val="accent1"/>
+          </a:effectRef>
+          <a:fontRef idx="minor">
+            <a:schemeClr val="tx1"/>
+          </a:fontRef>
+        </p:style>
+      </p:cxnSp>
+      <p:cxnSp>
+        <p:nvCxnSpPr>
+          <p:cNvPr id="36" name="直線單箭頭接點 35"/>
+          <p:cNvCxnSpPr/>
+          <p:nvPr/>
+        </p:nvCxnSpPr>
+        <p:spPr>
+          <a:xfrm>
+            <a:off x="1788130" y="2847975"/>
+            <a:ext cx="0" cy="279762"/>
+          </a:xfrm>
+          <a:prstGeom prst="straightConnector1">
+            <a:avLst/>
+          </a:prstGeom>
+          <a:ln w="57150">
+            <a:solidFill>
+              <a:srgbClr val="FFC000"/>
+            </a:solidFill>
+            <a:tailEnd type="triangle"/>
+          </a:ln>
+        </p:spPr>
+        <p:style>
+          <a:lnRef idx="1">
+            <a:schemeClr val="accent1"/>
+          </a:lnRef>
+          <a:fillRef idx="0">
+            <a:schemeClr val="accent1"/>
+          </a:fillRef>
+          <a:effectRef idx="0">
+            <a:schemeClr val="accent1"/>
+          </a:effectRef>
+          <a:fontRef idx="minor">
+            <a:schemeClr val="tx1"/>
+          </a:fontRef>
+        </p:style>
+      </p:cxnSp>
+      <p:sp>
+        <p:nvSpPr>
+          <p:cNvPr id="37" name="文字方塊 36"/>
+          <p:cNvSpPr txBox="1"/>
+          <p:nvPr/>
+        </p:nvSpPr>
+        <p:spPr>
+          <a:xfrm>
+            <a:off x="1464124" y="2481665"/>
+            <a:ext cx="1100027" cy="369332"/>
+          </a:xfrm>
+          <a:prstGeom prst="rect">
+            <a:avLst/>
+          </a:prstGeom>
+          <a:noFill/>
+        </p:spPr>
+        <p:txBody>
+          <a:bodyPr wrap="square" rtlCol="0">
+            <a:spAutoFit/>
+          </a:bodyPr>
+          <a:lstStyle/>
+          <a:p>
+            <a:r>
+              <a:rPr lang="en-US" altLang="zh-TW" dirty="0" smtClean="0"/>
+              <a:t>(Me)</a:t>
+            </a:r>
+            <a:endParaRPr lang="zh-TW" altLang="en-US" dirty="0"/>
+          </a:p>
+        </p:txBody>
+      </p:sp>
+      <p:sp>
+        <p:nvSpPr>
+          <p:cNvPr id="39" name="文字方塊 38"/>
+          <p:cNvSpPr txBox="1"/>
+          <p:nvPr/>
+        </p:nvSpPr>
+        <p:spPr>
+          <a:xfrm>
+            <a:off x="1995823" y="4245699"/>
+            <a:ext cx="1100027" cy="369332"/>
+          </a:xfrm>
+          <a:prstGeom prst="rect">
+            <a:avLst/>
+          </a:prstGeom>
+          <a:noFill/>
+        </p:spPr>
+        <p:txBody>
+          <a:bodyPr wrap="square" rtlCol="0">
+            <a:spAutoFit/>
+          </a:bodyPr>
+          <a:lstStyle/>
+          <a:p>
+            <a:r>
+              <a:rPr lang="en-US" altLang="zh-TW" dirty="0" smtClean="0">
+                <a:latin typeface="微軟正黑體" panose="020B0604030504040204" pitchFamily="34" charset="-120"/>
+                <a:ea typeface="微軟正黑體" panose="020B0604030504040204" pitchFamily="34" charset="-120"/>
+              </a:rPr>
+              <a:t>(</a:t>
+            </a:r>
+            <a:r>
+              <a:rPr lang="zh-TW" altLang="en-US" dirty="0">
+                <a:latin typeface="微軟正黑體" panose="020B0604030504040204" pitchFamily="34" charset="-120"/>
+                <a:ea typeface="微軟正黑體" panose="020B0604030504040204" pitchFamily="34" charset="-120"/>
+              </a:rPr>
+              <a:t>昏迷</a:t>
+            </a:r>
+            <a:r>
+              <a:rPr lang="en-US" altLang="zh-TW" dirty="0" smtClean="0">
+                <a:latin typeface="微軟正黑體" panose="020B0604030504040204" pitchFamily="34" charset="-120"/>
+                <a:ea typeface="微軟正黑體" panose="020B0604030504040204" pitchFamily="34" charset="-120"/>
+              </a:rPr>
+              <a:t>)</a:t>
+            </a:r>
+            <a:endParaRPr lang="zh-TW" altLang="en-US" dirty="0">
+              <a:latin typeface="微軟正黑體" panose="020B0604030504040204" pitchFamily="34" charset="-120"/>
+              <a:ea typeface="微軟正黑體" panose="020B0604030504040204" pitchFamily="34" charset="-120"/>
+            </a:endParaRPr>
+          </a:p>
+        </p:txBody>
+      </p:sp>
+      <p:sp>
+        <p:nvSpPr>
+          <p:cNvPr id="2" name="心形 1"/>
+          <p:cNvSpPr/>
+          <p:nvPr/>
+        </p:nvSpPr>
+        <p:spPr>
+          <a:xfrm>
+            <a:off x="1179610" y="2076106"/>
+            <a:ext cx="472774" cy="381161"/>
+          </a:xfrm>
+          <a:prstGeom prst="heart">
+            <a:avLst/>
+          </a:prstGeom>
+          <a:solidFill>
+            <a:srgbClr val="FF0000"/>
+          </a:solidFill>
+        </p:spPr>
+        <p:style>
+          <a:lnRef idx="2">
+            <a:schemeClr val="accent1">
+              <a:shade val="50000"/>
+            </a:schemeClr>
+          </a:lnRef>
+          <a:fillRef idx="1">
+            <a:schemeClr val="accent1"/>
+          </a:fillRef>
+          <a:effectRef idx="0">
+            <a:schemeClr val="accent1"/>
+          </a:effectRef>
+          <a:fontRef idx="minor">
+            <a:schemeClr val="lt1"/>
+          </a:fontRef>
+        </p:style>
+        <p:txBody>
+          <a:bodyPr rtlCol="0" anchor="ctr"/>
+          <a:lstStyle/>
+          <a:p>
+            <a:pPr algn="ctr"/>
+            <a:endParaRPr lang="zh-TW" altLang="en-US"/>
+          </a:p>
+        </p:txBody>
+      </p:sp>
+      <p:sp>
+        <p:nvSpPr>
+          <p:cNvPr id="38" name="文字方塊 37"/>
+          <p:cNvSpPr txBox="1"/>
+          <p:nvPr/>
+        </p:nvSpPr>
+        <p:spPr>
+          <a:xfrm>
+            <a:off x="1723714" y="2081500"/>
+            <a:ext cx="1616901" cy="369332"/>
+          </a:xfrm>
+          <a:prstGeom prst="rect">
+            <a:avLst/>
+          </a:prstGeom>
+          <a:noFill/>
+        </p:spPr>
+        <p:txBody>
+          <a:bodyPr wrap="square" rtlCol="0">
+            <a:spAutoFit/>
+          </a:bodyPr>
+          <a:lstStyle/>
+          <a:p>
+            <a:r>
+              <a:rPr lang="zh-TW" altLang="en-US" dirty="0" smtClean="0">
+                <a:latin typeface="微軟正黑體" panose="020B0604030504040204" pitchFamily="34" charset="-120"/>
+                <a:ea typeface="微軟正黑體" panose="020B0604030504040204" pitchFamily="34" charset="-120"/>
+              </a:rPr>
+              <a:t>獲得</a:t>
+            </a:r>
+            <a:r>
+              <a:rPr lang="en-US" altLang="zh-TW" dirty="0" smtClean="0">
+                <a:latin typeface="微軟正黑體" panose="020B0604030504040204" pitchFamily="34" charset="-120"/>
+                <a:ea typeface="微軟正黑體" panose="020B0604030504040204" pitchFamily="34" charset="-120"/>
+              </a:rPr>
+              <a:t>+2</a:t>
+            </a:r>
+            <a:r>
+              <a:rPr lang="zh-TW" altLang="en-US" dirty="0" smtClean="0">
+                <a:latin typeface="微軟正黑體" panose="020B0604030504040204" pitchFamily="34" charset="-120"/>
+                <a:ea typeface="微軟正黑體" panose="020B0604030504040204" pitchFamily="34" charset="-120"/>
+              </a:rPr>
+              <a:t>心臟</a:t>
+            </a:r>
+            <a:endParaRPr lang="zh-TW" altLang="en-US" dirty="0">
+              <a:latin typeface="微軟正黑體" panose="020B0604030504040204" pitchFamily="34" charset="-120"/>
+              <a:ea typeface="微軟正黑體" panose="020B0604030504040204" pitchFamily="34" charset="-120"/>
+            </a:endParaRPr>
+          </a:p>
+        </p:txBody>
+      </p:sp>
+    </p:spTree>
+    <p:extLst>
+      <p:ext uri="{BB962C8B-B14F-4D97-AF65-F5344CB8AC3E}">
+        <p14:creationId xmlns:p14="http://schemas.microsoft.com/office/powerpoint/2010/main" val="3802529605"/>
       </p:ext>
     </p:extLst>
   </p:cSld>

</xml_diff>

<commit_message>
Modify the content about stealing
</commit_message>
<xml_diff>
--- a/Document/View.pptx
+++ b/Document/View.pptx
@@ -10,7 +10,8 @@
     <p:sldId id="257" r:id="rId4"/>
     <p:sldId id="259" r:id="rId5"/>
     <p:sldId id="260" r:id="rId6"/>
-    <p:sldId id="261" r:id="rId7"/>
+    <p:sldId id="262" r:id="rId7"/>
+    <p:sldId id="261" r:id="rId8"/>
   </p:sldIdLst>
   <p:sldSz cx="12192000" cy="6858000"/>
   <p:notesSz cx="6858000" cy="9144000"/>
@@ -248,7 +249,7 @@
           <a:p>
             <a:fld id="{C1AF68DD-3401-4B0B-B3BB-757E2922155C}" type="datetimeFigureOut">
               <a:rPr lang="zh-TW" altLang="en-US" smtClean="0"/>
-              <a:t>2015/12/23</a:t>
+              <a:t>2015/12/28</a:t>
             </a:fld>
             <a:endParaRPr lang="zh-TW" altLang="en-US"/>
           </a:p>
@@ -418,7 +419,7 @@
           <a:p>
             <a:fld id="{C1AF68DD-3401-4B0B-B3BB-757E2922155C}" type="datetimeFigureOut">
               <a:rPr lang="zh-TW" altLang="en-US" smtClean="0"/>
-              <a:t>2015/12/23</a:t>
+              <a:t>2015/12/28</a:t>
             </a:fld>
             <a:endParaRPr lang="zh-TW" altLang="en-US"/>
           </a:p>
@@ -598,7 +599,7 @@
           <a:p>
             <a:fld id="{C1AF68DD-3401-4B0B-B3BB-757E2922155C}" type="datetimeFigureOut">
               <a:rPr lang="zh-TW" altLang="en-US" smtClean="0"/>
-              <a:t>2015/12/23</a:t>
+              <a:t>2015/12/28</a:t>
             </a:fld>
             <a:endParaRPr lang="zh-TW" altLang="en-US"/>
           </a:p>
@@ -768,7 +769,7 @@
           <a:p>
             <a:fld id="{C1AF68DD-3401-4B0B-B3BB-757E2922155C}" type="datetimeFigureOut">
               <a:rPr lang="zh-TW" altLang="en-US" smtClean="0"/>
-              <a:t>2015/12/23</a:t>
+              <a:t>2015/12/28</a:t>
             </a:fld>
             <a:endParaRPr lang="zh-TW" altLang="en-US"/>
           </a:p>
@@ -1014,7 +1015,7 @@
           <a:p>
             <a:fld id="{C1AF68DD-3401-4B0B-B3BB-757E2922155C}" type="datetimeFigureOut">
               <a:rPr lang="zh-TW" altLang="en-US" smtClean="0"/>
-              <a:t>2015/12/23</a:t>
+              <a:t>2015/12/28</a:t>
             </a:fld>
             <a:endParaRPr lang="zh-TW" altLang="en-US"/>
           </a:p>
@@ -1246,7 +1247,7 @@
           <a:p>
             <a:fld id="{C1AF68DD-3401-4B0B-B3BB-757E2922155C}" type="datetimeFigureOut">
               <a:rPr lang="zh-TW" altLang="en-US" smtClean="0"/>
-              <a:t>2015/12/23</a:t>
+              <a:t>2015/12/28</a:t>
             </a:fld>
             <a:endParaRPr lang="zh-TW" altLang="en-US"/>
           </a:p>
@@ -1613,7 +1614,7 @@
           <a:p>
             <a:fld id="{C1AF68DD-3401-4B0B-B3BB-757E2922155C}" type="datetimeFigureOut">
               <a:rPr lang="zh-TW" altLang="en-US" smtClean="0"/>
-              <a:t>2015/12/23</a:t>
+              <a:t>2015/12/28</a:t>
             </a:fld>
             <a:endParaRPr lang="zh-TW" altLang="en-US"/>
           </a:p>
@@ -1731,7 +1732,7 @@
           <a:p>
             <a:fld id="{C1AF68DD-3401-4B0B-B3BB-757E2922155C}" type="datetimeFigureOut">
               <a:rPr lang="zh-TW" altLang="en-US" smtClean="0"/>
-              <a:t>2015/12/23</a:t>
+              <a:t>2015/12/28</a:t>
             </a:fld>
             <a:endParaRPr lang="zh-TW" altLang="en-US"/>
           </a:p>
@@ -1826,7 +1827,7 @@
           <a:p>
             <a:fld id="{C1AF68DD-3401-4B0B-B3BB-757E2922155C}" type="datetimeFigureOut">
               <a:rPr lang="zh-TW" altLang="en-US" smtClean="0"/>
-              <a:t>2015/12/23</a:t>
+              <a:t>2015/12/28</a:t>
             </a:fld>
             <a:endParaRPr lang="zh-TW" altLang="en-US"/>
           </a:p>
@@ -2103,7 +2104,7 @@
           <a:p>
             <a:fld id="{C1AF68DD-3401-4B0B-B3BB-757E2922155C}" type="datetimeFigureOut">
               <a:rPr lang="zh-TW" altLang="en-US" smtClean="0"/>
-              <a:t>2015/12/23</a:t>
+              <a:t>2015/12/28</a:t>
             </a:fld>
             <a:endParaRPr lang="zh-TW" altLang="en-US"/>
           </a:p>
@@ -2356,7 +2357,7 @@
           <a:p>
             <a:fld id="{C1AF68DD-3401-4B0B-B3BB-757E2922155C}" type="datetimeFigureOut">
               <a:rPr lang="zh-TW" altLang="en-US" smtClean="0"/>
-              <a:t>2015/12/23</a:t>
+              <a:t>2015/12/28</a:t>
             </a:fld>
             <a:endParaRPr lang="zh-TW" altLang="en-US"/>
           </a:p>
@@ -2569,7 +2570,7 @@
           <a:p>
             <a:fld id="{C1AF68DD-3401-4B0B-B3BB-757E2922155C}" type="datetimeFigureOut">
               <a:rPr lang="zh-TW" altLang="en-US" smtClean="0"/>
-              <a:t>2015/12/23</a:t>
+              <a:t>2015/12/28</a:t>
             </a:fld>
             <a:endParaRPr lang="zh-TW" altLang="en-US"/>
           </a:p>
@@ -8365,18 +8366,30 @@
           <a:lstStyle/>
           <a:p>
             <a:r>
-              <a:rPr lang="en-US" altLang="zh-TW" dirty="0" smtClean="0"/>
+              <a:rPr lang="en-US" altLang="zh-TW" dirty="0" smtClean="0">
+                <a:latin typeface="微軟正黑體" panose="020B0604030504040204" pitchFamily="34" charset="-120"/>
+                <a:ea typeface="微軟正黑體" panose="020B0604030504040204" pitchFamily="34" charset="-120"/>
+              </a:rPr>
               <a:t>(</a:t>
             </a:r>
             <a:r>
-              <a:rPr lang="zh-TW" altLang="en-US" dirty="0"/>
+              <a:rPr lang="zh-TW" altLang="en-US" dirty="0">
+                <a:latin typeface="微軟正黑體" panose="020B0604030504040204" pitchFamily="34" charset="-120"/>
+                <a:ea typeface="微軟正黑體" panose="020B0604030504040204" pitchFamily="34" charset="-120"/>
+              </a:rPr>
               <a:t>昏迷</a:t>
             </a:r>
             <a:r>
-              <a:rPr lang="en-US" altLang="zh-TW" dirty="0" smtClean="0"/>
+              <a:rPr lang="en-US" altLang="zh-TW" dirty="0" smtClean="0">
+                <a:latin typeface="微軟正黑體" panose="020B0604030504040204" pitchFamily="34" charset="-120"/>
+                <a:ea typeface="微軟正黑體" panose="020B0604030504040204" pitchFamily="34" charset="-120"/>
+              </a:rPr>
               <a:t>)</a:t>
             </a:r>
-            <a:endParaRPr lang="zh-TW" altLang="en-US" dirty="0"/>
+            <a:endParaRPr lang="zh-TW" altLang="en-US" dirty="0">
+              <a:latin typeface="微軟正黑體" panose="020B0604030504040204" pitchFamily="34" charset="-120"/>
+              <a:ea typeface="微軟正黑體" panose="020B0604030504040204" pitchFamily="34" charset="-120"/>
+            </a:endParaRPr>
           </a:p>
         </p:txBody>
       </p:sp>
@@ -8721,7 +8734,7 @@
         </p:nvCxnSpPr>
         <p:spPr>
           <a:xfrm flipH="1">
-            <a:off x="1690753" y="4093843"/>
+            <a:off x="1628435" y="4032612"/>
             <a:ext cx="159695" cy="142875"/>
           </a:xfrm>
           <a:prstGeom prst="line">
@@ -8781,7 +8794,1285 @@
         </p:nvCxnSpPr>
         <p:spPr>
           <a:xfrm flipH="1" flipV="1">
-            <a:off x="1854443" y="4030230"/>
+            <a:off x="1792586" y="4029006"/>
+            <a:ext cx="159695" cy="142875"/>
+          </a:xfrm>
+          <a:prstGeom prst="line">
+            <a:avLst/>
+          </a:prstGeom>
+        </p:spPr>
+        <p:style>
+          <a:lnRef idx="1">
+            <a:schemeClr val="accent1"/>
+          </a:lnRef>
+          <a:fillRef idx="0">
+            <a:schemeClr val="accent1"/>
+          </a:fillRef>
+          <a:effectRef idx="0">
+            <a:schemeClr val="accent1"/>
+          </a:effectRef>
+          <a:fontRef idx="minor">
+            <a:schemeClr val="tx1"/>
+          </a:fontRef>
+        </p:style>
+      </p:cxnSp>
+      <p:sp>
+        <p:nvSpPr>
+          <p:cNvPr id="15" name="橢圓 14"/>
+          <p:cNvSpPr/>
+          <p:nvPr/>
+        </p:nvSpPr>
+        <p:spPr>
+          <a:xfrm>
+            <a:off x="4246178" y="4024243"/>
+            <a:ext cx="319390" cy="295276"/>
+          </a:xfrm>
+          <a:prstGeom prst="ellipse">
+            <a:avLst/>
+          </a:prstGeom>
+        </p:spPr>
+        <p:style>
+          <a:lnRef idx="2">
+            <a:schemeClr val="accent1">
+              <a:shade val="50000"/>
+            </a:schemeClr>
+          </a:lnRef>
+          <a:fillRef idx="1">
+            <a:schemeClr val="accent1"/>
+          </a:fillRef>
+          <a:effectRef idx="0">
+            <a:schemeClr val="accent1"/>
+          </a:effectRef>
+          <a:fontRef idx="minor">
+            <a:schemeClr val="lt1"/>
+          </a:fontRef>
+        </p:style>
+        <p:txBody>
+          <a:bodyPr rtlCol="0" anchor="ctr"/>
+          <a:lstStyle/>
+          <a:p>
+            <a:pPr algn="ctr"/>
+            <a:endParaRPr lang="zh-TW" altLang="en-US"/>
+          </a:p>
+        </p:txBody>
+      </p:sp>
+      <p:cxnSp>
+        <p:nvCxnSpPr>
+          <p:cNvPr id="16" name="直線接點 15"/>
+          <p:cNvCxnSpPr>
+            <a:stCxn id="15" idx="4"/>
+          </p:cNvCxnSpPr>
+          <p:nvPr/>
+        </p:nvCxnSpPr>
+        <p:spPr>
+          <a:xfrm>
+            <a:off x="4405873" y="4319519"/>
+            <a:ext cx="2228" cy="495299"/>
+          </a:xfrm>
+          <a:prstGeom prst="line">
+            <a:avLst/>
+          </a:prstGeom>
+        </p:spPr>
+        <p:style>
+          <a:lnRef idx="1">
+            <a:schemeClr val="accent1"/>
+          </a:lnRef>
+          <a:fillRef idx="0">
+            <a:schemeClr val="accent1"/>
+          </a:fillRef>
+          <a:effectRef idx="0">
+            <a:schemeClr val="accent1"/>
+          </a:effectRef>
+          <a:fontRef idx="minor">
+            <a:schemeClr val="tx1"/>
+          </a:fontRef>
+        </p:style>
+      </p:cxnSp>
+      <p:cxnSp>
+        <p:nvCxnSpPr>
+          <p:cNvPr id="17" name="直線接點 16"/>
+          <p:cNvCxnSpPr/>
+          <p:nvPr/>
+        </p:nvCxnSpPr>
+        <p:spPr>
+          <a:xfrm flipV="1">
+            <a:off x="4183666" y="4490968"/>
+            <a:ext cx="205385" cy="195262"/>
+          </a:xfrm>
+          <a:prstGeom prst="line">
+            <a:avLst/>
+          </a:prstGeom>
+        </p:spPr>
+        <p:style>
+          <a:lnRef idx="1">
+            <a:schemeClr val="accent1"/>
+          </a:lnRef>
+          <a:fillRef idx="0">
+            <a:schemeClr val="accent1"/>
+          </a:fillRef>
+          <a:effectRef idx="0">
+            <a:schemeClr val="accent1"/>
+          </a:effectRef>
+          <a:fontRef idx="minor">
+            <a:schemeClr val="tx1"/>
+          </a:fontRef>
+        </p:style>
+      </p:cxnSp>
+      <p:cxnSp>
+        <p:nvCxnSpPr>
+          <p:cNvPr id="18" name="直線接點 17"/>
+          <p:cNvCxnSpPr/>
+          <p:nvPr/>
+        </p:nvCxnSpPr>
+        <p:spPr>
+          <a:xfrm flipH="1">
+            <a:off x="4246178" y="4814818"/>
+            <a:ext cx="159695" cy="142875"/>
+          </a:xfrm>
+          <a:prstGeom prst="line">
+            <a:avLst/>
+          </a:prstGeom>
+        </p:spPr>
+        <p:style>
+          <a:lnRef idx="1">
+            <a:schemeClr val="accent1"/>
+          </a:lnRef>
+          <a:fillRef idx="0">
+            <a:schemeClr val="accent1"/>
+          </a:fillRef>
+          <a:effectRef idx="0">
+            <a:schemeClr val="accent1"/>
+          </a:effectRef>
+          <a:fontRef idx="minor">
+            <a:schemeClr val="tx1"/>
+          </a:fontRef>
+        </p:style>
+      </p:cxnSp>
+      <p:cxnSp>
+        <p:nvCxnSpPr>
+          <p:cNvPr id="19" name="直線接點 18"/>
+          <p:cNvCxnSpPr/>
+          <p:nvPr/>
+        </p:nvCxnSpPr>
+        <p:spPr>
+          <a:xfrm>
+            <a:off x="4409674" y="4488586"/>
+            <a:ext cx="205385" cy="195262"/>
+          </a:xfrm>
+          <a:prstGeom prst="line">
+            <a:avLst/>
+          </a:prstGeom>
+        </p:spPr>
+        <p:style>
+          <a:lnRef idx="1">
+            <a:schemeClr val="accent1"/>
+          </a:lnRef>
+          <a:fillRef idx="0">
+            <a:schemeClr val="accent1"/>
+          </a:fillRef>
+          <a:effectRef idx="0">
+            <a:schemeClr val="accent1"/>
+          </a:effectRef>
+          <a:fontRef idx="minor">
+            <a:schemeClr val="tx1"/>
+          </a:fontRef>
+        </p:style>
+      </p:cxnSp>
+      <p:cxnSp>
+        <p:nvCxnSpPr>
+          <p:cNvPr id="20" name="直線接點 19"/>
+          <p:cNvCxnSpPr/>
+          <p:nvPr/>
+        </p:nvCxnSpPr>
+        <p:spPr>
+          <a:xfrm flipH="1" flipV="1">
+            <a:off x="4472186" y="4812436"/>
+            <a:ext cx="159695" cy="142875"/>
+          </a:xfrm>
+          <a:prstGeom prst="line">
+            <a:avLst/>
+          </a:prstGeom>
+        </p:spPr>
+        <p:style>
+          <a:lnRef idx="1">
+            <a:schemeClr val="accent1"/>
+          </a:lnRef>
+          <a:fillRef idx="0">
+            <a:schemeClr val="accent1"/>
+          </a:fillRef>
+          <a:effectRef idx="0">
+            <a:schemeClr val="accent1"/>
+          </a:effectRef>
+          <a:fontRef idx="minor">
+            <a:schemeClr val="tx1"/>
+          </a:fontRef>
+        </p:style>
+      </p:cxnSp>
+      <p:sp>
+        <p:nvSpPr>
+          <p:cNvPr id="21" name="橢圓 20"/>
+          <p:cNvSpPr/>
+          <p:nvPr/>
+        </p:nvSpPr>
+        <p:spPr>
+          <a:xfrm>
+            <a:off x="6546148" y="3386069"/>
+            <a:ext cx="319390" cy="295276"/>
+          </a:xfrm>
+          <a:prstGeom prst="ellipse">
+            <a:avLst/>
+          </a:prstGeom>
+        </p:spPr>
+        <p:style>
+          <a:lnRef idx="2">
+            <a:schemeClr val="accent1">
+              <a:shade val="50000"/>
+            </a:schemeClr>
+          </a:lnRef>
+          <a:fillRef idx="1">
+            <a:schemeClr val="accent1"/>
+          </a:fillRef>
+          <a:effectRef idx="0">
+            <a:schemeClr val="accent1"/>
+          </a:effectRef>
+          <a:fontRef idx="minor">
+            <a:schemeClr val="lt1"/>
+          </a:fontRef>
+        </p:style>
+        <p:txBody>
+          <a:bodyPr rtlCol="0" anchor="ctr"/>
+          <a:lstStyle/>
+          <a:p>
+            <a:pPr algn="ctr"/>
+            <a:endParaRPr lang="zh-TW" altLang="en-US"/>
+          </a:p>
+        </p:txBody>
+      </p:sp>
+      <p:cxnSp>
+        <p:nvCxnSpPr>
+          <p:cNvPr id="22" name="直線接點 21"/>
+          <p:cNvCxnSpPr>
+            <a:stCxn id="21" idx="4"/>
+          </p:cNvCxnSpPr>
+          <p:nvPr/>
+        </p:nvCxnSpPr>
+        <p:spPr>
+          <a:xfrm>
+            <a:off x="6705843" y="3681345"/>
+            <a:ext cx="2228" cy="495299"/>
+          </a:xfrm>
+          <a:prstGeom prst="line">
+            <a:avLst/>
+          </a:prstGeom>
+        </p:spPr>
+        <p:style>
+          <a:lnRef idx="1">
+            <a:schemeClr val="accent1"/>
+          </a:lnRef>
+          <a:fillRef idx="0">
+            <a:schemeClr val="accent1"/>
+          </a:fillRef>
+          <a:effectRef idx="0">
+            <a:schemeClr val="accent1"/>
+          </a:effectRef>
+          <a:fontRef idx="minor">
+            <a:schemeClr val="tx1"/>
+          </a:fontRef>
+        </p:style>
+      </p:cxnSp>
+      <p:cxnSp>
+        <p:nvCxnSpPr>
+          <p:cNvPr id="23" name="直線接點 22"/>
+          <p:cNvCxnSpPr/>
+          <p:nvPr/>
+        </p:nvCxnSpPr>
+        <p:spPr>
+          <a:xfrm flipV="1">
+            <a:off x="6483636" y="3852794"/>
+            <a:ext cx="205385" cy="195262"/>
+          </a:xfrm>
+          <a:prstGeom prst="line">
+            <a:avLst/>
+          </a:prstGeom>
+        </p:spPr>
+        <p:style>
+          <a:lnRef idx="1">
+            <a:schemeClr val="accent1"/>
+          </a:lnRef>
+          <a:fillRef idx="0">
+            <a:schemeClr val="accent1"/>
+          </a:fillRef>
+          <a:effectRef idx="0">
+            <a:schemeClr val="accent1"/>
+          </a:effectRef>
+          <a:fontRef idx="minor">
+            <a:schemeClr val="tx1"/>
+          </a:fontRef>
+        </p:style>
+      </p:cxnSp>
+      <p:cxnSp>
+        <p:nvCxnSpPr>
+          <p:cNvPr id="24" name="直線接點 23"/>
+          <p:cNvCxnSpPr/>
+          <p:nvPr/>
+        </p:nvCxnSpPr>
+        <p:spPr>
+          <a:xfrm flipH="1">
+            <a:off x="6546148" y="4176644"/>
+            <a:ext cx="159695" cy="142875"/>
+          </a:xfrm>
+          <a:prstGeom prst="line">
+            <a:avLst/>
+          </a:prstGeom>
+        </p:spPr>
+        <p:style>
+          <a:lnRef idx="1">
+            <a:schemeClr val="accent1"/>
+          </a:lnRef>
+          <a:fillRef idx="0">
+            <a:schemeClr val="accent1"/>
+          </a:fillRef>
+          <a:effectRef idx="0">
+            <a:schemeClr val="accent1"/>
+          </a:effectRef>
+          <a:fontRef idx="minor">
+            <a:schemeClr val="tx1"/>
+          </a:fontRef>
+        </p:style>
+      </p:cxnSp>
+      <p:cxnSp>
+        <p:nvCxnSpPr>
+          <p:cNvPr id="25" name="直線接點 24"/>
+          <p:cNvCxnSpPr/>
+          <p:nvPr/>
+        </p:nvCxnSpPr>
+        <p:spPr>
+          <a:xfrm>
+            <a:off x="6709644" y="3850412"/>
+            <a:ext cx="205385" cy="195262"/>
+          </a:xfrm>
+          <a:prstGeom prst="line">
+            <a:avLst/>
+          </a:prstGeom>
+        </p:spPr>
+        <p:style>
+          <a:lnRef idx="1">
+            <a:schemeClr val="accent1"/>
+          </a:lnRef>
+          <a:fillRef idx="0">
+            <a:schemeClr val="accent1"/>
+          </a:fillRef>
+          <a:effectRef idx="0">
+            <a:schemeClr val="accent1"/>
+          </a:effectRef>
+          <a:fontRef idx="minor">
+            <a:schemeClr val="tx1"/>
+          </a:fontRef>
+        </p:style>
+      </p:cxnSp>
+      <p:cxnSp>
+        <p:nvCxnSpPr>
+          <p:cNvPr id="26" name="直線接點 25"/>
+          <p:cNvCxnSpPr/>
+          <p:nvPr/>
+        </p:nvCxnSpPr>
+        <p:spPr>
+          <a:xfrm flipH="1" flipV="1">
+            <a:off x="6772156" y="4174262"/>
+            <a:ext cx="159695" cy="142875"/>
+          </a:xfrm>
+          <a:prstGeom prst="line">
+            <a:avLst/>
+          </a:prstGeom>
+        </p:spPr>
+        <p:style>
+          <a:lnRef idx="1">
+            <a:schemeClr val="accent1"/>
+          </a:lnRef>
+          <a:fillRef idx="0">
+            <a:schemeClr val="accent1"/>
+          </a:fillRef>
+          <a:effectRef idx="0">
+            <a:schemeClr val="accent1"/>
+          </a:effectRef>
+          <a:fontRef idx="minor">
+            <a:schemeClr val="tx1"/>
+          </a:fontRef>
+        </p:style>
+      </p:cxnSp>
+      <p:sp>
+        <p:nvSpPr>
+          <p:cNvPr id="27" name="橢圓 26"/>
+          <p:cNvSpPr/>
+          <p:nvPr/>
+        </p:nvSpPr>
+        <p:spPr>
+          <a:xfrm>
+            <a:off x="2163284" y="3238431"/>
+            <a:ext cx="319390" cy="295276"/>
+          </a:xfrm>
+          <a:prstGeom prst="ellipse">
+            <a:avLst/>
+          </a:prstGeom>
+          <a:solidFill>
+            <a:srgbClr val="7030A0"/>
+          </a:solidFill>
+        </p:spPr>
+        <p:style>
+          <a:lnRef idx="2">
+            <a:schemeClr val="accent1">
+              <a:shade val="50000"/>
+            </a:schemeClr>
+          </a:lnRef>
+          <a:fillRef idx="1">
+            <a:schemeClr val="accent1"/>
+          </a:fillRef>
+          <a:effectRef idx="0">
+            <a:schemeClr val="accent1"/>
+          </a:effectRef>
+          <a:fontRef idx="minor">
+            <a:schemeClr val="lt1"/>
+          </a:fontRef>
+        </p:style>
+        <p:txBody>
+          <a:bodyPr rtlCol="0" anchor="ctr"/>
+          <a:lstStyle/>
+          <a:p>
+            <a:pPr algn="ctr"/>
+            <a:endParaRPr lang="zh-TW" altLang="en-US"/>
+          </a:p>
+        </p:txBody>
+      </p:sp>
+      <p:cxnSp>
+        <p:nvCxnSpPr>
+          <p:cNvPr id="28" name="直線接點 27"/>
+          <p:cNvCxnSpPr>
+            <a:stCxn id="27" idx="4"/>
+          </p:cNvCxnSpPr>
+          <p:nvPr/>
+        </p:nvCxnSpPr>
+        <p:spPr>
+          <a:xfrm>
+            <a:off x="2322979" y="3533707"/>
+            <a:ext cx="2228" cy="495299"/>
+          </a:xfrm>
+          <a:prstGeom prst="line">
+            <a:avLst/>
+          </a:prstGeom>
+        </p:spPr>
+        <p:style>
+          <a:lnRef idx="1">
+            <a:schemeClr val="accent1"/>
+          </a:lnRef>
+          <a:fillRef idx="0">
+            <a:schemeClr val="accent1"/>
+          </a:fillRef>
+          <a:effectRef idx="0">
+            <a:schemeClr val="accent1"/>
+          </a:effectRef>
+          <a:fontRef idx="minor">
+            <a:schemeClr val="tx1"/>
+          </a:fontRef>
+        </p:style>
+      </p:cxnSp>
+      <p:cxnSp>
+        <p:nvCxnSpPr>
+          <p:cNvPr id="29" name="直線接點 28"/>
+          <p:cNvCxnSpPr/>
+          <p:nvPr/>
+        </p:nvCxnSpPr>
+        <p:spPr>
+          <a:xfrm flipV="1">
+            <a:off x="2100772" y="3705156"/>
+            <a:ext cx="205385" cy="195262"/>
+          </a:xfrm>
+          <a:prstGeom prst="line">
+            <a:avLst/>
+          </a:prstGeom>
+        </p:spPr>
+        <p:style>
+          <a:lnRef idx="1">
+            <a:schemeClr val="accent1"/>
+          </a:lnRef>
+          <a:fillRef idx="0">
+            <a:schemeClr val="accent1"/>
+          </a:fillRef>
+          <a:effectRef idx="0">
+            <a:schemeClr val="accent1"/>
+          </a:effectRef>
+          <a:fontRef idx="minor">
+            <a:schemeClr val="tx1"/>
+          </a:fontRef>
+        </p:style>
+      </p:cxnSp>
+      <p:cxnSp>
+        <p:nvCxnSpPr>
+          <p:cNvPr id="30" name="直線接點 29"/>
+          <p:cNvCxnSpPr/>
+          <p:nvPr/>
+        </p:nvCxnSpPr>
+        <p:spPr>
+          <a:xfrm flipH="1">
+            <a:off x="2163284" y="4029006"/>
+            <a:ext cx="159695" cy="142875"/>
+          </a:xfrm>
+          <a:prstGeom prst="line">
+            <a:avLst/>
+          </a:prstGeom>
+        </p:spPr>
+        <p:style>
+          <a:lnRef idx="1">
+            <a:schemeClr val="accent1"/>
+          </a:lnRef>
+          <a:fillRef idx="0">
+            <a:schemeClr val="accent1"/>
+          </a:fillRef>
+          <a:effectRef idx="0">
+            <a:schemeClr val="accent1"/>
+          </a:effectRef>
+          <a:fontRef idx="minor">
+            <a:schemeClr val="tx1"/>
+          </a:fontRef>
+        </p:style>
+      </p:cxnSp>
+      <p:cxnSp>
+        <p:nvCxnSpPr>
+          <p:cNvPr id="31" name="直線接點 30"/>
+          <p:cNvCxnSpPr/>
+          <p:nvPr/>
+        </p:nvCxnSpPr>
+        <p:spPr>
+          <a:xfrm>
+            <a:off x="2326780" y="3702774"/>
+            <a:ext cx="205385" cy="195262"/>
+          </a:xfrm>
+          <a:prstGeom prst="line">
+            <a:avLst/>
+          </a:prstGeom>
+        </p:spPr>
+        <p:style>
+          <a:lnRef idx="1">
+            <a:schemeClr val="accent1"/>
+          </a:lnRef>
+          <a:fillRef idx="0">
+            <a:schemeClr val="accent1"/>
+          </a:fillRef>
+          <a:effectRef idx="0">
+            <a:schemeClr val="accent1"/>
+          </a:effectRef>
+          <a:fontRef idx="minor">
+            <a:schemeClr val="tx1"/>
+          </a:fontRef>
+        </p:style>
+      </p:cxnSp>
+      <p:cxnSp>
+        <p:nvCxnSpPr>
+          <p:cNvPr id="32" name="直線接點 31"/>
+          <p:cNvCxnSpPr/>
+          <p:nvPr/>
+        </p:nvCxnSpPr>
+        <p:spPr>
+          <a:xfrm flipH="1" flipV="1">
+            <a:off x="2320751" y="4017878"/>
+            <a:ext cx="159695" cy="142875"/>
+          </a:xfrm>
+          <a:prstGeom prst="line">
+            <a:avLst/>
+          </a:prstGeom>
+        </p:spPr>
+        <p:style>
+          <a:lnRef idx="1">
+            <a:schemeClr val="accent1"/>
+          </a:lnRef>
+          <a:fillRef idx="0">
+            <a:schemeClr val="accent1"/>
+          </a:fillRef>
+          <a:effectRef idx="0">
+            <a:schemeClr val="accent1"/>
+          </a:effectRef>
+          <a:fontRef idx="minor">
+            <a:schemeClr val="tx1"/>
+          </a:fontRef>
+        </p:style>
+      </p:cxnSp>
+      <p:cxnSp>
+        <p:nvCxnSpPr>
+          <p:cNvPr id="33" name="直線接點 32"/>
+          <p:cNvCxnSpPr/>
+          <p:nvPr/>
+        </p:nvCxnSpPr>
+        <p:spPr>
+          <a:xfrm>
+            <a:off x="2100772" y="4277813"/>
+            <a:ext cx="507922" cy="0"/>
+          </a:xfrm>
+          <a:prstGeom prst="line">
+            <a:avLst/>
+          </a:prstGeom>
+          <a:ln w="19050">
+            <a:solidFill>
+              <a:srgbClr val="FF0000"/>
+            </a:solidFill>
+          </a:ln>
+        </p:spPr>
+        <p:style>
+          <a:lnRef idx="1">
+            <a:schemeClr val="accent1"/>
+          </a:lnRef>
+          <a:fillRef idx="0">
+            <a:schemeClr val="accent1"/>
+          </a:fillRef>
+          <a:effectRef idx="0">
+            <a:schemeClr val="accent1"/>
+          </a:effectRef>
+          <a:fontRef idx="minor">
+            <a:schemeClr val="tx1"/>
+          </a:fontRef>
+        </p:style>
+      </p:cxnSp>
+      <p:cxnSp>
+        <p:nvCxnSpPr>
+          <p:cNvPr id="34" name="直線接點 33"/>
+          <p:cNvCxnSpPr/>
+          <p:nvPr/>
+        </p:nvCxnSpPr>
+        <p:spPr>
+          <a:xfrm>
+            <a:off x="4218225" y="5062398"/>
+            <a:ext cx="507922" cy="0"/>
+          </a:xfrm>
+          <a:prstGeom prst="line">
+            <a:avLst/>
+          </a:prstGeom>
+          <a:ln w="19050">
+            <a:solidFill>
+              <a:srgbClr val="FF0000"/>
+            </a:solidFill>
+          </a:ln>
+        </p:spPr>
+        <p:style>
+          <a:lnRef idx="1">
+            <a:schemeClr val="accent1"/>
+          </a:lnRef>
+          <a:fillRef idx="0">
+            <a:schemeClr val="accent1"/>
+          </a:fillRef>
+          <a:effectRef idx="0">
+            <a:schemeClr val="accent1"/>
+          </a:effectRef>
+          <a:fontRef idx="minor">
+            <a:schemeClr val="tx1"/>
+          </a:fontRef>
+        </p:style>
+      </p:cxnSp>
+      <p:cxnSp>
+        <p:nvCxnSpPr>
+          <p:cNvPr id="35" name="直線接點 34"/>
+          <p:cNvCxnSpPr/>
+          <p:nvPr/>
+        </p:nvCxnSpPr>
+        <p:spPr>
+          <a:xfrm>
+            <a:off x="6546148" y="4488586"/>
+            <a:ext cx="507922" cy="0"/>
+          </a:xfrm>
+          <a:prstGeom prst="line">
+            <a:avLst/>
+          </a:prstGeom>
+          <a:ln w="19050">
+            <a:solidFill>
+              <a:srgbClr val="FF0000"/>
+            </a:solidFill>
+          </a:ln>
+        </p:spPr>
+        <p:style>
+          <a:lnRef idx="1">
+            <a:schemeClr val="accent1"/>
+          </a:lnRef>
+          <a:fillRef idx="0">
+            <a:schemeClr val="accent1"/>
+          </a:fillRef>
+          <a:effectRef idx="0">
+            <a:schemeClr val="accent1"/>
+          </a:effectRef>
+          <a:fontRef idx="minor">
+            <a:schemeClr val="tx1"/>
+          </a:fontRef>
+        </p:style>
+      </p:cxnSp>
+      <p:sp>
+        <p:nvSpPr>
+          <p:cNvPr id="39" name="文字方塊 38"/>
+          <p:cNvSpPr txBox="1"/>
+          <p:nvPr/>
+        </p:nvSpPr>
+        <p:spPr>
+          <a:xfrm>
+            <a:off x="1995823" y="4245699"/>
+            <a:ext cx="1100027" cy="369332"/>
+          </a:xfrm>
+          <a:prstGeom prst="rect">
+            <a:avLst/>
+          </a:prstGeom>
+          <a:noFill/>
+        </p:spPr>
+        <p:txBody>
+          <a:bodyPr wrap="square" rtlCol="0">
+            <a:spAutoFit/>
+          </a:bodyPr>
+          <a:lstStyle/>
+          <a:p>
+            <a:r>
+              <a:rPr lang="en-US" altLang="zh-TW" dirty="0" smtClean="0">
+                <a:latin typeface="微軟正黑體" panose="020B0604030504040204" pitchFamily="34" charset="-120"/>
+                <a:ea typeface="微軟正黑體" panose="020B0604030504040204" pitchFamily="34" charset="-120"/>
+              </a:rPr>
+              <a:t>(</a:t>
+            </a:r>
+            <a:r>
+              <a:rPr lang="zh-TW" altLang="en-US" dirty="0">
+                <a:latin typeface="微軟正黑體" panose="020B0604030504040204" pitchFamily="34" charset="-120"/>
+                <a:ea typeface="微軟正黑體" panose="020B0604030504040204" pitchFamily="34" charset="-120"/>
+              </a:rPr>
+              <a:t>昏迷</a:t>
+            </a:r>
+            <a:r>
+              <a:rPr lang="en-US" altLang="zh-TW" dirty="0" smtClean="0">
+                <a:latin typeface="微軟正黑體" panose="020B0604030504040204" pitchFamily="34" charset="-120"/>
+                <a:ea typeface="微軟正黑體" panose="020B0604030504040204" pitchFamily="34" charset="-120"/>
+              </a:rPr>
+              <a:t>)</a:t>
+            </a:r>
+            <a:endParaRPr lang="zh-TW" altLang="en-US" dirty="0">
+              <a:latin typeface="微軟正黑體" panose="020B0604030504040204" pitchFamily="34" charset="-120"/>
+              <a:ea typeface="微軟正黑體" panose="020B0604030504040204" pitchFamily="34" charset="-120"/>
+            </a:endParaRPr>
+          </a:p>
+        </p:txBody>
+      </p:sp>
+      <p:cxnSp>
+        <p:nvCxnSpPr>
+          <p:cNvPr id="40" name="直線接點 39"/>
+          <p:cNvCxnSpPr/>
+          <p:nvPr/>
+        </p:nvCxnSpPr>
+        <p:spPr>
+          <a:xfrm>
+            <a:off x="1506779" y="3149237"/>
+            <a:ext cx="562702" cy="0"/>
+          </a:xfrm>
+          <a:prstGeom prst="line">
+            <a:avLst/>
+          </a:prstGeom>
+          <a:ln w="57150">
+            <a:solidFill>
+              <a:schemeClr val="bg2">
+                <a:lumMod val="75000"/>
+              </a:schemeClr>
+            </a:solidFill>
+          </a:ln>
+          <a:effectLst>
+            <a:innerShdw blurRad="114300">
+              <a:prstClr val="black"/>
+            </a:innerShdw>
+          </a:effectLst>
+        </p:spPr>
+        <p:style>
+          <a:lnRef idx="1">
+            <a:schemeClr val="accent1"/>
+          </a:lnRef>
+          <a:fillRef idx="0">
+            <a:schemeClr val="accent1"/>
+          </a:fillRef>
+          <a:effectRef idx="0">
+            <a:schemeClr val="accent1"/>
+          </a:effectRef>
+          <a:fontRef idx="minor">
+            <a:schemeClr val="tx1"/>
+          </a:fontRef>
+        </p:style>
+      </p:cxnSp>
+      <p:cxnSp>
+        <p:nvCxnSpPr>
+          <p:cNvPr id="44" name="直線接點 43"/>
+          <p:cNvCxnSpPr/>
+          <p:nvPr/>
+        </p:nvCxnSpPr>
+        <p:spPr>
+          <a:xfrm>
+            <a:off x="1509237" y="3149237"/>
+            <a:ext cx="400549" cy="0"/>
+          </a:xfrm>
+          <a:prstGeom prst="line">
+            <a:avLst/>
+          </a:prstGeom>
+          <a:ln w="57150">
+            <a:solidFill>
+              <a:schemeClr val="accent6"/>
+            </a:solidFill>
+          </a:ln>
+        </p:spPr>
+        <p:style>
+          <a:lnRef idx="1">
+            <a:schemeClr val="accent1"/>
+          </a:lnRef>
+          <a:fillRef idx="0">
+            <a:schemeClr val="accent1"/>
+          </a:fillRef>
+          <a:effectRef idx="0">
+            <a:schemeClr val="accent1"/>
+          </a:effectRef>
+          <a:fontRef idx="minor">
+            <a:schemeClr val="tx1"/>
+          </a:fontRef>
+        </p:style>
+      </p:cxnSp>
+      <p:sp>
+        <p:nvSpPr>
+          <p:cNvPr id="50" name="文字方塊 49"/>
+          <p:cNvSpPr txBox="1"/>
+          <p:nvPr/>
+        </p:nvSpPr>
+        <p:spPr>
+          <a:xfrm>
+            <a:off x="1404904" y="2803614"/>
+            <a:ext cx="857928" cy="369332"/>
+          </a:xfrm>
+          <a:prstGeom prst="rect">
+            <a:avLst/>
+          </a:prstGeom>
+          <a:noFill/>
+        </p:spPr>
+        <p:txBody>
+          <a:bodyPr wrap="square" rtlCol="0">
+            <a:spAutoFit/>
+          </a:bodyPr>
+          <a:lstStyle/>
+          <a:p>
+            <a:r>
+              <a:rPr lang="en-US" altLang="zh-TW" sz="1400" dirty="0" smtClean="0">
+                <a:latin typeface="微軟正黑體" panose="020B0604030504040204" pitchFamily="34" charset="-120"/>
+                <a:ea typeface="微軟正黑體" panose="020B0604030504040204" pitchFamily="34" charset="-120"/>
+              </a:rPr>
+              <a:t>(</a:t>
+            </a:r>
+            <a:r>
+              <a:rPr lang="zh-TW" altLang="en-US" sz="1400" dirty="0" smtClean="0">
+                <a:latin typeface="微軟正黑體" panose="020B0604030504040204" pitchFamily="34" charset="-120"/>
+                <a:ea typeface="微軟正黑體" panose="020B0604030504040204" pitchFamily="34" charset="-120"/>
+              </a:rPr>
+              <a:t>搶奪中</a:t>
+            </a:r>
+            <a:r>
+              <a:rPr lang="en-US" altLang="zh-TW" dirty="0" smtClean="0"/>
+              <a:t>)</a:t>
+            </a:r>
+            <a:endParaRPr lang="zh-TW" altLang="en-US" dirty="0"/>
+          </a:p>
+        </p:txBody>
+      </p:sp>
+    </p:spTree>
+    <p:extLst>
+      <p:ext uri="{BB962C8B-B14F-4D97-AF65-F5344CB8AC3E}">
+        <p14:creationId xmlns:p14="http://schemas.microsoft.com/office/powerpoint/2010/main" val="1712653111"/>
+      </p:ext>
+    </p:extLst>
+  </p:cSld>
+  <p:clrMapOvr>
+    <a:masterClrMapping/>
+  </p:clrMapOvr>
+  <p:timing>
+    <p:tnLst>
+      <p:par>
+        <p:cTn id="1" dur="indefinite" restart="never" nodeType="tmRoot"/>
+      </p:par>
+    </p:tnLst>
+  </p:timing>
+</p:sld>
+</file>
+
+<file path=ppt/slides/slide7.xml><?xml version="1.0" encoding="utf-8"?>
+<p:sld xmlns:a="http://schemas.openxmlformats.org/drawingml/2006/main" xmlns:r="http://schemas.openxmlformats.org/officeDocument/2006/relationships" xmlns:p="http://schemas.openxmlformats.org/presentationml/2006/main">
+  <p:cSld>
+    <p:spTree>
+      <p:nvGrpSpPr>
+        <p:cNvPr id="1" name=""/>
+        <p:cNvGrpSpPr/>
+        <p:nvPr/>
+      </p:nvGrpSpPr>
+      <p:grpSpPr>
+        <a:xfrm>
+          <a:off x="0" y="0"/>
+          <a:ext cx="0" cy="0"/>
+          <a:chOff x="0" y="0"/>
+          <a:chExt cx="0" cy="0"/>
+        </a:xfrm>
+      </p:grpSpPr>
+      <p:sp>
+        <p:nvSpPr>
+          <p:cNvPr id="4" name="矩形 3"/>
+          <p:cNvSpPr/>
+          <p:nvPr/>
+        </p:nvSpPr>
+        <p:spPr>
+          <a:xfrm>
+            <a:off x="685800" y="1085850"/>
+            <a:ext cx="8343900" cy="5181600"/>
+          </a:xfrm>
+          <a:prstGeom prst="rect">
+            <a:avLst/>
+          </a:prstGeom>
+          <a:noFill/>
+          <a:ln w="28575">
+            <a:solidFill>
+              <a:schemeClr val="bg2">
+                <a:lumMod val="10000"/>
+              </a:schemeClr>
+            </a:solidFill>
+          </a:ln>
+        </p:spPr>
+        <p:style>
+          <a:lnRef idx="2">
+            <a:schemeClr val="accent1">
+              <a:shade val="50000"/>
+            </a:schemeClr>
+          </a:lnRef>
+          <a:fillRef idx="1">
+            <a:schemeClr val="accent1"/>
+          </a:fillRef>
+          <a:effectRef idx="0">
+            <a:schemeClr val="accent1"/>
+          </a:effectRef>
+          <a:fontRef idx="minor">
+            <a:schemeClr val="lt1"/>
+          </a:fontRef>
+        </p:style>
+        <p:txBody>
+          <a:bodyPr rtlCol="0" anchor="ctr"/>
+          <a:lstStyle/>
+          <a:p>
+            <a:pPr algn="ctr"/>
+            <a:endParaRPr lang="zh-TW" altLang="en-US"/>
+          </a:p>
+        </p:txBody>
+      </p:sp>
+      <p:cxnSp>
+        <p:nvCxnSpPr>
+          <p:cNvPr id="5" name="直線接點 4"/>
+          <p:cNvCxnSpPr/>
+          <p:nvPr/>
+        </p:nvCxnSpPr>
+        <p:spPr>
+          <a:xfrm>
+            <a:off x="861152" y="1453784"/>
+            <a:ext cx="3240000" cy="0"/>
+          </a:xfrm>
+          <a:prstGeom prst="line">
+            <a:avLst/>
+          </a:prstGeom>
+          <a:ln w="28575">
+            <a:solidFill>
+              <a:srgbClr val="FF0000"/>
+            </a:solidFill>
+          </a:ln>
+        </p:spPr>
+        <p:style>
+          <a:lnRef idx="3">
+            <a:schemeClr val="accent2"/>
+          </a:lnRef>
+          <a:fillRef idx="0">
+            <a:schemeClr val="accent2"/>
+          </a:fillRef>
+          <a:effectRef idx="2">
+            <a:schemeClr val="accent2"/>
+          </a:effectRef>
+          <a:fontRef idx="minor">
+            <a:schemeClr val="tx1"/>
+          </a:fontRef>
+        </p:style>
+      </p:cxnSp>
+      <p:cxnSp>
+        <p:nvCxnSpPr>
+          <p:cNvPr id="6" name="直線接點 5"/>
+          <p:cNvCxnSpPr/>
+          <p:nvPr/>
+        </p:nvCxnSpPr>
+        <p:spPr>
+          <a:xfrm>
+            <a:off x="844330" y="1906904"/>
+            <a:ext cx="3240000" cy="0"/>
+          </a:xfrm>
+          <a:prstGeom prst="line">
+            <a:avLst/>
+          </a:prstGeom>
+          <a:ln w="28575">
+            <a:solidFill>
+              <a:srgbClr val="00B050"/>
+            </a:solidFill>
+          </a:ln>
+        </p:spPr>
+        <p:style>
+          <a:lnRef idx="1">
+            <a:schemeClr val="accent1"/>
+          </a:lnRef>
+          <a:fillRef idx="0">
+            <a:schemeClr val="accent1"/>
+          </a:fillRef>
+          <a:effectRef idx="0">
+            <a:schemeClr val="accent1"/>
+          </a:effectRef>
+          <a:fontRef idx="minor">
+            <a:schemeClr val="tx1"/>
+          </a:fontRef>
+        </p:style>
+      </p:cxnSp>
+      <p:sp>
+        <p:nvSpPr>
+          <p:cNvPr id="7" name="文字方塊 6"/>
+          <p:cNvSpPr txBox="1"/>
+          <p:nvPr/>
+        </p:nvSpPr>
+        <p:spPr>
+          <a:xfrm>
+            <a:off x="762694" y="1555803"/>
+            <a:ext cx="925079" cy="369332"/>
+          </a:xfrm>
+          <a:prstGeom prst="rect">
+            <a:avLst/>
+          </a:prstGeom>
+          <a:noFill/>
+        </p:spPr>
+        <p:txBody>
+          <a:bodyPr wrap="square" rtlCol="0">
+            <a:spAutoFit/>
+          </a:bodyPr>
+          <a:lstStyle/>
+          <a:p>
+            <a:r>
+              <a:rPr lang="en-US" altLang="zh-TW" dirty="0" smtClean="0">
+                <a:solidFill>
+                  <a:srgbClr val="00B050"/>
+                </a:solidFill>
+              </a:rPr>
+              <a:t>Health</a:t>
+            </a:r>
+            <a:endParaRPr lang="zh-TW" altLang="en-US" dirty="0">
+              <a:solidFill>
+                <a:srgbClr val="00B050"/>
+              </a:solidFill>
+            </a:endParaRPr>
+          </a:p>
+        </p:txBody>
+      </p:sp>
+      <p:sp>
+        <p:nvSpPr>
+          <p:cNvPr id="8" name="文字方塊 7"/>
+          <p:cNvSpPr txBox="1"/>
+          <p:nvPr/>
+        </p:nvSpPr>
+        <p:spPr>
+          <a:xfrm>
+            <a:off x="837112" y="1076017"/>
+            <a:ext cx="481148" cy="369332"/>
+          </a:xfrm>
+          <a:prstGeom prst="rect">
+            <a:avLst/>
+          </a:prstGeom>
+          <a:noFill/>
+        </p:spPr>
+        <p:txBody>
+          <a:bodyPr wrap="square" rtlCol="0">
+            <a:spAutoFit/>
+          </a:bodyPr>
+          <a:lstStyle/>
+          <a:p>
+            <a:r>
+              <a:rPr lang="en-US" altLang="zh-TW" dirty="0" smtClean="0">
+                <a:solidFill>
+                  <a:srgbClr val="FF0000"/>
+                </a:solidFill>
+              </a:rPr>
+              <a:t>HP</a:t>
+            </a:r>
+            <a:endParaRPr lang="zh-TW" altLang="en-US" dirty="0">
+              <a:solidFill>
+                <a:srgbClr val="FF0000"/>
+              </a:solidFill>
+            </a:endParaRPr>
+          </a:p>
+        </p:txBody>
+      </p:sp>
+      <p:sp>
+        <p:nvSpPr>
+          <p:cNvPr id="9" name="橢圓 8"/>
+          <p:cNvSpPr/>
+          <p:nvPr/>
+        </p:nvSpPr>
+        <p:spPr>
+          <a:xfrm>
+            <a:off x="1628435" y="3242037"/>
+            <a:ext cx="319390" cy="295276"/>
+          </a:xfrm>
+          <a:prstGeom prst="ellipse">
+            <a:avLst/>
+          </a:prstGeom>
+        </p:spPr>
+        <p:style>
+          <a:lnRef idx="2">
+            <a:schemeClr val="accent1">
+              <a:shade val="50000"/>
+            </a:schemeClr>
+          </a:lnRef>
+          <a:fillRef idx="1">
+            <a:schemeClr val="accent1"/>
+          </a:fillRef>
+          <a:effectRef idx="0">
+            <a:schemeClr val="accent1"/>
+          </a:effectRef>
+          <a:fontRef idx="minor">
+            <a:schemeClr val="lt1"/>
+          </a:fontRef>
+        </p:style>
+        <p:txBody>
+          <a:bodyPr rtlCol="0" anchor="ctr"/>
+          <a:lstStyle/>
+          <a:p>
+            <a:pPr algn="ctr"/>
+            <a:endParaRPr lang="zh-TW" altLang="en-US"/>
+          </a:p>
+        </p:txBody>
+      </p:sp>
+      <p:cxnSp>
+        <p:nvCxnSpPr>
+          <p:cNvPr id="10" name="直線接點 9"/>
+          <p:cNvCxnSpPr>
+            <a:stCxn id="9" idx="4"/>
+          </p:cNvCxnSpPr>
+          <p:nvPr/>
+        </p:nvCxnSpPr>
+        <p:spPr>
+          <a:xfrm>
+            <a:off x="1788130" y="3537313"/>
+            <a:ext cx="2228" cy="495299"/>
+          </a:xfrm>
+          <a:prstGeom prst="line">
+            <a:avLst/>
+          </a:prstGeom>
+        </p:spPr>
+        <p:style>
+          <a:lnRef idx="1">
+            <a:schemeClr val="accent1"/>
+          </a:lnRef>
+          <a:fillRef idx="0">
+            <a:schemeClr val="accent1"/>
+          </a:fillRef>
+          <a:effectRef idx="0">
+            <a:schemeClr val="accent1"/>
+          </a:effectRef>
+          <a:fontRef idx="minor">
+            <a:schemeClr val="tx1"/>
+          </a:fontRef>
+        </p:style>
+      </p:cxnSp>
+      <p:cxnSp>
+        <p:nvCxnSpPr>
+          <p:cNvPr id="11" name="直線接點 10"/>
+          <p:cNvCxnSpPr/>
+          <p:nvPr/>
+        </p:nvCxnSpPr>
+        <p:spPr>
+          <a:xfrm flipV="1">
+            <a:off x="1565923" y="3708762"/>
+            <a:ext cx="205385" cy="195262"/>
+          </a:xfrm>
+          <a:prstGeom prst="line">
+            <a:avLst/>
+          </a:prstGeom>
+        </p:spPr>
+        <p:style>
+          <a:lnRef idx="1">
+            <a:schemeClr val="accent1"/>
+          </a:lnRef>
+          <a:fillRef idx="0">
+            <a:schemeClr val="accent1"/>
+          </a:fillRef>
+          <a:effectRef idx="0">
+            <a:schemeClr val="accent1"/>
+          </a:effectRef>
+          <a:fontRef idx="minor">
+            <a:schemeClr val="tx1"/>
+          </a:fontRef>
+        </p:style>
+      </p:cxnSp>
+      <p:cxnSp>
+        <p:nvCxnSpPr>
+          <p:cNvPr id="12" name="直線接點 11"/>
+          <p:cNvCxnSpPr/>
+          <p:nvPr/>
+        </p:nvCxnSpPr>
+        <p:spPr>
+          <a:xfrm flipH="1">
+            <a:off x="1643866" y="4024243"/>
+            <a:ext cx="159695" cy="142875"/>
+          </a:xfrm>
+          <a:prstGeom prst="line">
+            <a:avLst/>
+          </a:prstGeom>
+        </p:spPr>
+        <p:style>
+          <a:lnRef idx="1">
+            <a:schemeClr val="accent1"/>
+          </a:lnRef>
+          <a:fillRef idx="0">
+            <a:schemeClr val="accent1"/>
+          </a:fillRef>
+          <a:effectRef idx="0">
+            <a:schemeClr val="accent1"/>
+          </a:effectRef>
+          <a:fontRef idx="minor">
+            <a:schemeClr val="tx1"/>
+          </a:fontRef>
+        </p:style>
+      </p:cxnSp>
+      <p:cxnSp>
+        <p:nvCxnSpPr>
+          <p:cNvPr id="13" name="直線接點 12"/>
+          <p:cNvCxnSpPr/>
+          <p:nvPr/>
+        </p:nvCxnSpPr>
+        <p:spPr>
+          <a:xfrm>
+            <a:off x="1791931" y="3706380"/>
+            <a:ext cx="205385" cy="195262"/>
+          </a:xfrm>
+          <a:prstGeom prst="line">
+            <a:avLst/>
+          </a:prstGeom>
+        </p:spPr>
+        <p:style>
+          <a:lnRef idx="1">
+            <a:schemeClr val="accent1"/>
+          </a:lnRef>
+          <a:fillRef idx="0">
+            <a:schemeClr val="accent1"/>
+          </a:fillRef>
+          <a:effectRef idx="0">
+            <a:schemeClr val="accent1"/>
+          </a:effectRef>
+          <a:fontRef idx="minor">
+            <a:schemeClr val="tx1"/>
+          </a:fontRef>
+        </p:style>
+      </p:cxnSp>
+      <p:cxnSp>
+        <p:nvCxnSpPr>
+          <p:cNvPr id="14" name="直線接點 13"/>
+          <p:cNvCxnSpPr/>
+          <p:nvPr/>
+        </p:nvCxnSpPr>
+        <p:spPr>
+          <a:xfrm flipH="1" flipV="1">
+            <a:off x="1801333" y="4011602"/>
             <a:ext cx="159695" cy="142875"/>
           </a:xfrm>
           <a:prstGeom prst="line">

</xml_diff>

<commit_message>
Add state transition image
</commit_message>
<xml_diff>
--- a/Document/View.pptx
+++ b/Document/View.pptx
@@ -12,6 +12,7 @@
     <p:sldId id="260" r:id="rId6"/>
     <p:sldId id="262" r:id="rId7"/>
     <p:sldId id="261" r:id="rId8"/>
+    <p:sldId id="263" r:id="rId9"/>
   </p:sldIdLst>
   <p:sldSz cx="12192000" cy="6858000"/>
   <p:notesSz cx="6858000" cy="9144000"/>
@@ -10991,6 +10992,1225 @@
     <p:extLst>
       <p:ext uri="{BB962C8B-B14F-4D97-AF65-F5344CB8AC3E}">
         <p14:creationId xmlns:p14="http://schemas.microsoft.com/office/powerpoint/2010/main" val="3802529605"/>
+      </p:ext>
+    </p:extLst>
+  </p:cSld>
+  <p:clrMapOvr>
+    <a:masterClrMapping/>
+  </p:clrMapOvr>
+  <p:timing>
+    <p:tnLst>
+      <p:par>
+        <p:cTn id="1" dur="indefinite" restart="never" nodeType="tmRoot"/>
+      </p:par>
+    </p:tnLst>
+  </p:timing>
+</p:sld>
+</file>
+
+<file path=ppt/slides/slide8.xml><?xml version="1.0" encoding="utf-8"?>
+<p:sld xmlns:a="http://schemas.openxmlformats.org/drawingml/2006/main" xmlns:r="http://schemas.openxmlformats.org/officeDocument/2006/relationships" xmlns:p="http://schemas.openxmlformats.org/presentationml/2006/main">
+  <p:cSld>
+    <p:spTree>
+      <p:nvGrpSpPr>
+        <p:cNvPr id="1" name=""/>
+        <p:cNvGrpSpPr/>
+        <p:nvPr/>
+      </p:nvGrpSpPr>
+      <p:grpSpPr>
+        <a:xfrm>
+          <a:off x="0" y="0"/>
+          <a:ext cx="0" cy="0"/>
+          <a:chOff x="0" y="0"/>
+          <a:chExt cx="0" cy="0"/>
+        </a:xfrm>
+      </p:grpSpPr>
+      <p:sp>
+        <p:nvSpPr>
+          <p:cNvPr id="3" name="橢圓 2"/>
+          <p:cNvSpPr/>
+          <p:nvPr/>
+        </p:nvSpPr>
+        <p:spPr>
+          <a:xfrm>
+            <a:off x="1766628" y="1245324"/>
+            <a:ext cx="837592" cy="827315"/>
+          </a:xfrm>
+          <a:prstGeom prst="ellipse">
+            <a:avLst/>
+          </a:prstGeom>
+          <a:noFill/>
+          <a:ln w="38100"/>
+        </p:spPr>
+        <p:style>
+          <a:lnRef idx="2">
+            <a:schemeClr val="accent1">
+              <a:shade val="50000"/>
+            </a:schemeClr>
+          </a:lnRef>
+          <a:fillRef idx="1">
+            <a:schemeClr val="accent1"/>
+          </a:fillRef>
+          <a:effectRef idx="0">
+            <a:schemeClr val="accent1"/>
+          </a:effectRef>
+          <a:fontRef idx="minor">
+            <a:schemeClr val="lt1"/>
+          </a:fontRef>
+        </p:style>
+        <p:txBody>
+          <a:bodyPr rtlCol="0" anchor="ctr"/>
+          <a:lstStyle/>
+          <a:p>
+            <a:pPr algn="ctr"/>
+            <a:endParaRPr lang="zh-TW" altLang="en-US"/>
+          </a:p>
+        </p:txBody>
+      </p:sp>
+      <p:sp>
+        <p:nvSpPr>
+          <p:cNvPr id="46" name="橢圓 45"/>
+          <p:cNvSpPr/>
+          <p:nvPr/>
+        </p:nvSpPr>
+        <p:spPr>
+          <a:xfrm>
+            <a:off x="4115588" y="1245323"/>
+            <a:ext cx="837592" cy="827315"/>
+          </a:xfrm>
+          <a:prstGeom prst="ellipse">
+            <a:avLst/>
+          </a:prstGeom>
+          <a:noFill/>
+          <a:ln w="38100"/>
+        </p:spPr>
+        <p:style>
+          <a:lnRef idx="2">
+            <a:schemeClr val="accent1">
+              <a:shade val="50000"/>
+            </a:schemeClr>
+          </a:lnRef>
+          <a:fillRef idx="1">
+            <a:schemeClr val="accent1"/>
+          </a:fillRef>
+          <a:effectRef idx="0">
+            <a:schemeClr val="accent1"/>
+          </a:effectRef>
+          <a:fontRef idx="minor">
+            <a:schemeClr val="lt1"/>
+          </a:fontRef>
+        </p:style>
+        <p:txBody>
+          <a:bodyPr rtlCol="0" anchor="ctr"/>
+          <a:lstStyle/>
+          <a:p>
+            <a:pPr algn="ctr"/>
+            <a:endParaRPr lang="zh-TW" altLang="en-US"/>
+          </a:p>
+        </p:txBody>
+      </p:sp>
+      <p:sp>
+        <p:nvSpPr>
+          <p:cNvPr id="47" name="橢圓 46"/>
+          <p:cNvSpPr/>
+          <p:nvPr/>
+        </p:nvSpPr>
+        <p:spPr>
+          <a:xfrm>
+            <a:off x="5330432" y="3144175"/>
+            <a:ext cx="837592" cy="827315"/>
+          </a:xfrm>
+          <a:prstGeom prst="ellipse">
+            <a:avLst/>
+          </a:prstGeom>
+          <a:noFill/>
+          <a:ln w="38100"/>
+        </p:spPr>
+        <p:style>
+          <a:lnRef idx="2">
+            <a:schemeClr val="accent1">
+              <a:shade val="50000"/>
+            </a:schemeClr>
+          </a:lnRef>
+          <a:fillRef idx="1">
+            <a:schemeClr val="accent1"/>
+          </a:fillRef>
+          <a:effectRef idx="0">
+            <a:schemeClr val="accent1"/>
+          </a:effectRef>
+          <a:fontRef idx="minor">
+            <a:schemeClr val="lt1"/>
+          </a:fontRef>
+        </p:style>
+        <p:txBody>
+          <a:bodyPr rtlCol="0" anchor="ctr"/>
+          <a:lstStyle/>
+          <a:p>
+            <a:pPr algn="ctr"/>
+            <a:endParaRPr lang="zh-TW" altLang="en-US"/>
+          </a:p>
+        </p:txBody>
+      </p:sp>
+      <p:sp>
+        <p:nvSpPr>
+          <p:cNvPr id="48" name="橢圓 47"/>
+          <p:cNvSpPr/>
+          <p:nvPr/>
+        </p:nvSpPr>
+        <p:spPr>
+          <a:xfrm>
+            <a:off x="1889291" y="4677038"/>
+            <a:ext cx="837592" cy="827315"/>
+          </a:xfrm>
+          <a:prstGeom prst="ellipse">
+            <a:avLst/>
+          </a:prstGeom>
+          <a:noFill/>
+          <a:ln w="38100"/>
+        </p:spPr>
+        <p:style>
+          <a:lnRef idx="2">
+            <a:schemeClr val="accent1">
+              <a:shade val="50000"/>
+            </a:schemeClr>
+          </a:lnRef>
+          <a:fillRef idx="1">
+            <a:schemeClr val="accent1"/>
+          </a:fillRef>
+          <a:effectRef idx="0">
+            <a:schemeClr val="accent1"/>
+          </a:effectRef>
+          <a:fontRef idx="minor">
+            <a:schemeClr val="lt1"/>
+          </a:fontRef>
+        </p:style>
+        <p:txBody>
+          <a:bodyPr rtlCol="0" anchor="ctr"/>
+          <a:lstStyle/>
+          <a:p>
+            <a:pPr algn="ctr"/>
+            <a:endParaRPr lang="zh-TW" altLang="en-US" sz="1200" dirty="0">
+              <a:solidFill>
+                <a:schemeClr val="tx1"/>
+              </a:solidFill>
+            </a:endParaRPr>
+          </a:p>
+        </p:txBody>
+      </p:sp>
+      <p:sp>
+        <p:nvSpPr>
+          <p:cNvPr id="49" name="橢圓 48"/>
+          <p:cNvSpPr/>
+          <p:nvPr/>
+        </p:nvSpPr>
+        <p:spPr>
+          <a:xfrm>
+            <a:off x="4114802" y="4677037"/>
+            <a:ext cx="837592" cy="827315"/>
+          </a:xfrm>
+          <a:prstGeom prst="ellipse">
+            <a:avLst/>
+          </a:prstGeom>
+          <a:noFill/>
+          <a:ln w="38100"/>
+        </p:spPr>
+        <p:style>
+          <a:lnRef idx="2">
+            <a:schemeClr val="accent1">
+              <a:shade val="50000"/>
+            </a:schemeClr>
+          </a:lnRef>
+          <a:fillRef idx="1">
+            <a:schemeClr val="accent1"/>
+          </a:fillRef>
+          <a:effectRef idx="0">
+            <a:schemeClr val="accent1"/>
+          </a:effectRef>
+          <a:fontRef idx="minor">
+            <a:schemeClr val="lt1"/>
+          </a:fontRef>
+        </p:style>
+        <p:txBody>
+          <a:bodyPr rtlCol="0" anchor="ctr"/>
+          <a:lstStyle/>
+          <a:p>
+            <a:pPr algn="ctr"/>
+            <a:endParaRPr lang="zh-TW" altLang="en-US"/>
+          </a:p>
+        </p:txBody>
+      </p:sp>
+      <p:sp>
+        <p:nvSpPr>
+          <p:cNvPr id="50" name="橢圓 49"/>
+          <p:cNvSpPr/>
+          <p:nvPr/>
+        </p:nvSpPr>
+        <p:spPr>
+          <a:xfrm>
+            <a:off x="695473" y="3039289"/>
+            <a:ext cx="837592" cy="827315"/>
+          </a:xfrm>
+          <a:prstGeom prst="ellipse">
+            <a:avLst/>
+          </a:prstGeom>
+          <a:noFill/>
+          <a:ln w="38100"/>
+        </p:spPr>
+        <p:style>
+          <a:lnRef idx="2">
+            <a:schemeClr val="accent1">
+              <a:shade val="50000"/>
+            </a:schemeClr>
+          </a:lnRef>
+          <a:fillRef idx="1">
+            <a:schemeClr val="accent1"/>
+          </a:fillRef>
+          <a:effectRef idx="0">
+            <a:schemeClr val="accent1"/>
+          </a:effectRef>
+          <a:fontRef idx="minor">
+            <a:schemeClr val="lt1"/>
+          </a:fontRef>
+        </p:style>
+        <p:txBody>
+          <a:bodyPr rtlCol="0" anchor="ctr"/>
+          <a:lstStyle/>
+          <a:p>
+            <a:pPr algn="ctr"/>
+            <a:endParaRPr lang="zh-TW" altLang="en-US"/>
+          </a:p>
+        </p:txBody>
+      </p:sp>
+      <p:cxnSp>
+        <p:nvCxnSpPr>
+          <p:cNvPr id="52" name="直線單箭頭接點 51"/>
+          <p:cNvCxnSpPr>
+            <a:stCxn id="50" idx="0"/>
+            <a:endCxn id="3" idx="3"/>
+          </p:cNvCxnSpPr>
+          <p:nvPr/>
+        </p:nvCxnSpPr>
+        <p:spPr>
+          <a:xfrm flipV="1">
+            <a:off x="1114269" y="1951482"/>
+            <a:ext cx="775022" cy="1087807"/>
+          </a:xfrm>
+          <a:prstGeom prst="straightConnector1">
+            <a:avLst/>
+          </a:prstGeom>
+          <a:ln w="38100">
+            <a:solidFill>
+              <a:schemeClr val="tx1"/>
+            </a:solidFill>
+            <a:tailEnd type="triangle"/>
+          </a:ln>
+        </p:spPr>
+        <p:style>
+          <a:lnRef idx="1">
+            <a:schemeClr val="accent1"/>
+          </a:lnRef>
+          <a:fillRef idx="0">
+            <a:schemeClr val="accent1"/>
+          </a:fillRef>
+          <a:effectRef idx="0">
+            <a:schemeClr val="accent1"/>
+          </a:effectRef>
+          <a:fontRef idx="minor">
+            <a:schemeClr val="tx1"/>
+          </a:fontRef>
+        </p:style>
+      </p:cxnSp>
+      <p:cxnSp>
+        <p:nvCxnSpPr>
+          <p:cNvPr id="53" name="直線單箭頭接點 52"/>
+          <p:cNvCxnSpPr>
+            <a:stCxn id="3" idx="6"/>
+            <a:endCxn id="46" idx="2"/>
+          </p:cNvCxnSpPr>
+          <p:nvPr/>
+        </p:nvCxnSpPr>
+        <p:spPr>
+          <a:xfrm flipV="1">
+            <a:off x="2604220" y="1658981"/>
+            <a:ext cx="1511368" cy="1"/>
+          </a:xfrm>
+          <a:prstGeom prst="straightConnector1">
+            <a:avLst/>
+          </a:prstGeom>
+          <a:ln w="38100">
+            <a:solidFill>
+              <a:schemeClr val="accent6"/>
+            </a:solidFill>
+            <a:tailEnd type="triangle"/>
+          </a:ln>
+        </p:spPr>
+        <p:style>
+          <a:lnRef idx="1">
+            <a:schemeClr val="accent1"/>
+          </a:lnRef>
+          <a:fillRef idx="0">
+            <a:schemeClr val="accent1"/>
+          </a:fillRef>
+          <a:effectRef idx="0">
+            <a:schemeClr val="accent1"/>
+          </a:effectRef>
+          <a:fontRef idx="minor">
+            <a:schemeClr val="tx1"/>
+          </a:fontRef>
+        </p:style>
+      </p:cxnSp>
+      <p:sp>
+        <p:nvSpPr>
+          <p:cNvPr id="57" name="橢圓 56"/>
+          <p:cNvSpPr/>
+          <p:nvPr/>
+        </p:nvSpPr>
+        <p:spPr>
+          <a:xfrm>
+            <a:off x="788448" y="3144175"/>
+            <a:ext cx="625213" cy="617542"/>
+          </a:xfrm>
+          <a:prstGeom prst="ellipse">
+            <a:avLst/>
+          </a:prstGeom>
+          <a:noFill/>
+          <a:ln w="38100"/>
+        </p:spPr>
+        <p:style>
+          <a:lnRef idx="2">
+            <a:schemeClr val="accent1">
+              <a:shade val="50000"/>
+            </a:schemeClr>
+          </a:lnRef>
+          <a:fillRef idx="1">
+            <a:schemeClr val="accent1"/>
+          </a:fillRef>
+          <a:effectRef idx="0">
+            <a:schemeClr val="accent1"/>
+          </a:effectRef>
+          <a:fontRef idx="minor">
+            <a:schemeClr val="lt1"/>
+          </a:fontRef>
+        </p:style>
+        <p:txBody>
+          <a:bodyPr rtlCol="0" anchor="ctr"/>
+          <a:lstStyle/>
+          <a:p>
+            <a:pPr algn="ctr"/>
+            <a:endParaRPr lang="zh-TW" altLang="en-US"/>
+          </a:p>
+        </p:txBody>
+      </p:sp>
+      <p:sp>
+        <p:nvSpPr>
+          <p:cNvPr id="58" name="文字方塊 57"/>
+          <p:cNvSpPr txBox="1"/>
+          <p:nvPr/>
+        </p:nvSpPr>
+        <p:spPr>
+          <a:xfrm>
+            <a:off x="818626" y="3260163"/>
+            <a:ext cx="532518" cy="369332"/>
+          </a:xfrm>
+          <a:prstGeom prst="rect">
+            <a:avLst/>
+          </a:prstGeom>
+          <a:noFill/>
+        </p:spPr>
+        <p:txBody>
+          <a:bodyPr wrap="none" rtlCol="0">
+            <a:spAutoFit/>
+          </a:bodyPr>
+          <a:lstStyle/>
+          <a:p>
+            <a:r>
+              <a:rPr lang="en-US" altLang="zh-TW" dirty="0" smtClean="0"/>
+              <a:t>Idle</a:t>
+            </a:r>
+            <a:endParaRPr lang="zh-TW" altLang="en-US" dirty="0"/>
+          </a:p>
+        </p:txBody>
+      </p:sp>
+      <p:sp>
+        <p:nvSpPr>
+          <p:cNvPr id="59" name="文字方塊 58"/>
+          <p:cNvSpPr txBox="1"/>
+          <p:nvPr/>
+        </p:nvSpPr>
+        <p:spPr>
+          <a:xfrm>
+            <a:off x="1877968" y="1467655"/>
+            <a:ext cx="649537" cy="369332"/>
+          </a:xfrm>
+          <a:prstGeom prst="rect">
+            <a:avLst/>
+          </a:prstGeom>
+          <a:noFill/>
+        </p:spPr>
+        <p:txBody>
+          <a:bodyPr wrap="none" rtlCol="0">
+            <a:spAutoFit/>
+          </a:bodyPr>
+          <a:lstStyle/>
+          <a:p>
+            <a:r>
+              <a:rPr lang="en-US" altLang="zh-TW" dirty="0" smtClean="0"/>
+              <a:t>Walk</a:t>
+            </a:r>
+            <a:endParaRPr lang="zh-TW" altLang="en-US" dirty="0"/>
+          </a:p>
+        </p:txBody>
+      </p:sp>
+      <p:sp>
+        <p:nvSpPr>
+          <p:cNvPr id="60" name="文字方塊 59"/>
+          <p:cNvSpPr txBox="1"/>
+          <p:nvPr/>
+        </p:nvSpPr>
+        <p:spPr>
+          <a:xfrm>
+            <a:off x="271329" y="1905484"/>
+            <a:ext cx="1268800" cy="646986"/>
+          </a:xfrm>
+          <a:prstGeom prst="roundRect">
+            <a:avLst/>
+          </a:prstGeom>
+          <a:noFill/>
+          <a:ln>
+            <a:noFill/>
+          </a:ln>
+        </p:spPr>
+        <p:txBody>
+          <a:bodyPr wrap="square" rtlCol="0">
+            <a:spAutoFit/>
+          </a:bodyPr>
+          <a:lstStyle/>
+          <a:p>
+            <a:r>
+              <a:rPr lang="zh-TW" altLang="en-US" sz="1600" dirty="0" smtClean="0"/>
+              <a:t>↑↓←→</a:t>
+            </a:r>
+            <a:endParaRPr lang="en-US" altLang="zh-TW" sz="1600" dirty="0" smtClean="0"/>
+          </a:p>
+          <a:p>
+            <a:r>
+              <a:rPr lang="en-US" altLang="zh-TW" sz="1600" dirty="0" smtClean="0"/>
+              <a:t>Key Pressed</a:t>
+            </a:r>
+            <a:endParaRPr lang="zh-TW" altLang="en-US" sz="1600" dirty="0"/>
+          </a:p>
+        </p:txBody>
+      </p:sp>
+      <p:sp>
+        <p:nvSpPr>
+          <p:cNvPr id="61" name="文字方塊 60"/>
+          <p:cNvSpPr txBox="1"/>
+          <p:nvPr/>
+        </p:nvSpPr>
+        <p:spPr>
+          <a:xfrm>
+            <a:off x="390969" y="3992594"/>
+            <a:ext cx="1327196" cy="646986"/>
+          </a:xfrm>
+          <a:prstGeom prst="roundRect">
+            <a:avLst/>
+          </a:prstGeom>
+          <a:noFill/>
+          <a:ln>
+            <a:noFill/>
+          </a:ln>
+        </p:spPr>
+        <p:txBody>
+          <a:bodyPr wrap="square" rtlCol="0">
+            <a:spAutoFit/>
+          </a:bodyPr>
+          <a:lstStyle/>
+          <a:p>
+            <a:r>
+              <a:rPr lang="en-US" altLang="zh-TW" sz="1600" dirty="0" smtClean="0"/>
+              <a:t>Space</a:t>
+            </a:r>
+          </a:p>
+          <a:p>
+            <a:r>
+              <a:rPr lang="en-US" altLang="zh-TW" sz="1600" dirty="0" smtClean="0"/>
+              <a:t>Key Pressed</a:t>
+            </a:r>
+            <a:endParaRPr lang="zh-TW" altLang="en-US" sz="1600" dirty="0"/>
+          </a:p>
+        </p:txBody>
+      </p:sp>
+      <p:cxnSp>
+        <p:nvCxnSpPr>
+          <p:cNvPr id="62" name="直線單箭頭接點 61"/>
+          <p:cNvCxnSpPr>
+            <a:stCxn id="50" idx="4"/>
+            <a:endCxn id="48" idx="1"/>
+          </p:cNvCxnSpPr>
+          <p:nvPr/>
+        </p:nvCxnSpPr>
+        <p:spPr>
+          <a:xfrm>
+            <a:off x="1114269" y="3866604"/>
+            <a:ext cx="897685" cy="931591"/>
+          </a:xfrm>
+          <a:prstGeom prst="straightConnector1">
+            <a:avLst/>
+          </a:prstGeom>
+          <a:ln w="38100">
+            <a:solidFill>
+              <a:schemeClr val="tx1"/>
+            </a:solidFill>
+            <a:tailEnd type="triangle"/>
+          </a:ln>
+        </p:spPr>
+        <p:style>
+          <a:lnRef idx="1">
+            <a:schemeClr val="accent1"/>
+          </a:lnRef>
+          <a:fillRef idx="0">
+            <a:schemeClr val="accent1"/>
+          </a:fillRef>
+          <a:effectRef idx="0">
+            <a:schemeClr val="accent1"/>
+          </a:effectRef>
+          <a:fontRef idx="minor">
+            <a:schemeClr val="tx1"/>
+          </a:fontRef>
+        </p:style>
+      </p:cxnSp>
+      <p:sp>
+        <p:nvSpPr>
+          <p:cNvPr id="64" name="文字方塊 63"/>
+          <p:cNvSpPr txBox="1"/>
+          <p:nvPr/>
+        </p:nvSpPr>
+        <p:spPr>
+          <a:xfrm>
+            <a:off x="1921955" y="4906029"/>
+            <a:ext cx="772263" cy="369332"/>
+          </a:xfrm>
+          <a:prstGeom prst="rect">
+            <a:avLst/>
+          </a:prstGeom>
+          <a:noFill/>
+        </p:spPr>
+        <p:txBody>
+          <a:bodyPr wrap="none" rtlCol="0">
+            <a:spAutoFit/>
+          </a:bodyPr>
+          <a:lstStyle/>
+          <a:p>
+            <a:r>
+              <a:rPr lang="en-US" altLang="zh-TW" dirty="0" smtClean="0"/>
+              <a:t>Attack</a:t>
+            </a:r>
+            <a:endParaRPr lang="zh-TW" altLang="en-US" dirty="0"/>
+          </a:p>
+        </p:txBody>
+      </p:sp>
+      <p:cxnSp>
+        <p:nvCxnSpPr>
+          <p:cNvPr id="68" name="直線單箭頭接點 67"/>
+          <p:cNvCxnSpPr>
+            <a:stCxn id="48" idx="6"/>
+          </p:cNvCxnSpPr>
+          <p:nvPr/>
+        </p:nvCxnSpPr>
+        <p:spPr>
+          <a:xfrm flipV="1">
+            <a:off x="2726883" y="5087735"/>
+            <a:ext cx="1387495" cy="2961"/>
+          </a:xfrm>
+          <a:prstGeom prst="straightConnector1">
+            <a:avLst/>
+          </a:prstGeom>
+          <a:ln w="38100">
+            <a:solidFill>
+              <a:schemeClr val="tx1"/>
+            </a:solidFill>
+            <a:tailEnd type="triangle"/>
+          </a:ln>
+        </p:spPr>
+        <p:style>
+          <a:lnRef idx="1">
+            <a:schemeClr val="accent1"/>
+          </a:lnRef>
+          <a:fillRef idx="0">
+            <a:schemeClr val="accent1"/>
+          </a:fillRef>
+          <a:effectRef idx="0">
+            <a:schemeClr val="accent1"/>
+          </a:effectRef>
+          <a:fontRef idx="minor">
+            <a:schemeClr val="tx1"/>
+          </a:fontRef>
+        </p:style>
+      </p:cxnSp>
+      <p:sp>
+        <p:nvSpPr>
+          <p:cNvPr id="70" name="文字方塊 69"/>
+          <p:cNvSpPr txBox="1"/>
+          <p:nvPr/>
+        </p:nvSpPr>
+        <p:spPr>
+          <a:xfrm>
+            <a:off x="2514312" y="5336608"/>
+            <a:ext cx="2161803" cy="374571"/>
+          </a:xfrm>
+          <a:prstGeom prst="roundRect">
+            <a:avLst/>
+          </a:prstGeom>
+          <a:noFill/>
+          <a:ln>
+            <a:noFill/>
+          </a:ln>
+        </p:spPr>
+        <p:txBody>
+          <a:bodyPr wrap="square" rtlCol="0">
+            <a:spAutoFit/>
+          </a:bodyPr>
+          <a:lstStyle/>
+          <a:p>
+            <a:r>
+              <a:rPr lang="en-US" altLang="zh-TW" sz="1600" dirty="0" smtClean="0"/>
+              <a:t>Target is </a:t>
+            </a:r>
+            <a:r>
+              <a:rPr lang="en-US" altLang="zh-TW" sz="1600" dirty="0"/>
+              <a:t>exhaustion</a:t>
+            </a:r>
+            <a:endParaRPr lang="zh-TW" altLang="en-US" sz="1600" dirty="0"/>
+          </a:p>
+        </p:txBody>
+      </p:sp>
+      <p:sp>
+        <p:nvSpPr>
+          <p:cNvPr id="71" name="文字方塊 70"/>
+          <p:cNvSpPr txBox="1"/>
+          <p:nvPr/>
+        </p:nvSpPr>
+        <p:spPr>
+          <a:xfrm>
+            <a:off x="4211682" y="4903069"/>
+            <a:ext cx="643831" cy="369332"/>
+          </a:xfrm>
+          <a:prstGeom prst="rect">
+            <a:avLst/>
+          </a:prstGeom>
+          <a:noFill/>
+        </p:spPr>
+        <p:txBody>
+          <a:bodyPr wrap="none" rtlCol="0">
+            <a:spAutoFit/>
+          </a:bodyPr>
+          <a:lstStyle/>
+          <a:p>
+            <a:r>
+              <a:rPr lang="en-US" altLang="zh-TW" dirty="0" smtClean="0"/>
+              <a:t>Steal</a:t>
+            </a:r>
+            <a:endParaRPr lang="zh-TW" altLang="en-US" dirty="0"/>
+          </a:p>
+        </p:txBody>
+      </p:sp>
+      <p:cxnSp>
+        <p:nvCxnSpPr>
+          <p:cNvPr id="72" name="直線單箭頭接點 71"/>
+          <p:cNvCxnSpPr>
+            <a:stCxn id="49" idx="0"/>
+            <a:endCxn id="50" idx="6"/>
+          </p:cNvCxnSpPr>
+          <p:nvPr/>
+        </p:nvCxnSpPr>
+        <p:spPr>
+          <a:xfrm flipH="1" flipV="1">
+            <a:off x="1533065" y="3452947"/>
+            <a:ext cx="3000533" cy="1224090"/>
+          </a:xfrm>
+          <a:prstGeom prst="straightConnector1">
+            <a:avLst/>
+          </a:prstGeom>
+          <a:ln w="38100">
+            <a:solidFill>
+              <a:schemeClr val="tx1"/>
+            </a:solidFill>
+            <a:tailEnd type="triangle"/>
+          </a:ln>
+        </p:spPr>
+        <p:style>
+          <a:lnRef idx="1">
+            <a:schemeClr val="accent1"/>
+          </a:lnRef>
+          <a:fillRef idx="0">
+            <a:schemeClr val="accent1"/>
+          </a:fillRef>
+          <a:effectRef idx="0">
+            <a:schemeClr val="accent1"/>
+          </a:effectRef>
+          <a:fontRef idx="minor">
+            <a:schemeClr val="tx1"/>
+          </a:fontRef>
+        </p:style>
+      </p:cxnSp>
+      <p:cxnSp>
+        <p:nvCxnSpPr>
+          <p:cNvPr id="78" name="直線單箭頭接點 77"/>
+          <p:cNvCxnSpPr>
+            <a:stCxn id="50" idx="6"/>
+          </p:cNvCxnSpPr>
+          <p:nvPr/>
+        </p:nvCxnSpPr>
+        <p:spPr>
+          <a:xfrm>
+            <a:off x="1533065" y="3452947"/>
+            <a:ext cx="3797367" cy="126148"/>
+          </a:xfrm>
+          <a:prstGeom prst="straightConnector1">
+            <a:avLst/>
+          </a:prstGeom>
+          <a:ln w="38100">
+            <a:solidFill>
+              <a:schemeClr val="tx1"/>
+            </a:solidFill>
+            <a:tailEnd type="triangle"/>
+          </a:ln>
+        </p:spPr>
+        <p:style>
+          <a:lnRef idx="1">
+            <a:schemeClr val="accent1"/>
+          </a:lnRef>
+          <a:fillRef idx="0">
+            <a:schemeClr val="accent1"/>
+          </a:fillRef>
+          <a:effectRef idx="0">
+            <a:schemeClr val="accent1"/>
+          </a:effectRef>
+          <a:fontRef idx="minor">
+            <a:schemeClr val="tx1"/>
+          </a:fontRef>
+        </p:style>
+      </p:cxnSp>
+      <p:sp>
+        <p:nvSpPr>
+          <p:cNvPr id="83" name="文字方塊 82"/>
+          <p:cNvSpPr txBox="1"/>
+          <p:nvPr/>
+        </p:nvSpPr>
+        <p:spPr>
+          <a:xfrm>
+            <a:off x="1963184" y="3159885"/>
+            <a:ext cx="870581" cy="374571"/>
+          </a:xfrm>
+          <a:prstGeom prst="roundRect">
+            <a:avLst/>
+          </a:prstGeom>
+          <a:noFill/>
+          <a:ln>
+            <a:noFill/>
+          </a:ln>
+        </p:spPr>
+        <p:txBody>
+          <a:bodyPr wrap="square" rtlCol="0">
+            <a:spAutoFit/>
+          </a:bodyPr>
+          <a:lstStyle/>
+          <a:p>
+            <a:r>
+              <a:rPr lang="en-US" altLang="zh-TW" sz="1600" dirty="0" smtClean="0"/>
+              <a:t>HP &lt;= 0</a:t>
+            </a:r>
+            <a:endParaRPr lang="zh-TW" altLang="en-US" sz="1600" dirty="0"/>
+          </a:p>
+        </p:txBody>
+      </p:sp>
+      <p:sp>
+        <p:nvSpPr>
+          <p:cNvPr id="95" name="橢圓 94"/>
+          <p:cNvSpPr/>
+          <p:nvPr/>
+        </p:nvSpPr>
+        <p:spPr>
+          <a:xfrm>
+            <a:off x="5436621" y="3249062"/>
+            <a:ext cx="625213" cy="617542"/>
+          </a:xfrm>
+          <a:prstGeom prst="ellipse">
+            <a:avLst/>
+          </a:prstGeom>
+          <a:noFill/>
+          <a:ln w="38100"/>
+        </p:spPr>
+        <p:style>
+          <a:lnRef idx="2">
+            <a:schemeClr val="accent1">
+              <a:shade val="50000"/>
+            </a:schemeClr>
+          </a:lnRef>
+          <a:fillRef idx="1">
+            <a:schemeClr val="accent1"/>
+          </a:fillRef>
+          <a:effectRef idx="0">
+            <a:schemeClr val="accent1"/>
+          </a:effectRef>
+          <a:fontRef idx="minor">
+            <a:schemeClr val="lt1"/>
+          </a:fontRef>
+        </p:style>
+        <p:txBody>
+          <a:bodyPr rtlCol="0" anchor="ctr"/>
+          <a:lstStyle/>
+          <a:p>
+            <a:pPr algn="ctr"/>
+            <a:endParaRPr lang="zh-TW" altLang="en-US"/>
+          </a:p>
+        </p:txBody>
+      </p:sp>
+      <p:sp>
+        <p:nvSpPr>
+          <p:cNvPr id="96" name="文字方塊 95"/>
+          <p:cNvSpPr txBox="1"/>
+          <p:nvPr/>
+        </p:nvSpPr>
+        <p:spPr>
+          <a:xfrm>
+            <a:off x="5388477" y="3373166"/>
+            <a:ext cx="750014" cy="369332"/>
+          </a:xfrm>
+          <a:prstGeom prst="rect">
+            <a:avLst/>
+          </a:prstGeom>
+          <a:noFill/>
+        </p:spPr>
+        <p:txBody>
+          <a:bodyPr wrap="none" rtlCol="0">
+            <a:spAutoFit/>
+          </a:bodyPr>
+          <a:lstStyle/>
+          <a:p>
+            <a:r>
+              <a:rPr lang="en-US" altLang="zh-TW" dirty="0" smtClean="0"/>
+              <a:t>Death</a:t>
+            </a:r>
+            <a:endParaRPr lang="zh-TW" altLang="en-US" dirty="0"/>
+          </a:p>
+        </p:txBody>
+      </p:sp>
+      <p:cxnSp>
+        <p:nvCxnSpPr>
+          <p:cNvPr id="101" name="直線單箭頭接點 100"/>
+          <p:cNvCxnSpPr>
+            <a:stCxn id="50" idx="6"/>
+            <a:endCxn id="46" idx="2"/>
+          </p:cNvCxnSpPr>
+          <p:nvPr/>
+        </p:nvCxnSpPr>
+        <p:spPr>
+          <a:xfrm flipV="1">
+            <a:off x="1533065" y="1658981"/>
+            <a:ext cx="2582523" cy="1793966"/>
+          </a:xfrm>
+          <a:prstGeom prst="straightConnector1">
+            <a:avLst/>
+          </a:prstGeom>
+          <a:ln w="38100">
+            <a:solidFill>
+              <a:schemeClr val="accent6"/>
+            </a:solidFill>
+            <a:tailEnd type="triangle"/>
+          </a:ln>
+        </p:spPr>
+        <p:style>
+          <a:lnRef idx="1">
+            <a:schemeClr val="accent1"/>
+          </a:lnRef>
+          <a:fillRef idx="0">
+            <a:schemeClr val="accent1"/>
+          </a:fillRef>
+          <a:effectRef idx="0">
+            <a:schemeClr val="accent1"/>
+          </a:effectRef>
+          <a:fontRef idx="minor">
+            <a:schemeClr val="tx1"/>
+          </a:fontRef>
+        </p:style>
+      </p:cxnSp>
+      <p:sp>
+        <p:nvSpPr>
+          <p:cNvPr id="105" name="文字方塊 104"/>
+          <p:cNvSpPr txBox="1"/>
+          <p:nvPr/>
+        </p:nvSpPr>
+        <p:spPr>
+          <a:xfrm>
+            <a:off x="4041236" y="1505091"/>
+            <a:ext cx="986296" cy="307777"/>
+          </a:xfrm>
+          <a:prstGeom prst="rect">
+            <a:avLst/>
+          </a:prstGeom>
+          <a:noFill/>
+        </p:spPr>
+        <p:txBody>
+          <a:bodyPr wrap="none" rtlCol="0">
+            <a:spAutoFit/>
+          </a:bodyPr>
+          <a:lstStyle/>
+          <a:p>
+            <a:r>
+              <a:rPr lang="en-US" altLang="zh-TW" sz="1400" dirty="0" smtClean="0"/>
+              <a:t>Exhaustion</a:t>
+            </a:r>
+            <a:endParaRPr lang="zh-TW" altLang="en-US" sz="1400" dirty="0"/>
+          </a:p>
+        </p:txBody>
+      </p:sp>
+      <p:sp>
+        <p:nvSpPr>
+          <p:cNvPr id="106" name="文字方塊 105"/>
+          <p:cNvSpPr txBox="1"/>
+          <p:nvPr/>
+        </p:nvSpPr>
+        <p:spPr>
+          <a:xfrm rot="19565678">
+            <a:off x="1949882" y="2448765"/>
+            <a:ext cx="1128861" cy="374571"/>
+          </a:xfrm>
+          <a:prstGeom prst="roundRect">
+            <a:avLst/>
+          </a:prstGeom>
+          <a:noFill/>
+          <a:ln>
+            <a:noFill/>
+          </a:ln>
+        </p:spPr>
+        <p:txBody>
+          <a:bodyPr wrap="square" rtlCol="0">
+            <a:spAutoFit/>
+          </a:bodyPr>
+          <a:lstStyle/>
+          <a:p>
+            <a:r>
+              <a:rPr lang="en-US" altLang="zh-TW" sz="1600" dirty="0" smtClean="0"/>
+              <a:t>Health &lt;=0</a:t>
+            </a:r>
+            <a:endParaRPr lang="zh-TW" altLang="en-US" sz="1600" dirty="0"/>
+          </a:p>
+        </p:txBody>
+      </p:sp>
+      <p:sp>
+        <p:nvSpPr>
+          <p:cNvPr id="107" name="文字方塊 106"/>
+          <p:cNvSpPr txBox="1"/>
+          <p:nvPr/>
+        </p:nvSpPr>
+        <p:spPr>
+          <a:xfrm>
+            <a:off x="2726883" y="1345196"/>
+            <a:ext cx="1133049" cy="374571"/>
+          </a:xfrm>
+          <a:prstGeom prst="roundRect">
+            <a:avLst/>
+          </a:prstGeom>
+          <a:noFill/>
+          <a:ln>
+            <a:noFill/>
+          </a:ln>
+        </p:spPr>
+        <p:txBody>
+          <a:bodyPr wrap="square" rtlCol="0">
+            <a:spAutoFit/>
+          </a:bodyPr>
+          <a:lstStyle/>
+          <a:p>
+            <a:r>
+              <a:rPr lang="en-US" altLang="zh-TW" sz="1600" dirty="0" smtClean="0"/>
+              <a:t>Health &lt;=0</a:t>
+            </a:r>
+            <a:endParaRPr lang="zh-TW" altLang="en-US" sz="1600" dirty="0"/>
+          </a:p>
+        </p:txBody>
+      </p:sp>
+      <p:cxnSp>
+        <p:nvCxnSpPr>
+          <p:cNvPr id="108" name="直線單箭頭接點 107"/>
+          <p:cNvCxnSpPr>
+            <a:stCxn id="48" idx="0"/>
+            <a:endCxn id="105" idx="1"/>
+          </p:cNvCxnSpPr>
+          <p:nvPr/>
+        </p:nvCxnSpPr>
+        <p:spPr>
+          <a:xfrm flipV="1">
+            <a:off x="2308087" y="1658980"/>
+            <a:ext cx="1733149" cy="3018058"/>
+          </a:xfrm>
+          <a:prstGeom prst="straightConnector1">
+            <a:avLst/>
+          </a:prstGeom>
+          <a:ln w="38100">
+            <a:solidFill>
+              <a:schemeClr val="accent6"/>
+            </a:solidFill>
+            <a:tailEnd type="triangle"/>
+          </a:ln>
+        </p:spPr>
+        <p:style>
+          <a:lnRef idx="1">
+            <a:schemeClr val="accent1"/>
+          </a:lnRef>
+          <a:fillRef idx="0">
+            <a:schemeClr val="accent1"/>
+          </a:fillRef>
+          <a:effectRef idx="0">
+            <a:schemeClr val="accent1"/>
+          </a:effectRef>
+          <a:fontRef idx="minor">
+            <a:schemeClr val="tx1"/>
+          </a:fontRef>
+        </p:style>
+      </p:cxnSp>
+      <p:cxnSp>
+        <p:nvCxnSpPr>
+          <p:cNvPr id="111" name="直線單箭頭接點 110"/>
+          <p:cNvCxnSpPr>
+            <a:endCxn id="46" idx="4"/>
+          </p:cNvCxnSpPr>
+          <p:nvPr/>
+        </p:nvCxnSpPr>
+        <p:spPr>
+          <a:xfrm flipV="1">
+            <a:off x="4532668" y="2072638"/>
+            <a:ext cx="1716" cy="2604400"/>
+          </a:xfrm>
+          <a:prstGeom prst="straightConnector1">
+            <a:avLst/>
+          </a:prstGeom>
+          <a:ln w="38100">
+            <a:solidFill>
+              <a:schemeClr val="accent6"/>
+            </a:solidFill>
+            <a:tailEnd type="triangle"/>
+          </a:ln>
+        </p:spPr>
+        <p:style>
+          <a:lnRef idx="1">
+            <a:schemeClr val="accent1"/>
+          </a:lnRef>
+          <a:fillRef idx="0">
+            <a:schemeClr val="accent1"/>
+          </a:fillRef>
+          <a:effectRef idx="0">
+            <a:schemeClr val="accent1"/>
+          </a:effectRef>
+          <a:fontRef idx="minor">
+            <a:schemeClr val="tx1"/>
+          </a:fontRef>
+        </p:style>
+      </p:cxnSp>
+      <p:sp>
+        <p:nvSpPr>
+          <p:cNvPr id="113" name="文字方塊 112"/>
+          <p:cNvSpPr txBox="1"/>
+          <p:nvPr/>
+        </p:nvSpPr>
+        <p:spPr>
+          <a:xfrm>
+            <a:off x="4482216" y="3980402"/>
+            <a:ext cx="1128861" cy="374571"/>
+          </a:xfrm>
+          <a:prstGeom prst="roundRect">
+            <a:avLst/>
+          </a:prstGeom>
+          <a:noFill/>
+          <a:ln>
+            <a:noFill/>
+          </a:ln>
+        </p:spPr>
+        <p:txBody>
+          <a:bodyPr wrap="square" rtlCol="0">
+            <a:spAutoFit/>
+          </a:bodyPr>
+          <a:lstStyle/>
+          <a:p>
+            <a:r>
+              <a:rPr lang="en-US" altLang="zh-TW" sz="1600" dirty="0" smtClean="0"/>
+              <a:t>Health &lt;=0</a:t>
+            </a:r>
+            <a:endParaRPr lang="zh-TW" altLang="en-US" sz="1600" dirty="0"/>
+          </a:p>
+        </p:txBody>
+      </p:sp>
+      <p:sp>
+        <p:nvSpPr>
+          <p:cNvPr id="76" name="文字方塊 75"/>
+          <p:cNvSpPr txBox="1"/>
+          <p:nvPr/>
+        </p:nvSpPr>
+        <p:spPr>
+          <a:xfrm rot="1346928">
+            <a:off x="2694345" y="4109965"/>
+            <a:ext cx="2548117" cy="374571"/>
+          </a:xfrm>
+          <a:prstGeom prst="roundRect">
+            <a:avLst/>
+          </a:prstGeom>
+          <a:noFill/>
+          <a:ln>
+            <a:noFill/>
+          </a:ln>
+        </p:spPr>
+        <p:txBody>
+          <a:bodyPr wrap="square" rtlCol="0">
+            <a:spAutoFit/>
+          </a:bodyPr>
+          <a:lstStyle/>
+          <a:p>
+            <a:r>
+              <a:rPr lang="en-US" altLang="zh-TW" sz="1600" dirty="0" smtClean="0"/>
+              <a:t>Steal action finished</a:t>
+            </a:r>
+            <a:endParaRPr lang="zh-TW" altLang="en-US" sz="1600" dirty="0"/>
+          </a:p>
+        </p:txBody>
+      </p:sp>
+      <p:sp>
+        <p:nvSpPr>
+          <p:cNvPr id="114" name="文字方塊 113"/>
+          <p:cNvSpPr txBox="1"/>
+          <p:nvPr/>
+        </p:nvSpPr>
+        <p:spPr>
+          <a:xfrm rot="18198695">
+            <a:off x="1803342" y="4112443"/>
+            <a:ext cx="1128861" cy="374571"/>
+          </a:xfrm>
+          <a:prstGeom prst="roundRect">
+            <a:avLst/>
+          </a:prstGeom>
+          <a:noFill/>
+          <a:ln>
+            <a:noFill/>
+          </a:ln>
+        </p:spPr>
+        <p:txBody>
+          <a:bodyPr wrap="square" rtlCol="0">
+            <a:spAutoFit/>
+          </a:bodyPr>
+          <a:lstStyle/>
+          <a:p>
+            <a:r>
+              <a:rPr lang="en-US" altLang="zh-TW" sz="1600" dirty="0" smtClean="0"/>
+              <a:t>Health &lt;=0</a:t>
+            </a:r>
+            <a:endParaRPr lang="zh-TW" altLang="en-US" sz="1600" dirty="0"/>
+          </a:p>
+        </p:txBody>
+      </p:sp>
+    </p:spTree>
+    <p:extLst>
+      <p:ext uri="{BB962C8B-B14F-4D97-AF65-F5344CB8AC3E}">
+        <p14:creationId xmlns:p14="http://schemas.microsoft.com/office/powerpoint/2010/main" val="2710228943"/>
       </p:ext>
     </p:extLst>
   </p:cSld>

</xml_diff>